<commit_message>
Added separation of initial forecasts and external forecasts (v0.14)
</commit_message>
<xml_diff>
--- a/documentation-templates/model-flow.pptx
+++ b/documentation-templates/model-flow.pptx
@@ -5,9 +5,10 @@
     <p:sldMasterId id="2147483648" r:id="rId1"/>
   </p:sldMasterIdLst>
   <p:sldIdLst>
-    <p:sldId id="256" r:id="rId2"/>
-    <p:sldId id="257" r:id="rId3"/>
-    <p:sldId id="258" r:id="rId4"/>
+    <p:sldId id="260" r:id="rId2"/>
+    <p:sldId id="256" r:id="rId3"/>
+    <p:sldId id="257" r:id="rId4"/>
+    <p:sldId id="258" r:id="rId5"/>
   </p:sldIdLst>
   <p:sldSz cx="12192000" cy="6858000"/>
   <p:notesSz cx="6858000" cy="9144000"/>
@@ -261,7 +262,7 @@
           <a:p>
             <a:fld id="{A7C790ED-1353-428C-9EC0-1379BDA992E3}" type="datetimeFigureOut">
               <a:rPr lang="en-US" smtClean="0"/>
-              <a:t>6/2/2021</a:t>
+              <a:t>6/18/2021</a:t>
             </a:fld>
             <a:endParaRPr lang="en-US"/>
           </a:p>
@@ -459,7 +460,7 @@
           <a:p>
             <a:fld id="{A7C790ED-1353-428C-9EC0-1379BDA992E3}" type="datetimeFigureOut">
               <a:rPr lang="en-US" smtClean="0"/>
-              <a:t>6/2/2021</a:t>
+              <a:t>6/18/2021</a:t>
             </a:fld>
             <a:endParaRPr lang="en-US"/>
           </a:p>
@@ -667,7 +668,7 @@
           <a:p>
             <a:fld id="{A7C790ED-1353-428C-9EC0-1379BDA992E3}" type="datetimeFigureOut">
               <a:rPr lang="en-US" smtClean="0"/>
-              <a:t>6/2/2021</a:t>
+              <a:t>6/18/2021</a:t>
             </a:fld>
             <a:endParaRPr lang="en-US"/>
           </a:p>
@@ -865,7 +866,7 @@
           <a:p>
             <a:fld id="{A7C790ED-1353-428C-9EC0-1379BDA992E3}" type="datetimeFigureOut">
               <a:rPr lang="en-US" smtClean="0"/>
-              <a:t>6/2/2021</a:t>
+              <a:t>6/18/2021</a:t>
             </a:fld>
             <a:endParaRPr lang="en-US"/>
           </a:p>
@@ -1140,7 +1141,7 @@
           <a:p>
             <a:fld id="{A7C790ED-1353-428C-9EC0-1379BDA992E3}" type="datetimeFigureOut">
               <a:rPr lang="en-US" smtClean="0"/>
-              <a:t>6/2/2021</a:t>
+              <a:t>6/18/2021</a:t>
             </a:fld>
             <a:endParaRPr lang="en-US"/>
           </a:p>
@@ -1405,7 +1406,7 @@
           <a:p>
             <a:fld id="{A7C790ED-1353-428C-9EC0-1379BDA992E3}" type="datetimeFigureOut">
               <a:rPr lang="en-US" smtClean="0"/>
-              <a:t>6/2/2021</a:t>
+              <a:t>6/18/2021</a:t>
             </a:fld>
             <a:endParaRPr lang="en-US"/>
           </a:p>
@@ -1817,7 +1818,7 @@
           <a:p>
             <a:fld id="{A7C790ED-1353-428C-9EC0-1379BDA992E3}" type="datetimeFigureOut">
               <a:rPr lang="en-US" smtClean="0"/>
-              <a:t>6/2/2021</a:t>
+              <a:t>6/18/2021</a:t>
             </a:fld>
             <a:endParaRPr lang="en-US"/>
           </a:p>
@@ -1958,7 +1959,7 @@
           <a:p>
             <a:fld id="{A7C790ED-1353-428C-9EC0-1379BDA992E3}" type="datetimeFigureOut">
               <a:rPr lang="en-US" smtClean="0"/>
-              <a:t>6/2/2021</a:t>
+              <a:t>6/18/2021</a:t>
             </a:fld>
             <a:endParaRPr lang="en-US"/>
           </a:p>
@@ -2071,7 +2072,7 @@
           <a:p>
             <a:fld id="{A7C790ED-1353-428C-9EC0-1379BDA992E3}" type="datetimeFigureOut">
               <a:rPr lang="en-US" smtClean="0"/>
-              <a:t>6/2/2021</a:t>
+              <a:t>6/18/2021</a:t>
             </a:fld>
             <a:endParaRPr lang="en-US"/>
           </a:p>
@@ -2382,7 +2383,7 @@
           <a:p>
             <a:fld id="{A7C790ED-1353-428C-9EC0-1379BDA992E3}" type="datetimeFigureOut">
               <a:rPr lang="en-US" smtClean="0"/>
-              <a:t>6/2/2021</a:t>
+              <a:t>6/18/2021</a:t>
             </a:fld>
             <a:endParaRPr lang="en-US"/>
           </a:p>
@@ -2670,7 +2671,7 @@
           <a:p>
             <a:fld id="{A7C790ED-1353-428C-9EC0-1379BDA992E3}" type="datetimeFigureOut">
               <a:rPr lang="en-US" smtClean="0"/>
-              <a:t>6/2/2021</a:t>
+              <a:t>6/18/2021</a:t>
             </a:fld>
             <a:endParaRPr lang="en-US"/>
           </a:p>
@@ -2911,7 +2912,7 @@
           <a:p>
             <a:fld id="{A7C790ED-1353-428C-9EC0-1379BDA992E3}" type="datetimeFigureOut">
               <a:rPr lang="en-US" smtClean="0"/>
-              <a:t>6/2/2021</a:t>
+              <a:t>6/18/2021</a:t>
             </a:fld>
             <a:endParaRPr lang="en-US"/>
           </a:p>
@@ -3316,6 +3317,673 @@
   <p:cSld>
     <p:bg>
       <p:bgPr>
+        <a:blipFill>
+          <a:blip r:embed="rId2"/>
+          <a:tile tx="0" ty="0" sx="100000" sy="100000" flip="none" algn="tl"/>
+        </a:blipFill>
+        <a:effectLst/>
+      </p:bgPr>
+    </p:bg>
+    <p:spTree>
+      <p:nvGrpSpPr>
+        <p:cNvPr id="1" name=""/>
+        <p:cNvGrpSpPr/>
+        <p:nvPr/>
+      </p:nvGrpSpPr>
+      <p:grpSpPr>
+        <a:xfrm>
+          <a:off x="0" y="0"/>
+          <a:ext cx="0" cy="0"/>
+          <a:chOff x="0" y="0"/>
+          <a:chExt cx="0" cy="0"/>
+        </a:xfrm>
+      </p:grpSpPr>
+      <p:sp>
+        <p:nvSpPr>
+          <p:cNvPr id="83" name="TextBox 82">
+            <a:extLst>
+              <a:ext uri="{FF2B5EF4-FFF2-40B4-BE49-F238E27FC236}">
+                <a16:creationId xmlns:a16="http://schemas.microsoft.com/office/drawing/2014/main" id="{3A5CB05C-7F9C-4925-A172-8D5CD96F04B1}"/>
+              </a:ext>
+            </a:extLst>
+          </p:cNvPr>
+          <p:cNvSpPr txBox="1"/>
+          <p:nvPr/>
+        </p:nvSpPr>
+        <p:spPr>
+          <a:xfrm>
+            <a:off x="4287473" y="451284"/>
+            <a:ext cx="3061283" cy="923330"/>
+          </a:xfrm>
+          <a:prstGeom prst="rect">
+            <a:avLst/>
+          </a:prstGeom>
+          <a:noFill/>
+        </p:spPr>
+        <p:txBody>
+          <a:bodyPr wrap="square" rtlCol="0">
+            <a:spAutoFit/>
+          </a:bodyPr>
+          <a:lstStyle/>
+          <a:p>
+            <a:r>
+              <a:rPr lang="en-US" dirty="0"/>
+              <a:t>Model 1a: External/Market-Implied Forecasts</a:t>
+            </a:r>
+          </a:p>
+          <a:p>
+            <a:r>
+              <a:rPr lang="en-US"/>
+              <a:t>(Import all as d1 form)</a:t>
+            </a:r>
+            <a:endParaRPr lang="en-US" dirty="0"/>
+          </a:p>
+        </p:txBody>
+      </p:sp>
+      <p:sp>
+        <p:nvSpPr>
+          <p:cNvPr id="33" name="Rectangle 32">
+            <a:extLst>
+              <a:ext uri="{FF2B5EF4-FFF2-40B4-BE49-F238E27FC236}">
+                <a16:creationId xmlns:a16="http://schemas.microsoft.com/office/drawing/2014/main" id="{C66CD848-F269-4C1B-BA47-B076A370E957}"/>
+              </a:ext>
+            </a:extLst>
+          </p:cNvPr>
+          <p:cNvSpPr/>
+          <p:nvPr/>
+        </p:nvSpPr>
+        <p:spPr>
+          <a:xfrm>
+            <a:off x="1707161" y="1300294"/>
+            <a:ext cx="2432808" cy="1132513"/>
+          </a:xfrm>
+          <a:prstGeom prst="rect">
+            <a:avLst/>
+          </a:prstGeom>
+        </p:spPr>
+        <p:style>
+          <a:lnRef idx="2">
+            <a:schemeClr val="accent1">
+              <a:shade val="50000"/>
+            </a:schemeClr>
+          </a:lnRef>
+          <a:fillRef idx="1">
+            <a:schemeClr val="accent1"/>
+          </a:fillRef>
+          <a:effectRef idx="0">
+            <a:schemeClr val="accent1"/>
+          </a:effectRef>
+          <a:fontRef idx="minor">
+            <a:schemeClr val="lt1"/>
+          </a:fontRef>
+        </p:style>
+        <p:txBody>
+          <a:bodyPr rtlCol="0" anchor="ctr"/>
+          <a:lstStyle/>
+          <a:p>
+            <a:pPr algn="ctr"/>
+            <a:r>
+              <a:rPr lang="en-US" sz="1200" b="1" dirty="0"/>
+              <a:t>Atlanta Fed</a:t>
+            </a:r>
+          </a:p>
+          <a:p>
+            <a:pPr marL="285750" indent="-285750">
+              <a:buFont typeface="Arial" panose="020B0604020202020204" pitchFamily="34" charset="0"/>
+              <a:buChar char="•"/>
+            </a:pPr>
+            <a:r>
+              <a:rPr lang="en-US" sz="1200" dirty="0"/>
+              <a:t>GDP</a:t>
+            </a:r>
+          </a:p>
+          <a:p>
+            <a:pPr marL="285750" indent="-285750">
+              <a:buFont typeface="Arial" panose="020B0604020202020204" pitchFamily="34" charset="0"/>
+              <a:buChar char="•"/>
+            </a:pPr>
+            <a:r>
+              <a:rPr lang="en-US" sz="1200" dirty="0"/>
+              <a:t>PCE</a:t>
+            </a:r>
+          </a:p>
+        </p:txBody>
+      </p:sp>
+      <p:sp>
+        <p:nvSpPr>
+          <p:cNvPr id="34" name="Rectangle 33">
+            <a:extLst>
+              <a:ext uri="{FF2B5EF4-FFF2-40B4-BE49-F238E27FC236}">
+                <a16:creationId xmlns:a16="http://schemas.microsoft.com/office/drawing/2014/main" id="{EE39BE38-FC1B-44C2-8AA2-7E2D6DB5D323}"/>
+              </a:ext>
+            </a:extLst>
+          </p:cNvPr>
+          <p:cNvSpPr/>
+          <p:nvPr/>
+        </p:nvSpPr>
+        <p:spPr>
+          <a:xfrm>
+            <a:off x="4451759" y="1300294"/>
+            <a:ext cx="2432808" cy="1132513"/>
+          </a:xfrm>
+          <a:prstGeom prst="rect">
+            <a:avLst/>
+          </a:prstGeom>
+        </p:spPr>
+        <p:style>
+          <a:lnRef idx="2">
+            <a:schemeClr val="accent1">
+              <a:shade val="50000"/>
+            </a:schemeClr>
+          </a:lnRef>
+          <a:fillRef idx="1">
+            <a:schemeClr val="accent1"/>
+          </a:fillRef>
+          <a:effectRef idx="0">
+            <a:schemeClr val="accent1"/>
+          </a:effectRef>
+          <a:fontRef idx="minor">
+            <a:schemeClr val="lt1"/>
+          </a:fontRef>
+        </p:style>
+        <p:txBody>
+          <a:bodyPr rtlCol="0" anchor="ctr"/>
+          <a:lstStyle/>
+          <a:p>
+            <a:pPr algn="ctr"/>
+            <a:r>
+              <a:rPr lang="en-US" sz="1200" b="1" dirty="0"/>
+              <a:t>St. Louis Fed</a:t>
+            </a:r>
+          </a:p>
+          <a:p>
+            <a:pPr marL="285750" indent="-285750">
+              <a:buFont typeface="Arial" panose="020B0604020202020204" pitchFamily="34" charset="0"/>
+              <a:buChar char="•"/>
+            </a:pPr>
+            <a:r>
+              <a:rPr lang="en-US" sz="1200" dirty="0"/>
+              <a:t>GDP</a:t>
+            </a:r>
+          </a:p>
+        </p:txBody>
+      </p:sp>
+      <p:sp>
+        <p:nvSpPr>
+          <p:cNvPr id="37" name="Rectangle 36">
+            <a:extLst>
+              <a:ext uri="{FF2B5EF4-FFF2-40B4-BE49-F238E27FC236}">
+                <a16:creationId xmlns:a16="http://schemas.microsoft.com/office/drawing/2014/main" id="{8A153A3E-4AAA-4B0D-AC5D-E5AF1A19958B}"/>
+              </a:ext>
+            </a:extLst>
+          </p:cNvPr>
+          <p:cNvSpPr/>
+          <p:nvPr/>
+        </p:nvSpPr>
+        <p:spPr>
+          <a:xfrm>
+            <a:off x="7196357" y="1300293"/>
+            <a:ext cx="2432808" cy="1132513"/>
+          </a:xfrm>
+          <a:prstGeom prst="rect">
+            <a:avLst/>
+          </a:prstGeom>
+        </p:spPr>
+        <p:style>
+          <a:lnRef idx="2">
+            <a:schemeClr val="accent1">
+              <a:shade val="50000"/>
+            </a:schemeClr>
+          </a:lnRef>
+          <a:fillRef idx="1">
+            <a:schemeClr val="accent1"/>
+          </a:fillRef>
+          <a:effectRef idx="0">
+            <a:schemeClr val="accent1"/>
+          </a:effectRef>
+          <a:fontRef idx="minor">
+            <a:schemeClr val="lt1"/>
+          </a:fontRef>
+        </p:style>
+        <p:txBody>
+          <a:bodyPr rtlCol="0" anchor="ctr"/>
+          <a:lstStyle/>
+          <a:p>
+            <a:pPr algn="ctr"/>
+            <a:r>
+              <a:rPr lang="en-US" sz="1200" b="1" dirty="0"/>
+              <a:t>New York Fed</a:t>
+            </a:r>
+          </a:p>
+          <a:p>
+            <a:pPr marL="285750" indent="-285750">
+              <a:buFont typeface="Arial" panose="020B0604020202020204" pitchFamily="34" charset="0"/>
+              <a:buChar char="•"/>
+            </a:pPr>
+            <a:r>
+              <a:rPr lang="en-US" sz="1200" dirty="0"/>
+              <a:t>GDP</a:t>
+            </a:r>
+          </a:p>
+        </p:txBody>
+      </p:sp>
+      <p:sp>
+        <p:nvSpPr>
+          <p:cNvPr id="39" name="Rectangle 38">
+            <a:extLst>
+              <a:ext uri="{FF2B5EF4-FFF2-40B4-BE49-F238E27FC236}">
+                <a16:creationId xmlns:a16="http://schemas.microsoft.com/office/drawing/2014/main" id="{637D9AA5-F3A7-473A-B564-702CD815CABD}"/>
+              </a:ext>
+            </a:extLst>
+          </p:cNvPr>
+          <p:cNvSpPr/>
+          <p:nvPr/>
+        </p:nvSpPr>
+        <p:spPr>
+          <a:xfrm>
+            <a:off x="1707161" y="2719432"/>
+            <a:ext cx="2432808" cy="1132513"/>
+          </a:xfrm>
+          <a:prstGeom prst="rect">
+            <a:avLst/>
+          </a:prstGeom>
+        </p:spPr>
+        <p:style>
+          <a:lnRef idx="2">
+            <a:schemeClr val="accent1">
+              <a:shade val="50000"/>
+            </a:schemeClr>
+          </a:lnRef>
+          <a:fillRef idx="1">
+            <a:schemeClr val="accent1"/>
+          </a:fillRef>
+          <a:effectRef idx="0">
+            <a:schemeClr val="accent1"/>
+          </a:effectRef>
+          <a:fontRef idx="minor">
+            <a:schemeClr val="lt1"/>
+          </a:fontRef>
+        </p:style>
+        <p:txBody>
+          <a:bodyPr rtlCol="0" anchor="ctr"/>
+          <a:lstStyle/>
+          <a:p>
+            <a:pPr algn="ctr"/>
+            <a:r>
+              <a:rPr lang="en-US" sz="1200" b="1" dirty="0"/>
+              <a:t>Philadelphia Fed SPF</a:t>
+            </a:r>
+          </a:p>
+          <a:p>
+            <a:pPr marL="285750" indent="-285750">
+              <a:buFont typeface="Arial" panose="020B0604020202020204" pitchFamily="34" charset="0"/>
+              <a:buChar char="•"/>
+            </a:pPr>
+            <a:r>
+              <a:rPr lang="en-US" sz="1200" dirty="0"/>
+              <a:t>GDP</a:t>
+            </a:r>
+          </a:p>
+          <a:p>
+            <a:pPr marL="285750" indent="-285750">
+              <a:buFont typeface="Arial" panose="020B0604020202020204" pitchFamily="34" charset="0"/>
+              <a:buChar char="•"/>
+            </a:pPr>
+            <a:r>
+              <a:rPr lang="en-US" sz="1200" dirty="0"/>
+              <a:t>PCE</a:t>
+            </a:r>
+          </a:p>
+          <a:p>
+            <a:pPr marL="285750" indent="-285750">
+              <a:buFont typeface="Arial" panose="020B0604020202020204" pitchFamily="34" charset="0"/>
+              <a:buChar char="•"/>
+            </a:pPr>
+            <a:r>
+              <a:rPr lang="en-US" sz="1200" dirty="0"/>
+              <a:t>UE</a:t>
+            </a:r>
+          </a:p>
+          <a:p>
+            <a:pPr marL="285750" indent="-285750">
+              <a:buFont typeface="Arial" panose="020B0604020202020204" pitchFamily="34" charset="0"/>
+              <a:buChar char="•"/>
+            </a:pPr>
+            <a:r>
+              <a:rPr lang="en-US" sz="1200" dirty="0"/>
+              <a:t>T03M</a:t>
+            </a:r>
+          </a:p>
+          <a:p>
+            <a:pPr marL="285750" indent="-285750">
+              <a:buFont typeface="Arial" panose="020B0604020202020204" pitchFamily="34" charset="0"/>
+              <a:buChar char="•"/>
+            </a:pPr>
+            <a:r>
+              <a:rPr lang="en-US" sz="1200" dirty="0"/>
+              <a:t>T10Y</a:t>
+            </a:r>
+          </a:p>
+        </p:txBody>
+      </p:sp>
+      <p:sp>
+        <p:nvSpPr>
+          <p:cNvPr id="40" name="Rectangle 39">
+            <a:extLst>
+              <a:ext uri="{FF2B5EF4-FFF2-40B4-BE49-F238E27FC236}">
+                <a16:creationId xmlns:a16="http://schemas.microsoft.com/office/drawing/2014/main" id="{0D0EA106-009E-48BC-9E72-B073C777009A}"/>
+              </a:ext>
+            </a:extLst>
+          </p:cNvPr>
+          <p:cNvSpPr/>
+          <p:nvPr/>
+        </p:nvSpPr>
+        <p:spPr>
+          <a:xfrm>
+            <a:off x="4451759" y="2719431"/>
+            <a:ext cx="2432808" cy="1132513"/>
+          </a:xfrm>
+          <a:prstGeom prst="rect">
+            <a:avLst/>
+          </a:prstGeom>
+        </p:spPr>
+        <p:style>
+          <a:lnRef idx="2">
+            <a:schemeClr val="accent1">
+              <a:shade val="50000"/>
+            </a:schemeClr>
+          </a:lnRef>
+          <a:fillRef idx="1">
+            <a:schemeClr val="accent1"/>
+          </a:fillRef>
+          <a:effectRef idx="0">
+            <a:schemeClr val="accent1"/>
+          </a:effectRef>
+          <a:fontRef idx="minor">
+            <a:schemeClr val="lt1"/>
+          </a:fontRef>
+        </p:style>
+        <p:txBody>
+          <a:bodyPr rtlCol="0" anchor="ctr"/>
+          <a:lstStyle/>
+          <a:p>
+            <a:pPr algn="ctr"/>
+            <a:r>
+              <a:rPr lang="en-US" sz="1200" b="1" dirty="0"/>
+              <a:t>WSJ</a:t>
+            </a:r>
+          </a:p>
+          <a:p>
+            <a:pPr marL="285750" indent="-285750">
+              <a:buFont typeface="Arial" panose="020B0604020202020204" pitchFamily="34" charset="0"/>
+              <a:buChar char="•"/>
+            </a:pPr>
+            <a:r>
+              <a:rPr lang="en-US" sz="1200" dirty="0"/>
+              <a:t>GDP</a:t>
+            </a:r>
+          </a:p>
+          <a:p>
+            <a:pPr marL="285750" indent="-285750">
+              <a:buFont typeface="Arial" panose="020B0604020202020204" pitchFamily="34" charset="0"/>
+              <a:buChar char="•"/>
+            </a:pPr>
+            <a:endParaRPr lang="en-US" sz="1200" dirty="0"/>
+          </a:p>
+        </p:txBody>
+      </p:sp>
+      <p:sp>
+        <p:nvSpPr>
+          <p:cNvPr id="41" name="Rectangle 40">
+            <a:extLst>
+              <a:ext uri="{FF2B5EF4-FFF2-40B4-BE49-F238E27FC236}">
+                <a16:creationId xmlns:a16="http://schemas.microsoft.com/office/drawing/2014/main" id="{B5A45E40-7C3F-4D22-9378-A81D67826551}"/>
+              </a:ext>
+            </a:extLst>
+          </p:cNvPr>
+          <p:cNvSpPr/>
+          <p:nvPr/>
+        </p:nvSpPr>
+        <p:spPr>
+          <a:xfrm>
+            <a:off x="7196357" y="2719430"/>
+            <a:ext cx="2432808" cy="1132513"/>
+          </a:xfrm>
+          <a:prstGeom prst="rect">
+            <a:avLst/>
+          </a:prstGeom>
+        </p:spPr>
+        <p:style>
+          <a:lnRef idx="2">
+            <a:schemeClr val="accent1">
+              <a:shade val="50000"/>
+            </a:schemeClr>
+          </a:lnRef>
+          <a:fillRef idx="1">
+            <a:schemeClr val="accent1"/>
+          </a:fillRef>
+          <a:effectRef idx="0">
+            <a:schemeClr val="accent1"/>
+          </a:effectRef>
+          <a:fontRef idx="minor">
+            <a:schemeClr val="lt1"/>
+          </a:fontRef>
+        </p:style>
+        <p:txBody>
+          <a:bodyPr rtlCol="0" anchor="ctr"/>
+          <a:lstStyle/>
+          <a:p>
+            <a:pPr algn="ctr"/>
+            <a:r>
+              <a:rPr lang="en-US" sz="1200" b="1" dirty="0"/>
+              <a:t>CBO</a:t>
+            </a:r>
+          </a:p>
+          <a:p>
+            <a:pPr marL="285750" indent="-285750">
+              <a:buFont typeface="Arial" panose="020B0604020202020204" pitchFamily="34" charset="0"/>
+              <a:buChar char="•"/>
+            </a:pPr>
+            <a:r>
+              <a:rPr lang="en-US" sz="1200" dirty="0"/>
+              <a:t>GDP</a:t>
+            </a:r>
+          </a:p>
+          <a:p>
+            <a:pPr marL="285750" indent="-285750">
+              <a:buFont typeface="Arial" panose="020B0604020202020204" pitchFamily="34" charset="0"/>
+              <a:buChar char="•"/>
+            </a:pPr>
+            <a:r>
+              <a:rPr lang="en-US" sz="1200" dirty="0"/>
+              <a:t>UE</a:t>
+            </a:r>
+          </a:p>
+          <a:p>
+            <a:pPr marL="285750" indent="-285750">
+              <a:buFont typeface="Arial" panose="020B0604020202020204" pitchFamily="34" charset="0"/>
+              <a:buChar char="•"/>
+            </a:pPr>
+            <a:r>
+              <a:rPr lang="en-US" sz="1200" dirty="0"/>
+              <a:t>CPI</a:t>
+            </a:r>
+          </a:p>
+          <a:p>
+            <a:pPr marL="285750" indent="-285750">
+              <a:buFont typeface="Arial" panose="020B0604020202020204" pitchFamily="34" charset="0"/>
+              <a:buChar char="•"/>
+            </a:pPr>
+            <a:r>
+              <a:rPr lang="en-US" sz="1200" dirty="0"/>
+              <a:t>FFR</a:t>
+            </a:r>
+          </a:p>
+          <a:p>
+            <a:pPr marL="285750" indent="-285750">
+              <a:buFont typeface="Arial" panose="020B0604020202020204" pitchFamily="34" charset="0"/>
+              <a:buChar char="•"/>
+            </a:pPr>
+            <a:r>
+              <a:rPr lang="en-US" sz="1200" dirty="0"/>
+              <a:t>WTI</a:t>
+            </a:r>
+          </a:p>
+          <a:p>
+            <a:pPr marL="285750" indent="-285750">
+              <a:buFont typeface="Arial" panose="020B0604020202020204" pitchFamily="34" charset="0"/>
+              <a:buChar char="•"/>
+            </a:pPr>
+            <a:endParaRPr lang="en-US" sz="1200" dirty="0"/>
+          </a:p>
+        </p:txBody>
+      </p:sp>
+      <p:sp>
+        <p:nvSpPr>
+          <p:cNvPr id="42" name="Rectangle 41">
+            <a:extLst>
+              <a:ext uri="{FF2B5EF4-FFF2-40B4-BE49-F238E27FC236}">
+                <a16:creationId xmlns:a16="http://schemas.microsoft.com/office/drawing/2014/main" id="{296EFA32-2CD1-4F28-9CAB-0BA1EFCDACCD}"/>
+              </a:ext>
+            </a:extLst>
+          </p:cNvPr>
+          <p:cNvSpPr/>
+          <p:nvPr/>
+        </p:nvSpPr>
+        <p:spPr>
+          <a:xfrm>
+            <a:off x="1707161" y="4138570"/>
+            <a:ext cx="2432808" cy="1132513"/>
+          </a:xfrm>
+          <a:prstGeom prst="rect">
+            <a:avLst/>
+          </a:prstGeom>
+        </p:spPr>
+        <p:style>
+          <a:lnRef idx="2">
+            <a:schemeClr val="accent6">
+              <a:shade val="50000"/>
+            </a:schemeClr>
+          </a:lnRef>
+          <a:fillRef idx="1">
+            <a:schemeClr val="accent6"/>
+          </a:fillRef>
+          <a:effectRef idx="0">
+            <a:schemeClr val="accent6"/>
+          </a:effectRef>
+          <a:fontRef idx="minor">
+            <a:schemeClr val="lt1"/>
+          </a:fontRef>
+        </p:style>
+        <p:txBody>
+          <a:bodyPr rtlCol="0" anchor="ctr"/>
+          <a:lstStyle/>
+          <a:p>
+            <a:pPr algn="ctr"/>
+            <a:r>
+              <a:rPr lang="en-US" sz="1200" b="1" dirty="0"/>
+              <a:t>Cleveland Fed</a:t>
+            </a:r>
+          </a:p>
+          <a:p>
+            <a:pPr marL="285750" indent="-285750">
+              <a:buFont typeface="Arial" panose="020B0604020202020204" pitchFamily="34" charset="0"/>
+              <a:buChar char="•"/>
+            </a:pPr>
+            <a:r>
+              <a:rPr lang="en-US" sz="1200" dirty="0"/>
+              <a:t>Inflation</a:t>
+            </a:r>
+          </a:p>
+        </p:txBody>
+      </p:sp>
+      <p:sp>
+        <p:nvSpPr>
+          <p:cNvPr id="46" name="Rectangle 45">
+            <a:extLst>
+              <a:ext uri="{FF2B5EF4-FFF2-40B4-BE49-F238E27FC236}">
+                <a16:creationId xmlns:a16="http://schemas.microsoft.com/office/drawing/2014/main" id="{9C2895D4-0D74-4717-8328-8D5F53783AF3}"/>
+              </a:ext>
+            </a:extLst>
+          </p:cNvPr>
+          <p:cNvSpPr/>
+          <p:nvPr/>
+        </p:nvSpPr>
+        <p:spPr>
+          <a:xfrm>
+            <a:off x="4451759" y="4138568"/>
+            <a:ext cx="2432808" cy="1132513"/>
+          </a:xfrm>
+          <a:prstGeom prst="rect">
+            <a:avLst/>
+          </a:prstGeom>
+        </p:spPr>
+        <p:style>
+          <a:lnRef idx="2">
+            <a:schemeClr val="accent6">
+              <a:shade val="50000"/>
+            </a:schemeClr>
+          </a:lnRef>
+          <a:fillRef idx="1">
+            <a:schemeClr val="accent6"/>
+          </a:fillRef>
+          <a:effectRef idx="0">
+            <a:schemeClr val="accent6"/>
+          </a:effectRef>
+          <a:fontRef idx="minor">
+            <a:schemeClr val="lt1"/>
+          </a:fontRef>
+        </p:style>
+        <p:txBody>
+          <a:bodyPr rtlCol="0" anchor="ctr"/>
+          <a:lstStyle/>
+          <a:p>
+            <a:pPr algn="ctr"/>
+            <a:r>
+              <a:rPr lang="en-US" sz="1200" b="1" dirty="0"/>
+              <a:t>CME</a:t>
+            </a:r>
+          </a:p>
+          <a:p>
+            <a:pPr marL="285750" indent="-285750">
+              <a:buFont typeface="Arial" panose="020B0604020202020204" pitchFamily="34" charset="0"/>
+              <a:buChar char="•"/>
+            </a:pPr>
+            <a:r>
+              <a:rPr lang="en-US" sz="1200" dirty="0"/>
+              <a:t>SOFR</a:t>
+            </a:r>
+          </a:p>
+          <a:p>
+            <a:pPr marL="285750" indent="-285750">
+              <a:buFont typeface="Arial" panose="020B0604020202020204" pitchFamily="34" charset="0"/>
+              <a:buChar char="•"/>
+            </a:pPr>
+            <a:r>
+              <a:rPr lang="en-US" sz="1200" dirty="0"/>
+              <a:t>FFR</a:t>
+            </a:r>
+          </a:p>
+        </p:txBody>
+      </p:sp>
+    </p:spTree>
+    <p:extLst>
+      <p:ext uri="{BB962C8B-B14F-4D97-AF65-F5344CB8AC3E}">
+        <p14:creationId xmlns:p14="http://schemas.microsoft.com/office/powerpoint/2010/main" val="1203038714"/>
+      </p:ext>
+    </p:extLst>
+  </p:cSld>
+  <p:clrMapOvr>
+    <a:masterClrMapping/>
+  </p:clrMapOvr>
+</p:sld>
+</file>
+
+<file path=ppt/slides/slide2.xml><?xml version="1.0" encoding="utf-8"?>
+<p:sld xmlns:a="http://schemas.openxmlformats.org/drawingml/2006/main" xmlns:r="http://schemas.openxmlformats.org/officeDocument/2006/relationships" xmlns:p="http://schemas.openxmlformats.org/presentationml/2006/main">
+  <p:cSld>
+    <p:bg>
+      <p:bgPr>
         <a:gradFill>
           <a:gsLst>
             <a:gs pos="0">
@@ -3435,7 +4103,7 @@
         </p:nvSpPr>
         <p:spPr>
           <a:xfrm>
-            <a:off x="1707159" y="3906473"/>
+            <a:off x="1707159" y="4449408"/>
             <a:ext cx="2432808" cy="536895"/>
           </a:xfrm>
           <a:prstGeom prst="rect">
@@ -3484,8 +4152,8 @@
         </p:nvSpPr>
         <p:spPr>
           <a:xfrm>
-            <a:off x="1707161" y="3137484"/>
-            <a:ext cx="2432808" cy="536896"/>
+            <a:off x="1707159" y="2807349"/>
+            <a:ext cx="2432808" cy="1437341"/>
           </a:xfrm>
           <a:prstGeom prst="rect">
             <a:avLst/>
@@ -3515,6 +4183,66 @@
             <a:r>
               <a:rPr lang="en-US" sz="1200" b="1" dirty="0"/>
               <a:t>Create Calculated Variables</a:t>
+            </a:r>
+          </a:p>
+          <a:p>
+            <a:pPr marL="171450" indent="-171450" algn="ctr">
+              <a:buFontTx/>
+              <a:buChar char="-"/>
+            </a:pPr>
+            <a:r>
+              <a:rPr lang="en-US" sz="800" b="1" dirty="0"/>
+              <a:t>inf</a:t>
+            </a:r>
+          </a:p>
+          <a:p>
+            <a:pPr marL="171450" indent="-171450" algn="ctr">
+              <a:buFontTx/>
+              <a:buChar char="-"/>
+            </a:pPr>
+            <a:r>
+              <a:rPr lang="en-US" sz="800" b="1" dirty="0"/>
+              <a:t>tdns1, tdns2, tdns3</a:t>
+            </a:r>
+          </a:p>
+          <a:p>
+            <a:pPr marL="171450" indent="-171450" algn="ctr">
+              <a:buFontTx/>
+              <a:buChar char="-"/>
+            </a:pPr>
+            <a:r>
+              <a:rPr lang="en-US" sz="800" b="1" dirty="0"/>
+              <a:t>t03mffrspread</a:t>
+            </a:r>
+          </a:p>
+          <a:p>
+            <a:pPr marL="171450" indent="-171450" algn="ctr">
+              <a:buFontTx/>
+              <a:buChar char="-"/>
+            </a:pPr>
+            <a:r>
+              <a:rPr lang="en-US" sz="800" b="1" dirty="0"/>
+              <a:t>t10yt03mspread</a:t>
+            </a:r>
+          </a:p>
+          <a:p>
+            <a:pPr marL="171450" indent="-171450" algn="ctr">
+              <a:buFontTx/>
+              <a:buChar char="-"/>
+            </a:pPr>
+            <a:r>
+              <a:rPr lang="en-US" sz="800" b="1" dirty="0"/>
+              <a:t>mort30ymort15yspread</a:t>
+            </a:r>
+          </a:p>
+          <a:p>
+            <a:pPr marL="171450" indent="-171450" algn="ctr">
+              <a:buFontTx/>
+              <a:buChar char="-"/>
+            </a:pPr>
+            <a:r>
+              <a:rPr lang="en-US" sz="800" b="1" dirty="0"/>
+              <a:t>mort15yt10spread</a:t>
             </a:r>
           </a:p>
         </p:txBody>
@@ -3668,9 +4396,9 @@
           <p:nvPr/>
         </p:nvCxnSpPr>
         <p:spPr>
-          <a:xfrm>
-            <a:off x="2923565" y="2432807"/>
-            <a:ext cx="0" cy="704677"/>
+          <a:xfrm flipH="1">
+            <a:off x="2923563" y="2432807"/>
+            <a:ext cx="2" cy="374542"/>
           </a:xfrm>
           <a:prstGeom prst="straightConnector1">
             <a:avLst/>
@@ -3712,8 +4440,8 @@
         </p:nvCxnSpPr>
         <p:spPr>
           <a:xfrm flipV="1">
-            <a:off x="4139969" y="2487337"/>
-            <a:ext cx="295012" cy="918595"/>
+            <a:off x="4139967" y="2487337"/>
+            <a:ext cx="295014" cy="1038683"/>
           </a:xfrm>
           <a:prstGeom prst="bentConnector3">
             <a:avLst/>
@@ -3842,7 +4570,7 @@
         </p:nvSpPr>
         <p:spPr>
           <a:xfrm>
-            <a:off x="1707159" y="4647503"/>
+            <a:off x="1707159" y="5190438"/>
             <a:ext cx="2432808" cy="536895"/>
           </a:xfrm>
           <a:prstGeom prst="rect">
@@ -4011,7 +4739,7 @@
             <a:pPr algn="ctr"/>
             <a:r>
               <a:rPr lang="en-US" sz="1200" b="1" dirty="0"/>
-              <a:t>FFR, SOFR Forecast</a:t>
+              <a:t>FFR, SOFR Qual Forecasts</a:t>
             </a:r>
           </a:p>
         </p:txBody>
@@ -4034,7 +4762,7 @@
         <p:spPr>
           <a:xfrm flipV="1">
             <a:off x="4139967" y="3995955"/>
-            <a:ext cx="295013" cy="178966"/>
+            <a:ext cx="295013" cy="721901"/>
           </a:xfrm>
           <a:prstGeom prst="bentConnector3">
             <a:avLst/>
@@ -4067,15 +4795,18 @@
               </a:ext>
             </a:extLst>
           </p:cNvPr>
-          <p:cNvCxnSpPr/>
+          <p:cNvCxnSpPr>
+            <a:cxnSpLocks/>
+            <a:endCxn id="32" idx="2"/>
+          </p:cNvCxnSpPr>
           <p:nvPr/>
         </p:nvCxnSpPr>
         <p:spPr>
-          <a:xfrm>
-            <a:off x="4139967" y="4318233"/>
-            <a:ext cx="295013" cy="262156"/>
-          </a:xfrm>
-          <a:prstGeom prst="bentConnector3">
+          <a:xfrm flipV="1">
+            <a:off x="4139967" y="4848837"/>
+            <a:ext cx="978017" cy="49897"/>
+          </a:xfrm>
+          <a:prstGeom prst="bentConnector2">
             <a:avLst/>
           </a:prstGeom>
           <a:ln>
@@ -4162,8 +4893,8 @@
         </p:nvCxnSpPr>
         <p:spPr>
           <a:xfrm>
-            <a:off x="4139967" y="5029725"/>
-            <a:ext cx="295012" cy="521859"/>
+            <a:off x="4139967" y="5300024"/>
+            <a:ext cx="295012" cy="251560"/>
           </a:xfrm>
           <a:prstGeom prst="bentConnector3">
             <a:avLst/>
@@ -4517,7 +5248,7 @@
         <p:spPr>
           <a:xfrm flipV="1">
             <a:off x="4139967" y="2810313"/>
-            <a:ext cx="4862119" cy="2105638"/>
+            <a:ext cx="4862119" cy="2648573"/>
           </a:xfrm>
           <a:prstGeom prst="curvedConnector2">
             <a:avLst/>
@@ -4684,7 +5415,7 @@
 </p:sld>
 </file>
 
-<file path=ppt/slides/slide2.xml><?xml version="1.0" encoding="utf-8"?>
+<file path=ppt/slides/slide3.xml><?xml version="1.0" encoding="utf-8"?>
 <p:sld xmlns:a="http://schemas.openxmlformats.org/drawingml/2006/main" xmlns:r="http://schemas.openxmlformats.org/officeDocument/2006/relationships" xmlns:p="http://schemas.openxmlformats.org/presentationml/2006/main">
   <p:cSld>
     <p:spTree>
@@ -4749,7 +5480,7 @@
 </p:sld>
 </file>
 
-<file path=ppt/slides/slide3.xml><?xml version="1.0" encoding="utf-8"?>
+<file path=ppt/slides/slide4.xml><?xml version="1.0" encoding="utf-8"?>
 <p:sld xmlns:a="http://schemas.openxmlformats.org/drawingml/2006/main" xmlns:r="http://schemas.openxmlformats.org/officeDocument/2006/relationships" xmlns:p="http://schemas.openxmlformats.org/presentationml/2006/main">
   <p:cSld>
     <p:spTree>

</xml_diff>

<commit_message>
Added initial baseline qualitative forecasts (v0.14)
</commit_message>
<xml_diff>
--- a/documentation-templates/model-flow.pptx
+++ b/documentation-templates/model-flow.pptx
@@ -262,7 +262,7 @@
           <a:p>
             <a:fld id="{A7C790ED-1353-428C-9EC0-1379BDA992E3}" type="datetimeFigureOut">
               <a:rPr lang="en-US" smtClean="0"/>
-              <a:t>6/18/2021</a:t>
+              <a:t>6/24/2021</a:t>
             </a:fld>
             <a:endParaRPr lang="en-US"/>
           </a:p>
@@ -460,7 +460,7 @@
           <a:p>
             <a:fld id="{A7C790ED-1353-428C-9EC0-1379BDA992E3}" type="datetimeFigureOut">
               <a:rPr lang="en-US" smtClean="0"/>
-              <a:t>6/18/2021</a:t>
+              <a:t>6/24/2021</a:t>
             </a:fld>
             <a:endParaRPr lang="en-US"/>
           </a:p>
@@ -668,7 +668,7 @@
           <a:p>
             <a:fld id="{A7C790ED-1353-428C-9EC0-1379BDA992E3}" type="datetimeFigureOut">
               <a:rPr lang="en-US" smtClean="0"/>
-              <a:t>6/18/2021</a:t>
+              <a:t>6/24/2021</a:t>
             </a:fld>
             <a:endParaRPr lang="en-US"/>
           </a:p>
@@ -866,7 +866,7 @@
           <a:p>
             <a:fld id="{A7C790ED-1353-428C-9EC0-1379BDA992E3}" type="datetimeFigureOut">
               <a:rPr lang="en-US" smtClean="0"/>
-              <a:t>6/18/2021</a:t>
+              <a:t>6/24/2021</a:t>
             </a:fld>
             <a:endParaRPr lang="en-US"/>
           </a:p>
@@ -1141,7 +1141,7 @@
           <a:p>
             <a:fld id="{A7C790ED-1353-428C-9EC0-1379BDA992E3}" type="datetimeFigureOut">
               <a:rPr lang="en-US" smtClean="0"/>
-              <a:t>6/18/2021</a:t>
+              <a:t>6/24/2021</a:t>
             </a:fld>
             <a:endParaRPr lang="en-US"/>
           </a:p>
@@ -1406,7 +1406,7 @@
           <a:p>
             <a:fld id="{A7C790ED-1353-428C-9EC0-1379BDA992E3}" type="datetimeFigureOut">
               <a:rPr lang="en-US" smtClean="0"/>
-              <a:t>6/18/2021</a:t>
+              <a:t>6/24/2021</a:t>
             </a:fld>
             <a:endParaRPr lang="en-US"/>
           </a:p>
@@ -1818,7 +1818,7 @@
           <a:p>
             <a:fld id="{A7C790ED-1353-428C-9EC0-1379BDA992E3}" type="datetimeFigureOut">
               <a:rPr lang="en-US" smtClean="0"/>
-              <a:t>6/18/2021</a:t>
+              <a:t>6/24/2021</a:t>
             </a:fld>
             <a:endParaRPr lang="en-US"/>
           </a:p>
@@ -1959,7 +1959,7 @@
           <a:p>
             <a:fld id="{A7C790ED-1353-428C-9EC0-1379BDA992E3}" type="datetimeFigureOut">
               <a:rPr lang="en-US" smtClean="0"/>
-              <a:t>6/18/2021</a:t>
+              <a:t>6/24/2021</a:t>
             </a:fld>
             <a:endParaRPr lang="en-US"/>
           </a:p>
@@ -2072,7 +2072,7 @@
           <a:p>
             <a:fld id="{A7C790ED-1353-428C-9EC0-1379BDA992E3}" type="datetimeFigureOut">
               <a:rPr lang="en-US" smtClean="0"/>
-              <a:t>6/18/2021</a:t>
+              <a:t>6/24/2021</a:t>
             </a:fld>
             <a:endParaRPr lang="en-US"/>
           </a:p>
@@ -2383,7 +2383,7 @@
           <a:p>
             <a:fld id="{A7C790ED-1353-428C-9EC0-1379BDA992E3}" type="datetimeFigureOut">
               <a:rPr lang="en-US" smtClean="0"/>
-              <a:t>6/18/2021</a:t>
+              <a:t>6/24/2021</a:t>
             </a:fld>
             <a:endParaRPr lang="en-US"/>
           </a:p>
@@ -2671,7 +2671,7 @@
           <a:p>
             <a:fld id="{A7C790ED-1353-428C-9EC0-1379BDA992E3}" type="datetimeFigureOut">
               <a:rPr lang="en-US" smtClean="0"/>
-              <a:t>6/18/2021</a:t>
+              <a:t>6/24/2021</a:t>
             </a:fld>
             <a:endParaRPr lang="en-US"/>
           </a:p>
@@ -2912,7 +2912,7 @@
           <a:p>
             <a:fld id="{A7C790ED-1353-428C-9EC0-1379BDA992E3}" type="datetimeFigureOut">
               <a:rPr lang="en-US" smtClean="0"/>
-              <a:t>6/18/2021</a:t>
+              <a:t>6/24/2021</a:t>
             </a:fld>
             <a:endParaRPr lang="en-US"/>
           </a:p>
@@ -4739,7 +4739,15 @@
             <a:pPr algn="ctr"/>
             <a:r>
               <a:rPr lang="en-US" sz="1200" b="1" dirty="0"/>
-              <a:t>FFR, SOFR Qual Forecasts</a:t>
+              <a:t>FFR, </a:t>
+            </a:r>
+            <a:r>
+              <a:rPr lang="en-US" sz="1200" b="1"/>
+              <a:t>SOFR Baseline </a:t>
+            </a:r>
+            <a:r>
+              <a:rPr lang="en-US" sz="1200" b="1" dirty="0"/>
+              <a:t>Forecasts</a:t>
             </a:r>
           </a:p>
         </p:txBody>

</xml_diff>

<commit_message>
Added initial SEM estimation and some SEM docs (v0.14)
</commit_message>
<xml_diff>
--- a/documentation-templates/model-flow.pptx
+++ b/documentation-templates/model-flow.pptx
@@ -5,10 +5,11 @@
     <p:sldMasterId id="2147483648" r:id="rId1"/>
   </p:sldMasterIdLst>
   <p:sldIdLst>
-    <p:sldId id="260" r:id="rId2"/>
-    <p:sldId id="256" r:id="rId3"/>
-    <p:sldId id="257" r:id="rId4"/>
-    <p:sldId id="258" r:id="rId5"/>
+    <p:sldId id="261" r:id="rId2"/>
+    <p:sldId id="260" r:id="rId3"/>
+    <p:sldId id="256" r:id="rId4"/>
+    <p:sldId id="257" r:id="rId5"/>
+    <p:sldId id="258" r:id="rId6"/>
   </p:sldIdLst>
   <p:sldSz cx="12192000" cy="6858000"/>
   <p:notesSz cx="6858000" cy="9144000"/>
@@ -262,7 +263,7 @@
           <a:p>
             <a:fld id="{A7C790ED-1353-428C-9EC0-1379BDA992E3}" type="datetimeFigureOut">
               <a:rPr lang="en-US" smtClean="0"/>
-              <a:t>6/24/2021</a:t>
+              <a:t>6/25/2021</a:t>
             </a:fld>
             <a:endParaRPr lang="en-US"/>
           </a:p>
@@ -460,7 +461,7 @@
           <a:p>
             <a:fld id="{A7C790ED-1353-428C-9EC0-1379BDA992E3}" type="datetimeFigureOut">
               <a:rPr lang="en-US" smtClean="0"/>
-              <a:t>6/24/2021</a:t>
+              <a:t>6/25/2021</a:t>
             </a:fld>
             <a:endParaRPr lang="en-US"/>
           </a:p>
@@ -668,7 +669,7 @@
           <a:p>
             <a:fld id="{A7C790ED-1353-428C-9EC0-1379BDA992E3}" type="datetimeFigureOut">
               <a:rPr lang="en-US" smtClean="0"/>
-              <a:t>6/24/2021</a:t>
+              <a:t>6/25/2021</a:t>
             </a:fld>
             <a:endParaRPr lang="en-US"/>
           </a:p>
@@ -866,7 +867,7 @@
           <a:p>
             <a:fld id="{A7C790ED-1353-428C-9EC0-1379BDA992E3}" type="datetimeFigureOut">
               <a:rPr lang="en-US" smtClean="0"/>
-              <a:t>6/24/2021</a:t>
+              <a:t>6/25/2021</a:t>
             </a:fld>
             <a:endParaRPr lang="en-US"/>
           </a:p>
@@ -1141,7 +1142,7 @@
           <a:p>
             <a:fld id="{A7C790ED-1353-428C-9EC0-1379BDA992E3}" type="datetimeFigureOut">
               <a:rPr lang="en-US" smtClean="0"/>
-              <a:t>6/24/2021</a:t>
+              <a:t>6/25/2021</a:t>
             </a:fld>
             <a:endParaRPr lang="en-US"/>
           </a:p>
@@ -1406,7 +1407,7 @@
           <a:p>
             <a:fld id="{A7C790ED-1353-428C-9EC0-1379BDA992E3}" type="datetimeFigureOut">
               <a:rPr lang="en-US" smtClean="0"/>
-              <a:t>6/24/2021</a:t>
+              <a:t>6/25/2021</a:t>
             </a:fld>
             <a:endParaRPr lang="en-US"/>
           </a:p>
@@ -1818,7 +1819,7 @@
           <a:p>
             <a:fld id="{A7C790ED-1353-428C-9EC0-1379BDA992E3}" type="datetimeFigureOut">
               <a:rPr lang="en-US" smtClean="0"/>
-              <a:t>6/24/2021</a:t>
+              <a:t>6/25/2021</a:t>
             </a:fld>
             <a:endParaRPr lang="en-US"/>
           </a:p>
@@ -1959,7 +1960,7 @@
           <a:p>
             <a:fld id="{A7C790ED-1353-428C-9EC0-1379BDA992E3}" type="datetimeFigureOut">
               <a:rPr lang="en-US" smtClean="0"/>
-              <a:t>6/24/2021</a:t>
+              <a:t>6/25/2021</a:t>
             </a:fld>
             <a:endParaRPr lang="en-US"/>
           </a:p>
@@ -2072,7 +2073,7 @@
           <a:p>
             <a:fld id="{A7C790ED-1353-428C-9EC0-1379BDA992E3}" type="datetimeFigureOut">
               <a:rPr lang="en-US" smtClean="0"/>
-              <a:t>6/24/2021</a:t>
+              <a:t>6/25/2021</a:t>
             </a:fld>
             <a:endParaRPr lang="en-US"/>
           </a:p>
@@ -2383,7 +2384,7 @@
           <a:p>
             <a:fld id="{A7C790ED-1353-428C-9EC0-1379BDA992E3}" type="datetimeFigureOut">
               <a:rPr lang="en-US" smtClean="0"/>
-              <a:t>6/24/2021</a:t>
+              <a:t>6/25/2021</a:t>
             </a:fld>
             <a:endParaRPr lang="en-US"/>
           </a:p>
@@ -2671,7 +2672,7 @@
           <a:p>
             <a:fld id="{A7C790ED-1353-428C-9EC0-1379BDA992E3}" type="datetimeFigureOut">
               <a:rPr lang="en-US" smtClean="0"/>
-              <a:t>6/24/2021</a:t>
+              <a:t>6/25/2021</a:t>
             </a:fld>
             <a:endParaRPr lang="en-US"/>
           </a:p>
@@ -2912,7 +2913,7 @@
           <a:p>
             <a:fld id="{A7C790ED-1353-428C-9EC0-1379BDA992E3}" type="datetimeFigureOut">
               <a:rPr lang="en-US" smtClean="0"/>
-              <a:t>6/24/2021</a:t>
+              <a:t>6/25/2021</a:t>
             </a:fld>
             <a:endParaRPr lang="en-US"/>
           </a:p>
@@ -3315,6 +3316,640 @@
 <file path=ppt/slides/slide1.xml><?xml version="1.0" encoding="utf-8"?>
 <p:sld xmlns:a="http://schemas.openxmlformats.org/drawingml/2006/main" xmlns:r="http://schemas.openxmlformats.org/officeDocument/2006/relationships" xmlns:p="http://schemas.openxmlformats.org/presentationml/2006/main">
   <p:cSld>
+    <p:spTree>
+      <p:nvGrpSpPr>
+        <p:cNvPr id="1" name=""/>
+        <p:cNvGrpSpPr/>
+        <p:nvPr/>
+      </p:nvGrpSpPr>
+      <p:grpSpPr>
+        <a:xfrm>
+          <a:off x="0" y="0"/>
+          <a:ext cx="0" cy="0"/>
+          <a:chOff x="0" y="0"/>
+          <a:chExt cx="0" cy="0"/>
+        </a:xfrm>
+      </p:grpSpPr>
+      <p:sp>
+        <p:nvSpPr>
+          <p:cNvPr id="83" name="TextBox 82">
+            <a:extLst>
+              <a:ext uri="{FF2B5EF4-FFF2-40B4-BE49-F238E27FC236}">
+                <a16:creationId xmlns:a16="http://schemas.microsoft.com/office/drawing/2014/main" id="{3A5CB05C-7F9C-4925-A172-8D5CD96F04B1}"/>
+              </a:ext>
+            </a:extLst>
+          </p:cNvPr>
+          <p:cNvSpPr txBox="1"/>
+          <p:nvPr/>
+        </p:nvSpPr>
+        <p:spPr>
+          <a:xfrm>
+            <a:off x="4287473" y="451284"/>
+            <a:ext cx="3061283" cy="369332"/>
+          </a:xfrm>
+          <a:prstGeom prst="rect">
+            <a:avLst/>
+          </a:prstGeom>
+          <a:noFill/>
+        </p:spPr>
+        <p:txBody>
+          <a:bodyPr wrap="square" rtlCol="0">
+            <a:spAutoFit/>
+          </a:bodyPr>
+          <a:lstStyle/>
+          <a:p>
+            <a:r>
+              <a:rPr lang="en-US" dirty="0"/>
+              <a:t>Updated Model</a:t>
+            </a:r>
+          </a:p>
+        </p:txBody>
+      </p:sp>
+      <p:sp>
+        <p:nvSpPr>
+          <p:cNvPr id="2" name="Rectangle 1">
+            <a:extLst>
+              <a:ext uri="{FF2B5EF4-FFF2-40B4-BE49-F238E27FC236}">
+                <a16:creationId xmlns:a16="http://schemas.microsoft.com/office/drawing/2014/main" id="{9194FF74-EA7C-4DD6-95FA-1F954E9F7913}"/>
+              </a:ext>
+            </a:extLst>
+          </p:cNvPr>
+          <p:cNvSpPr/>
+          <p:nvPr/>
+        </p:nvSpPr>
+        <p:spPr>
+          <a:xfrm>
+            <a:off x="906011" y="989901"/>
+            <a:ext cx="2080469" cy="310393"/>
+          </a:xfrm>
+          <a:prstGeom prst="rect">
+            <a:avLst/>
+          </a:prstGeom>
+        </p:spPr>
+        <p:style>
+          <a:lnRef idx="2">
+            <a:schemeClr val="accent1">
+              <a:shade val="50000"/>
+            </a:schemeClr>
+          </a:lnRef>
+          <a:fillRef idx="1">
+            <a:schemeClr val="accent1"/>
+          </a:fillRef>
+          <a:effectRef idx="0">
+            <a:schemeClr val="accent1"/>
+          </a:effectRef>
+          <a:fontRef idx="minor">
+            <a:schemeClr val="lt1"/>
+          </a:fontRef>
+        </p:style>
+        <p:txBody>
+          <a:bodyPr rtlCol="0" anchor="ctr"/>
+          <a:lstStyle/>
+          <a:p>
+            <a:pPr algn="ctr"/>
+            <a:r>
+              <a:rPr lang="en-US" sz="1200" dirty="0"/>
+              <a:t>Pull Historical Data</a:t>
+            </a:r>
+          </a:p>
+        </p:txBody>
+      </p:sp>
+      <p:cxnSp>
+        <p:nvCxnSpPr>
+          <p:cNvPr id="4" name="Straight Arrow Connector 3">
+            <a:extLst>
+              <a:ext uri="{FF2B5EF4-FFF2-40B4-BE49-F238E27FC236}">
+                <a16:creationId xmlns:a16="http://schemas.microsoft.com/office/drawing/2014/main" id="{29606B93-B1FE-45A2-936E-70C18D395DB9}"/>
+              </a:ext>
+            </a:extLst>
+          </p:cNvPr>
+          <p:cNvCxnSpPr>
+            <a:cxnSpLocks/>
+            <a:stCxn id="2" idx="3"/>
+            <a:endCxn id="9" idx="1"/>
+          </p:cNvCxnSpPr>
+          <p:nvPr/>
+        </p:nvCxnSpPr>
+        <p:spPr>
+          <a:xfrm>
+            <a:off x="2986480" y="1145098"/>
+            <a:ext cx="469784" cy="0"/>
+          </a:xfrm>
+          <a:prstGeom prst="straightConnector1">
+            <a:avLst/>
+          </a:prstGeom>
+          <a:ln>
+            <a:tailEnd type="triangle"/>
+          </a:ln>
+        </p:spPr>
+        <p:style>
+          <a:lnRef idx="1">
+            <a:schemeClr val="accent1"/>
+          </a:lnRef>
+          <a:fillRef idx="0">
+            <a:schemeClr val="accent1"/>
+          </a:fillRef>
+          <a:effectRef idx="0">
+            <a:schemeClr val="accent1"/>
+          </a:effectRef>
+          <a:fontRef idx="minor">
+            <a:schemeClr val="tx1"/>
+          </a:fontRef>
+        </p:style>
+      </p:cxnSp>
+      <p:sp>
+        <p:nvSpPr>
+          <p:cNvPr id="7" name="Rectangle 6">
+            <a:extLst>
+              <a:ext uri="{FF2B5EF4-FFF2-40B4-BE49-F238E27FC236}">
+                <a16:creationId xmlns:a16="http://schemas.microsoft.com/office/drawing/2014/main" id="{85151842-160C-4CF8-BE65-F43EEBABCE58}"/>
+              </a:ext>
+            </a:extLst>
+          </p:cNvPr>
+          <p:cNvSpPr/>
+          <p:nvPr/>
+        </p:nvSpPr>
+        <p:spPr>
+          <a:xfrm>
+            <a:off x="788565" y="4773335"/>
+            <a:ext cx="2080469" cy="310393"/>
+          </a:xfrm>
+          <a:prstGeom prst="rect">
+            <a:avLst/>
+          </a:prstGeom>
+        </p:spPr>
+        <p:style>
+          <a:lnRef idx="2">
+            <a:schemeClr val="accent1">
+              <a:shade val="50000"/>
+            </a:schemeClr>
+          </a:lnRef>
+          <a:fillRef idx="1">
+            <a:schemeClr val="accent1"/>
+          </a:fillRef>
+          <a:effectRef idx="0">
+            <a:schemeClr val="accent1"/>
+          </a:effectRef>
+          <a:fontRef idx="minor">
+            <a:schemeClr val="lt1"/>
+          </a:fontRef>
+        </p:style>
+        <p:txBody>
+          <a:bodyPr rtlCol="0" anchor="ctr"/>
+          <a:lstStyle/>
+          <a:p>
+            <a:pPr algn="ctr"/>
+            <a:r>
+              <a:rPr lang="en-US" sz="1200" dirty="0"/>
+              <a:t>Pull External Forecasts</a:t>
+            </a:r>
+          </a:p>
+        </p:txBody>
+      </p:sp>
+      <p:sp>
+        <p:nvSpPr>
+          <p:cNvPr id="9" name="Rectangle 8">
+            <a:extLst>
+              <a:ext uri="{FF2B5EF4-FFF2-40B4-BE49-F238E27FC236}">
+                <a16:creationId xmlns:a16="http://schemas.microsoft.com/office/drawing/2014/main" id="{D2278DC8-DC51-403E-85F8-A3AD33216527}"/>
+              </a:ext>
+            </a:extLst>
+          </p:cNvPr>
+          <p:cNvSpPr/>
+          <p:nvPr/>
+        </p:nvSpPr>
+        <p:spPr>
+          <a:xfrm>
+            <a:off x="3456264" y="989901"/>
+            <a:ext cx="2080469" cy="310393"/>
+          </a:xfrm>
+          <a:prstGeom prst="rect">
+            <a:avLst/>
+          </a:prstGeom>
+        </p:spPr>
+        <p:style>
+          <a:lnRef idx="2">
+            <a:schemeClr val="accent1">
+              <a:shade val="50000"/>
+            </a:schemeClr>
+          </a:lnRef>
+          <a:fillRef idx="1">
+            <a:schemeClr val="accent1"/>
+          </a:fillRef>
+          <a:effectRef idx="0">
+            <a:schemeClr val="accent1"/>
+          </a:effectRef>
+          <a:fontRef idx="minor">
+            <a:schemeClr val="lt1"/>
+          </a:fontRef>
+        </p:style>
+        <p:txBody>
+          <a:bodyPr rtlCol="0" anchor="ctr"/>
+          <a:lstStyle/>
+          <a:p>
+            <a:pPr algn="ctr"/>
+            <a:r>
+              <a:rPr lang="en-US" sz="1200" dirty="0"/>
+              <a:t>Create Calculated Variables</a:t>
+            </a:r>
+          </a:p>
+        </p:txBody>
+      </p:sp>
+      <p:cxnSp>
+        <p:nvCxnSpPr>
+          <p:cNvPr id="17" name="Straight Arrow Connector 16">
+            <a:extLst>
+              <a:ext uri="{FF2B5EF4-FFF2-40B4-BE49-F238E27FC236}">
+                <a16:creationId xmlns:a16="http://schemas.microsoft.com/office/drawing/2014/main" id="{22FDC700-B916-4155-A6EF-740258D094DD}"/>
+              </a:ext>
+            </a:extLst>
+          </p:cNvPr>
+          <p:cNvCxnSpPr>
+            <a:cxnSpLocks/>
+            <a:stCxn id="2" idx="2"/>
+          </p:cNvCxnSpPr>
+          <p:nvPr/>
+        </p:nvCxnSpPr>
+        <p:spPr>
+          <a:xfrm>
+            <a:off x="1946246" y="1300294"/>
+            <a:ext cx="0" cy="461394"/>
+          </a:xfrm>
+          <a:prstGeom prst="straightConnector1">
+            <a:avLst/>
+          </a:prstGeom>
+          <a:ln>
+            <a:tailEnd type="triangle"/>
+          </a:ln>
+        </p:spPr>
+        <p:style>
+          <a:lnRef idx="1">
+            <a:schemeClr val="accent1"/>
+          </a:lnRef>
+          <a:fillRef idx="0">
+            <a:schemeClr val="accent1"/>
+          </a:fillRef>
+          <a:effectRef idx="0">
+            <a:schemeClr val="accent1"/>
+          </a:effectRef>
+          <a:fontRef idx="minor">
+            <a:schemeClr val="tx1"/>
+          </a:fontRef>
+        </p:style>
+      </p:cxnSp>
+      <p:sp>
+        <p:nvSpPr>
+          <p:cNvPr id="20" name="Rectangle 19">
+            <a:extLst>
+              <a:ext uri="{FF2B5EF4-FFF2-40B4-BE49-F238E27FC236}">
+                <a16:creationId xmlns:a16="http://schemas.microsoft.com/office/drawing/2014/main" id="{5F59EA85-26B5-47C8-965D-FA4A09BC5DE9}"/>
+              </a:ext>
+            </a:extLst>
+          </p:cNvPr>
+          <p:cNvSpPr/>
+          <p:nvPr/>
+        </p:nvSpPr>
+        <p:spPr>
+          <a:xfrm>
+            <a:off x="906011" y="1761688"/>
+            <a:ext cx="2080469" cy="310393"/>
+          </a:xfrm>
+          <a:prstGeom prst="rect">
+            <a:avLst/>
+          </a:prstGeom>
+        </p:spPr>
+        <p:style>
+          <a:lnRef idx="2">
+            <a:schemeClr val="accent1">
+              <a:shade val="50000"/>
+            </a:schemeClr>
+          </a:lnRef>
+          <a:fillRef idx="1">
+            <a:schemeClr val="accent1"/>
+          </a:fillRef>
+          <a:effectRef idx="0">
+            <a:schemeClr val="accent1"/>
+          </a:effectRef>
+          <a:fontRef idx="minor">
+            <a:schemeClr val="lt1"/>
+          </a:fontRef>
+        </p:style>
+        <p:txBody>
+          <a:bodyPr rtlCol="0" anchor="ctr"/>
+          <a:lstStyle/>
+          <a:p>
+            <a:pPr algn="ctr"/>
+            <a:r>
+              <a:rPr lang="en-US" sz="1200" dirty="0"/>
+              <a:t>Conduct Nowcasts</a:t>
+            </a:r>
+          </a:p>
+        </p:txBody>
+      </p:sp>
+      <p:cxnSp>
+        <p:nvCxnSpPr>
+          <p:cNvPr id="21" name="Straight Arrow Connector 20">
+            <a:extLst>
+              <a:ext uri="{FF2B5EF4-FFF2-40B4-BE49-F238E27FC236}">
+                <a16:creationId xmlns:a16="http://schemas.microsoft.com/office/drawing/2014/main" id="{A84EACFB-7388-4E9F-A426-2FDCDCE78EEC}"/>
+              </a:ext>
+            </a:extLst>
+          </p:cNvPr>
+          <p:cNvCxnSpPr>
+            <a:cxnSpLocks/>
+            <a:stCxn id="20" idx="3"/>
+            <a:endCxn id="28" idx="1"/>
+          </p:cNvCxnSpPr>
+          <p:nvPr/>
+        </p:nvCxnSpPr>
+        <p:spPr>
+          <a:xfrm>
+            <a:off x="2986480" y="1916885"/>
+            <a:ext cx="260758" cy="310393"/>
+          </a:xfrm>
+          <a:prstGeom prst="straightConnector1">
+            <a:avLst/>
+          </a:prstGeom>
+          <a:ln>
+            <a:tailEnd type="triangle"/>
+          </a:ln>
+        </p:spPr>
+        <p:style>
+          <a:lnRef idx="1">
+            <a:schemeClr val="accent1"/>
+          </a:lnRef>
+          <a:fillRef idx="0">
+            <a:schemeClr val="accent1"/>
+          </a:fillRef>
+          <a:effectRef idx="0">
+            <a:schemeClr val="accent1"/>
+          </a:effectRef>
+          <a:fontRef idx="minor">
+            <a:schemeClr val="tx1"/>
+          </a:fontRef>
+        </p:style>
+      </p:cxnSp>
+      <p:cxnSp>
+        <p:nvCxnSpPr>
+          <p:cNvPr id="24" name="Straight Arrow Connector 23">
+            <a:extLst>
+              <a:ext uri="{FF2B5EF4-FFF2-40B4-BE49-F238E27FC236}">
+                <a16:creationId xmlns:a16="http://schemas.microsoft.com/office/drawing/2014/main" id="{C925C57D-6449-4680-A421-FF4AC0C9C039}"/>
+              </a:ext>
+            </a:extLst>
+          </p:cNvPr>
+          <p:cNvCxnSpPr>
+            <a:cxnSpLocks/>
+            <a:stCxn id="9" idx="2"/>
+            <a:endCxn id="28" idx="0"/>
+          </p:cNvCxnSpPr>
+          <p:nvPr/>
+        </p:nvCxnSpPr>
+        <p:spPr>
+          <a:xfrm flipH="1">
+            <a:off x="4287473" y="1300294"/>
+            <a:ext cx="209026" cy="771787"/>
+          </a:xfrm>
+          <a:prstGeom prst="straightConnector1">
+            <a:avLst/>
+          </a:prstGeom>
+          <a:ln>
+            <a:tailEnd type="triangle"/>
+          </a:ln>
+        </p:spPr>
+        <p:style>
+          <a:lnRef idx="1">
+            <a:schemeClr val="accent1"/>
+          </a:lnRef>
+          <a:fillRef idx="0">
+            <a:schemeClr val="accent1"/>
+          </a:fillRef>
+          <a:effectRef idx="0">
+            <a:schemeClr val="accent1"/>
+          </a:effectRef>
+          <a:fontRef idx="minor">
+            <a:schemeClr val="tx1"/>
+          </a:fontRef>
+        </p:style>
+      </p:cxnSp>
+      <p:sp>
+        <p:nvSpPr>
+          <p:cNvPr id="28" name="Rectangle 27">
+            <a:extLst>
+              <a:ext uri="{FF2B5EF4-FFF2-40B4-BE49-F238E27FC236}">
+                <a16:creationId xmlns:a16="http://schemas.microsoft.com/office/drawing/2014/main" id="{2ACEA74B-7663-4262-8373-B6DA6B6D7457}"/>
+              </a:ext>
+            </a:extLst>
+          </p:cNvPr>
+          <p:cNvSpPr/>
+          <p:nvPr/>
+        </p:nvSpPr>
+        <p:spPr>
+          <a:xfrm>
+            <a:off x="3247238" y="2072081"/>
+            <a:ext cx="2080469" cy="310393"/>
+          </a:xfrm>
+          <a:prstGeom prst="rect">
+            <a:avLst/>
+          </a:prstGeom>
+        </p:spPr>
+        <p:style>
+          <a:lnRef idx="2">
+            <a:schemeClr val="accent1">
+              <a:shade val="50000"/>
+            </a:schemeClr>
+          </a:lnRef>
+          <a:fillRef idx="1">
+            <a:schemeClr val="accent1"/>
+          </a:fillRef>
+          <a:effectRef idx="0">
+            <a:schemeClr val="accent1"/>
+          </a:effectRef>
+          <a:fontRef idx="minor">
+            <a:schemeClr val="lt1"/>
+          </a:fontRef>
+        </p:style>
+        <p:txBody>
+          <a:bodyPr rtlCol="0" anchor="ctr"/>
+          <a:lstStyle/>
+          <a:p>
+            <a:pPr algn="ctr"/>
+            <a:r>
+              <a:rPr lang="en-US" sz="1200" dirty="0"/>
+              <a:t>Create Structural Model</a:t>
+            </a:r>
+          </a:p>
+        </p:txBody>
+      </p:sp>
+      <p:sp>
+        <p:nvSpPr>
+          <p:cNvPr id="33" name="Rectangle 32">
+            <a:extLst>
+              <a:ext uri="{FF2B5EF4-FFF2-40B4-BE49-F238E27FC236}">
+                <a16:creationId xmlns:a16="http://schemas.microsoft.com/office/drawing/2014/main" id="{D4375D7F-2583-4030-9CCA-AAD8200EE5D2}"/>
+              </a:ext>
+            </a:extLst>
+          </p:cNvPr>
+          <p:cNvSpPr/>
+          <p:nvPr/>
+        </p:nvSpPr>
+        <p:spPr>
+          <a:xfrm>
+            <a:off x="3247238" y="2857954"/>
+            <a:ext cx="2080469" cy="310393"/>
+          </a:xfrm>
+          <a:prstGeom prst="rect">
+            <a:avLst/>
+          </a:prstGeom>
+        </p:spPr>
+        <p:style>
+          <a:lnRef idx="2">
+            <a:schemeClr val="accent1">
+              <a:shade val="50000"/>
+            </a:schemeClr>
+          </a:lnRef>
+          <a:fillRef idx="1">
+            <a:schemeClr val="accent1"/>
+          </a:fillRef>
+          <a:effectRef idx="0">
+            <a:schemeClr val="accent1"/>
+          </a:effectRef>
+          <a:fontRef idx="minor">
+            <a:schemeClr val="lt1"/>
+          </a:fontRef>
+        </p:style>
+        <p:txBody>
+          <a:bodyPr rtlCol="0" anchor="ctr"/>
+          <a:lstStyle/>
+          <a:p>
+            <a:pPr algn="ctr"/>
+            <a:r>
+              <a:rPr lang="en-US" sz="1200" dirty="0" err="1"/>
+              <a:t>Exogenize</a:t>
+            </a:r>
+            <a:r>
+              <a:rPr lang="en-US" sz="1200" dirty="0"/>
+              <a:t> Inputs (Flexibly for Variables &amp; Dates)</a:t>
+            </a:r>
+          </a:p>
+        </p:txBody>
+      </p:sp>
+      <p:cxnSp>
+        <p:nvCxnSpPr>
+          <p:cNvPr id="15" name="Straight Arrow Connector 14">
+            <a:extLst>
+              <a:ext uri="{FF2B5EF4-FFF2-40B4-BE49-F238E27FC236}">
+                <a16:creationId xmlns:a16="http://schemas.microsoft.com/office/drawing/2014/main" id="{86AA03D7-41C8-4057-817B-50B62DBEAD80}"/>
+              </a:ext>
+            </a:extLst>
+          </p:cNvPr>
+          <p:cNvCxnSpPr>
+            <a:cxnSpLocks/>
+            <a:stCxn id="28" idx="2"/>
+            <a:endCxn id="33" idx="0"/>
+          </p:cNvCxnSpPr>
+          <p:nvPr/>
+        </p:nvCxnSpPr>
+        <p:spPr>
+          <a:xfrm>
+            <a:off x="4287473" y="2382474"/>
+            <a:ext cx="0" cy="475480"/>
+          </a:xfrm>
+          <a:prstGeom prst="straightConnector1">
+            <a:avLst/>
+          </a:prstGeom>
+          <a:ln>
+            <a:tailEnd type="triangle"/>
+          </a:ln>
+        </p:spPr>
+        <p:style>
+          <a:lnRef idx="1">
+            <a:schemeClr val="accent1"/>
+          </a:lnRef>
+          <a:fillRef idx="0">
+            <a:schemeClr val="accent1"/>
+          </a:fillRef>
+          <a:effectRef idx="0">
+            <a:schemeClr val="accent1"/>
+          </a:effectRef>
+          <a:fontRef idx="minor">
+            <a:schemeClr val="tx1"/>
+          </a:fontRef>
+        </p:style>
+      </p:cxnSp>
+      <p:sp>
+        <p:nvSpPr>
+          <p:cNvPr id="19" name="Rectangle 18">
+            <a:extLst>
+              <a:ext uri="{FF2B5EF4-FFF2-40B4-BE49-F238E27FC236}">
+                <a16:creationId xmlns:a16="http://schemas.microsoft.com/office/drawing/2014/main" id="{57CDE3F9-E00A-4752-AE2E-11EDF3843C0B}"/>
+              </a:ext>
+            </a:extLst>
+          </p:cNvPr>
+          <p:cNvSpPr/>
+          <p:nvPr/>
+        </p:nvSpPr>
+        <p:spPr>
+          <a:xfrm>
+            <a:off x="4391986" y="2465017"/>
+            <a:ext cx="2080469" cy="310393"/>
+          </a:xfrm>
+          <a:prstGeom prst="rect">
+            <a:avLst/>
+          </a:prstGeom>
+        </p:spPr>
+        <p:style>
+          <a:lnRef idx="2">
+            <a:schemeClr val="accent1">
+              <a:shade val="50000"/>
+            </a:schemeClr>
+          </a:lnRef>
+          <a:fillRef idx="1">
+            <a:schemeClr val="accent1"/>
+          </a:fillRef>
+          <a:effectRef idx="0">
+            <a:schemeClr val="accent1"/>
+          </a:effectRef>
+          <a:fontRef idx="minor">
+            <a:schemeClr val="lt1"/>
+          </a:fontRef>
+        </p:style>
+        <p:txBody>
+          <a:bodyPr rtlCol="0" anchor="ctr"/>
+          <a:lstStyle/>
+          <a:p>
+            <a:pPr algn="ctr"/>
+            <a:r>
+              <a:rPr lang="en-US" sz="1200" dirty="0"/>
+              <a:t>Note Recommended </a:t>
+            </a:r>
+            <a:r>
+              <a:rPr lang="en-US" sz="1200" dirty="0" err="1"/>
+              <a:t>Exogenized</a:t>
+            </a:r>
+            <a:r>
+              <a:rPr lang="en-US" sz="1200" dirty="0"/>
+              <a:t> Variables</a:t>
+            </a:r>
+          </a:p>
+        </p:txBody>
+      </p:sp>
+    </p:spTree>
+    <p:extLst>
+      <p:ext uri="{BB962C8B-B14F-4D97-AF65-F5344CB8AC3E}">
+        <p14:creationId xmlns:p14="http://schemas.microsoft.com/office/powerpoint/2010/main" val="1026517935"/>
+      </p:ext>
+    </p:extLst>
+  </p:cSld>
+  <p:clrMapOvr>
+    <a:masterClrMapping/>
+  </p:clrMapOvr>
+</p:sld>
+</file>
+
+<file path=ppt/slides/slide2.xml><?xml version="1.0" encoding="utf-8"?>
+<p:sld xmlns:a="http://schemas.openxmlformats.org/drawingml/2006/main" xmlns:r="http://schemas.openxmlformats.org/officeDocument/2006/relationships" xmlns:p="http://schemas.openxmlformats.org/presentationml/2006/main">
+  <p:cSld>
     <p:bg>
       <p:bgPr>
         <a:blipFill>
@@ -3979,7 +4614,7 @@
 </p:sld>
 </file>
 
-<file path=ppt/slides/slide2.xml><?xml version="1.0" encoding="utf-8"?>
+<file path=ppt/slides/slide3.xml><?xml version="1.0" encoding="utf-8"?>
 <p:sld xmlns:a="http://schemas.openxmlformats.org/drawingml/2006/main" xmlns:r="http://schemas.openxmlformats.org/officeDocument/2006/relationships" xmlns:p="http://schemas.openxmlformats.org/presentationml/2006/main">
   <p:cSld>
     <p:bg>
@@ -5423,7 +6058,7 @@
 </p:sld>
 </file>
 
-<file path=ppt/slides/slide3.xml><?xml version="1.0" encoding="utf-8"?>
+<file path=ppt/slides/slide4.xml><?xml version="1.0" encoding="utf-8"?>
 <p:sld xmlns:a="http://schemas.openxmlformats.org/drawingml/2006/main" xmlns:r="http://schemas.openxmlformats.org/officeDocument/2006/relationships" xmlns:p="http://schemas.openxmlformats.org/presentationml/2006/main">
   <p:cSld>
     <p:spTree>
@@ -5454,7 +6089,7 @@
         </p:nvSpPr>
         <p:spPr>
           <a:xfrm>
-            <a:off x="4287473" y="451284"/>
+            <a:off x="4748868" y="379396"/>
             <a:ext cx="3061283" cy="369332"/>
           </a:xfrm>
           <a:prstGeom prst="rect">
@@ -5470,11 +6105,710 @@
           <a:p>
             <a:r>
               <a:rPr lang="en-US" dirty="0"/>
-              <a:t>Model 2: Nowcast</a:t>
-            </a:r>
-          </a:p>
-        </p:txBody>
-      </p:sp>
+              <a:t>Model Updated Overview</a:t>
+            </a:r>
+          </a:p>
+        </p:txBody>
+      </p:sp>
+      <p:sp>
+        <p:nvSpPr>
+          <p:cNvPr id="2" name="Rectangle 1">
+            <a:extLst>
+              <a:ext uri="{FF2B5EF4-FFF2-40B4-BE49-F238E27FC236}">
+                <a16:creationId xmlns:a16="http://schemas.microsoft.com/office/drawing/2014/main" id="{9194FF74-EA7C-4DD6-95FA-1F954E9F7913}"/>
+              </a:ext>
+            </a:extLst>
+          </p:cNvPr>
+          <p:cNvSpPr/>
+          <p:nvPr/>
+        </p:nvSpPr>
+        <p:spPr>
+          <a:xfrm>
+            <a:off x="2130802" y="3003259"/>
+            <a:ext cx="2080469" cy="310393"/>
+          </a:xfrm>
+          <a:prstGeom prst="rect">
+            <a:avLst/>
+          </a:prstGeom>
+        </p:spPr>
+        <p:style>
+          <a:lnRef idx="2">
+            <a:schemeClr val="accent4">
+              <a:shade val="50000"/>
+            </a:schemeClr>
+          </a:lnRef>
+          <a:fillRef idx="1">
+            <a:schemeClr val="accent4"/>
+          </a:fillRef>
+          <a:effectRef idx="0">
+            <a:schemeClr val="accent4"/>
+          </a:effectRef>
+          <a:fontRef idx="minor">
+            <a:schemeClr val="lt1"/>
+          </a:fontRef>
+        </p:style>
+        <p:txBody>
+          <a:bodyPr rtlCol="0" anchor="ctr"/>
+          <a:lstStyle/>
+          <a:p>
+            <a:pPr algn="ctr"/>
+            <a:r>
+              <a:rPr lang="en-US" sz="1200" dirty="0"/>
+              <a:t>Pull Historical Data</a:t>
+            </a:r>
+          </a:p>
+        </p:txBody>
+      </p:sp>
+      <p:cxnSp>
+        <p:nvCxnSpPr>
+          <p:cNvPr id="4" name="Straight Arrow Connector 3">
+            <a:extLst>
+              <a:ext uri="{FF2B5EF4-FFF2-40B4-BE49-F238E27FC236}">
+                <a16:creationId xmlns:a16="http://schemas.microsoft.com/office/drawing/2014/main" id="{29606B93-B1FE-45A2-936E-70C18D395DB9}"/>
+              </a:ext>
+            </a:extLst>
+          </p:cNvPr>
+          <p:cNvCxnSpPr>
+            <a:cxnSpLocks/>
+            <a:stCxn id="2" idx="3"/>
+            <a:endCxn id="9" idx="1"/>
+          </p:cNvCxnSpPr>
+          <p:nvPr/>
+        </p:nvCxnSpPr>
+        <p:spPr>
+          <a:xfrm>
+            <a:off x="4211271" y="3158456"/>
+            <a:ext cx="469784" cy="0"/>
+          </a:xfrm>
+          <a:prstGeom prst="straightConnector1">
+            <a:avLst/>
+          </a:prstGeom>
+          <a:ln>
+            <a:tailEnd type="triangle"/>
+          </a:ln>
+        </p:spPr>
+        <p:style>
+          <a:lnRef idx="1">
+            <a:schemeClr val="accent1"/>
+          </a:lnRef>
+          <a:fillRef idx="0">
+            <a:schemeClr val="accent1"/>
+          </a:fillRef>
+          <a:effectRef idx="0">
+            <a:schemeClr val="accent1"/>
+          </a:effectRef>
+          <a:fontRef idx="minor">
+            <a:schemeClr val="tx1"/>
+          </a:fontRef>
+        </p:style>
+      </p:cxnSp>
+      <p:sp>
+        <p:nvSpPr>
+          <p:cNvPr id="7" name="Rectangle 6">
+            <a:extLst>
+              <a:ext uri="{FF2B5EF4-FFF2-40B4-BE49-F238E27FC236}">
+                <a16:creationId xmlns:a16="http://schemas.microsoft.com/office/drawing/2014/main" id="{85151842-160C-4CF8-BE65-F43EEBABCE58}"/>
+              </a:ext>
+            </a:extLst>
+          </p:cNvPr>
+          <p:cNvSpPr/>
+          <p:nvPr/>
+        </p:nvSpPr>
+        <p:spPr>
+          <a:xfrm>
+            <a:off x="2130802" y="2254544"/>
+            <a:ext cx="2080469" cy="310393"/>
+          </a:xfrm>
+          <a:prstGeom prst="rect">
+            <a:avLst/>
+          </a:prstGeom>
+        </p:spPr>
+        <p:style>
+          <a:lnRef idx="2">
+            <a:schemeClr val="accent4">
+              <a:shade val="50000"/>
+            </a:schemeClr>
+          </a:lnRef>
+          <a:fillRef idx="1">
+            <a:schemeClr val="accent4"/>
+          </a:fillRef>
+          <a:effectRef idx="0">
+            <a:schemeClr val="accent4"/>
+          </a:effectRef>
+          <a:fontRef idx="minor">
+            <a:schemeClr val="lt1"/>
+          </a:fontRef>
+        </p:style>
+        <p:txBody>
+          <a:bodyPr rtlCol="0" anchor="ctr"/>
+          <a:lstStyle/>
+          <a:p>
+            <a:pPr algn="ctr"/>
+            <a:r>
+              <a:rPr lang="en-US" sz="1200" dirty="0"/>
+              <a:t>Pull External Forecasts</a:t>
+            </a:r>
+          </a:p>
+        </p:txBody>
+      </p:sp>
+      <p:sp>
+        <p:nvSpPr>
+          <p:cNvPr id="9" name="Rectangle 8">
+            <a:extLst>
+              <a:ext uri="{FF2B5EF4-FFF2-40B4-BE49-F238E27FC236}">
+                <a16:creationId xmlns:a16="http://schemas.microsoft.com/office/drawing/2014/main" id="{D2278DC8-DC51-403E-85F8-A3AD33216527}"/>
+              </a:ext>
+            </a:extLst>
+          </p:cNvPr>
+          <p:cNvSpPr/>
+          <p:nvPr/>
+        </p:nvSpPr>
+        <p:spPr>
+          <a:xfrm>
+            <a:off x="4681055" y="3003259"/>
+            <a:ext cx="2080469" cy="310393"/>
+          </a:xfrm>
+          <a:prstGeom prst="rect">
+            <a:avLst/>
+          </a:prstGeom>
+        </p:spPr>
+        <p:style>
+          <a:lnRef idx="2">
+            <a:schemeClr val="accent6">
+              <a:shade val="50000"/>
+            </a:schemeClr>
+          </a:lnRef>
+          <a:fillRef idx="1">
+            <a:schemeClr val="accent6"/>
+          </a:fillRef>
+          <a:effectRef idx="0">
+            <a:schemeClr val="accent6"/>
+          </a:effectRef>
+          <a:fontRef idx="minor">
+            <a:schemeClr val="lt1"/>
+          </a:fontRef>
+        </p:style>
+        <p:txBody>
+          <a:bodyPr rtlCol="0" anchor="ctr"/>
+          <a:lstStyle/>
+          <a:p>
+            <a:pPr algn="ctr"/>
+            <a:r>
+              <a:rPr lang="en-US" sz="1200" dirty="0"/>
+              <a:t>Create Calculated Variables</a:t>
+            </a:r>
+          </a:p>
+        </p:txBody>
+      </p:sp>
+      <p:cxnSp>
+        <p:nvCxnSpPr>
+          <p:cNvPr id="17" name="Straight Arrow Connector 16">
+            <a:extLst>
+              <a:ext uri="{FF2B5EF4-FFF2-40B4-BE49-F238E27FC236}">
+                <a16:creationId xmlns:a16="http://schemas.microsoft.com/office/drawing/2014/main" id="{22FDC700-B916-4155-A6EF-740258D094DD}"/>
+              </a:ext>
+            </a:extLst>
+          </p:cNvPr>
+          <p:cNvCxnSpPr>
+            <a:cxnSpLocks/>
+            <a:stCxn id="2" idx="2"/>
+            <a:endCxn id="20" idx="0"/>
+          </p:cNvCxnSpPr>
+          <p:nvPr/>
+        </p:nvCxnSpPr>
+        <p:spPr>
+          <a:xfrm flipH="1">
+            <a:off x="3171036" y="3313652"/>
+            <a:ext cx="1" cy="478172"/>
+          </a:xfrm>
+          <a:prstGeom prst="straightConnector1">
+            <a:avLst/>
+          </a:prstGeom>
+          <a:ln>
+            <a:tailEnd type="triangle"/>
+          </a:ln>
+        </p:spPr>
+        <p:style>
+          <a:lnRef idx="1">
+            <a:schemeClr val="accent1"/>
+          </a:lnRef>
+          <a:fillRef idx="0">
+            <a:schemeClr val="accent1"/>
+          </a:fillRef>
+          <a:effectRef idx="0">
+            <a:schemeClr val="accent1"/>
+          </a:effectRef>
+          <a:fontRef idx="minor">
+            <a:schemeClr val="tx1"/>
+          </a:fontRef>
+        </p:style>
+      </p:cxnSp>
+      <p:sp>
+        <p:nvSpPr>
+          <p:cNvPr id="20" name="Rectangle 19">
+            <a:extLst>
+              <a:ext uri="{FF2B5EF4-FFF2-40B4-BE49-F238E27FC236}">
+                <a16:creationId xmlns:a16="http://schemas.microsoft.com/office/drawing/2014/main" id="{5F59EA85-26B5-47C8-965D-FA4A09BC5DE9}"/>
+              </a:ext>
+            </a:extLst>
+          </p:cNvPr>
+          <p:cNvSpPr/>
+          <p:nvPr/>
+        </p:nvSpPr>
+        <p:spPr>
+          <a:xfrm>
+            <a:off x="2130801" y="3791824"/>
+            <a:ext cx="2080469" cy="310393"/>
+          </a:xfrm>
+          <a:prstGeom prst="rect">
+            <a:avLst/>
+          </a:prstGeom>
+        </p:spPr>
+        <p:style>
+          <a:lnRef idx="2">
+            <a:schemeClr val="accent2">
+              <a:shade val="50000"/>
+            </a:schemeClr>
+          </a:lnRef>
+          <a:fillRef idx="1">
+            <a:schemeClr val="accent2"/>
+          </a:fillRef>
+          <a:effectRef idx="0">
+            <a:schemeClr val="accent2"/>
+          </a:effectRef>
+          <a:fontRef idx="minor">
+            <a:schemeClr val="lt1"/>
+          </a:fontRef>
+        </p:style>
+        <p:txBody>
+          <a:bodyPr rtlCol="0" anchor="ctr"/>
+          <a:lstStyle/>
+          <a:p>
+            <a:pPr algn="ctr"/>
+            <a:r>
+              <a:rPr lang="en-US" sz="1200" dirty="0"/>
+              <a:t>Conduct Nowcasts</a:t>
+            </a:r>
+          </a:p>
+        </p:txBody>
+      </p:sp>
+      <p:cxnSp>
+        <p:nvCxnSpPr>
+          <p:cNvPr id="21" name="Straight Arrow Connector 20">
+            <a:extLst>
+              <a:ext uri="{FF2B5EF4-FFF2-40B4-BE49-F238E27FC236}">
+                <a16:creationId xmlns:a16="http://schemas.microsoft.com/office/drawing/2014/main" id="{A84EACFB-7388-4E9F-A426-2FDCDCE78EEC}"/>
+              </a:ext>
+            </a:extLst>
+          </p:cNvPr>
+          <p:cNvCxnSpPr>
+            <a:cxnSpLocks/>
+            <a:stCxn id="20" idx="3"/>
+            <a:endCxn id="28" idx="1"/>
+          </p:cNvCxnSpPr>
+          <p:nvPr/>
+        </p:nvCxnSpPr>
+        <p:spPr>
+          <a:xfrm>
+            <a:off x="4211270" y="3947021"/>
+            <a:ext cx="260759" cy="96473"/>
+          </a:xfrm>
+          <a:prstGeom prst="straightConnector1">
+            <a:avLst/>
+          </a:prstGeom>
+          <a:ln>
+            <a:tailEnd type="triangle"/>
+          </a:ln>
+        </p:spPr>
+        <p:style>
+          <a:lnRef idx="1">
+            <a:schemeClr val="accent1"/>
+          </a:lnRef>
+          <a:fillRef idx="0">
+            <a:schemeClr val="accent1"/>
+          </a:fillRef>
+          <a:effectRef idx="0">
+            <a:schemeClr val="accent1"/>
+          </a:effectRef>
+          <a:fontRef idx="minor">
+            <a:schemeClr val="tx1"/>
+          </a:fontRef>
+        </p:style>
+      </p:cxnSp>
+      <p:cxnSp>
+        <p:nvCxnSpPr>
+          <p:cNvPr id="24" name="Straight Arrow Connector 23">
+            <a:extLst>
+              <a:ext uri="{FF2B5EF4-FFF2-40B4-BE49-F238E27FC236}">
+                <a16:creationId xmlns:a16="http://schemas.microsoft.com/office/drawing/2014/main" id="{C925C57D-6449-4680-A421-FF4AC0C9C039}"/>
+              </a:ext>
+            </a:extLst>
+          </p:cNvPr>
+          <p:cNvCxnSpPr>
+            <a:cxnSpLocks/>
+            <a:stCxn id="9" idx="2"/>
+            <a:endCxn id="28" idx="0"/>
+          </p:cNvCxnSpPr>
+          <p:nvPr/>
+        </p:nvCxnSpPr>
+        <p:spPr>
+          <a:xfrm flipH="1">
+            <a:off x="5512264" y="3313652"/>
+            <a:ext cx="209026" cy="574645"/>
+          </a:xfrm>
+          <a:prstGeom prst="straightConnector1">
+            <a:avLst/>
+          </a:prstGeom>
+          <a:ln>
+            <a:tailEnd type="triangle"/>
+          </a:ln>
+        </p:spPr>
+        <p:style>
+          <a:lnRef idx="1">
+            <a:schemeClr val="accent1"/>
+          </a:lnRef>
+          <a:fillRef idx="0">
+            <a:schemeClr val="accent1"/>
+          </a:fillRef>
+          <a:effectRef idx="0">
+            <a:schemeClr val="accent1"/>
+          </a:effectRef>
+          <a:fontRef idx="minor">
+            <a:schemeClr val="tx1"/>
+          </a:fontRef>
+        </p:style>
+      </p:cxnSp>
+      <p:sp>
+        <p:nvSpPr>
+          <p:cNvPr id="28" name="Rectangle 27">
+            <a:extLst>
+              <a:ext uri="{FF2B5EF4-FFF2-40B4-BE49-F238E27FC236}">
+                <a16:creationId xmlns:a16="http://schemas.microsoft.com/office/drawing/2014/main" id="{2ACEA74B-7663-4262-8373-B6DA6B6D7457}"/>
+              </a:ext>
+            </a:extLst>
+          </p:cNvPr>
+          <p:cNvSpPr/>
+          <p:nvPr/>
+        </p:nvSpPr>
+        <p:spPr>
+          <a:xfrm>
+            <a:off x="4472029" y="3888297"/>
+            <a:ext cx="2080469" cy="310393"/>
+          </a:xfrm>
+          <a:prstGeom prst="rect">
+            <a:avLst/>
+          </a:prstGeom>
+        </p:spPr>
+        <p:style>
+          <a:lnRef idx="2">
+            <a:schemeClr val="accent2">
+              <a:shade val="50000"/>
+            </a:schemeClr>
+          </a:lnRef>
+          <a:fillRef idx="1">
+            <a:schemeClr val="accent2"/>
+          </a:fillRef>
+          <a:effectRef idx="0">
+            <a:schemeClr val="accent2"/>
+          </a:effectRef>
+          <a:fontRef idx="minor">
+            <a:schemeClr val="lt1"/>
+          </a:fontRef>
+        </p:style>
+        <p:txBody>
+          <a:bodyPr rtlCol="0" anchor="ctr"/>
+          <a:lstStyle/>
+          <a:p>
+            <a:pPr algn="ctr"/>
+            <a:r>
+              <a:rPr lang="en-US" sz="1200" dirty="0"/>
+              <a:t>Create Structural Model</a:t>
+            </a:r>
+          </a:p>
+        </p:txBody>
+      </p:sp>
+      <p:sp>
+        <p:nvSpPr>
+          <p:cNvPr id="33" name="Rectangle 32">
+            <a:extLst>
+              <a:ext uri="{FF2B5EF4-FFF2-40B4-BE49-F238E27FC236}">
+                <a16:creationId xmlns:a16="http://schemas.microsoft.com/office/drawing/2014/main" id="{D4375D7F-2583-4030-9CCA-AAD8200EE5D2}"/>
+              </a:ext>
+            </a:extLst>
+          </p:cNvPr>
+          <p:cNvSpPr/>
+          <p:nvPr/>
+        </p:nvSpPr>
+        <p:spPr>
+          <a:xfrm>
+            <a:off x="7185518" y="4884487"/>
+            <a:ext cx="2080469" cy="310393"/>
+          </a:xfrm>
+          <a:prstGeom prst="rect">
+            <a:avLst/>
+          </a:prstGeom>
+        </p:spPr>
+        <p:style>
+          <a:lnRef idx="2">
+            <a:schemeClr val="accent1">
+              <a:shade val="50000"/>
+            </a:schemeClr>
+          </a:lnRef>
+          <a:fillRef idx="1">
+            <a:schemeClr val="accent1"/>
+          </a:fillRef>
+          <a:effectRef idx="0">
+            <a:schemeClr val="accent1"/>
+          </a:effectRef>
+          <a:fontRef idx="minor">
+            <a:schemeClr val="lt1"/>
+          </a:fontRef>
+        </p:style>
+        <p:txBody>
+          <a:bodyPr rtlCol="0" anchor="ctr"/>
+          <a:lstStyle/>
+          <a:p>
+            <a:pPr algn="ctr"/>
+            <a:r>
+              <a:rPr lang="en-US" sz="1200" dirty="0" err="1"/>
+              <a:t>Exogenize</a:t>
+            </a:r>
+            <a:r>
+              <a:rPr lang="en-US" sz="1200" dirty="0"/>
+              <a:t> Inputs (Flexibly for Variables &amp; Dates)</a:t>
+            </a:r>
+          </a:p>
+        </p:txBody>
+      </p:sp>
+      <p:cxnSp>
+        <p:nvCxnSpPr>
+          <p:cNvPr id="34" name="Straight Arrow Connector 33">
+            <a:extLst>
+              <a:ext uri="{FF2B5EF4-FFF2-40B4-BE49-F238E27FC236}">
+                <a16:creationId xmlns:a16="http://schemas.microsoft.com/office/drawing/2014/main" id="{0A07FF38-5CC0-4D92-9553-12840533DE9B}"/>
+              </a:ext>
+            </a:extLst>
+          </p:cNvPr>
+          <p:cNvCxnSpPr>
+            <a:cxnSpLocks/>
+            <a:stCxn id="28" idx="2"/>
+            <a:endCxn id="33" idx="0"/>
+          </p:cNvCxnSpPr>
+          <p:nvPr/>
+        </p:nvCxnSpPr>
+        <p:spPr>
+          <a:xfrm>
+            <a:off x="5512264" y="4198690"/>
+            <a:ext cx="2713489" cy="685797"/>
+          </a:xfrm>
+          <a:prstGeom prst="straightConnector1">
+            <a:avLst/>
+          </a:prstGeom>
+          <a:ln>
+            <a:tailEnd type="triangle"/>
+          </a:ln>
+        </p:spPr>
+        <p:style>
+          <a:lnRef idx="1">
+            <a:schemeClr val="accent1"/>
+          </a:lnRef>
+          <a:fillRef idx="0">
+            <a:schemeClr val="accent1"/>
+          </a:fillRef>
+          <a:effectRef idx="0">
+            <a:schemeClr val="accent1"/>
+          </a:effectRef>
+          <a:fontRef idx="minor">
+            <a:schemeClr val="tx1"/>
+          </a:fontRef>
+        </p:style>
+      </p:cxnSp>
+      <p:sp>
+        <p:nvSpPr>
+          <p:cNvPr id="37" name="Rectangle 36">
+            <a:extLst>
+              <a:ext uri="{FF2B5EF4-FFF2-40B4-BE49-F238E27FC236}">
+                <a16:creationId xmlns:a16="http://schemas.microsoft.com/office/drawing/2014/main" id="{096D0292-951C-480C-85E4-FD9ED77C6968}"/>
+              </a:ext>
+            </a:extLst>
+          </p:cNvPr>
+          <p:cNvSpPr/>
+          <p:nvPr/>
+        </p:nvSpPr>
+        <p:spPr>
+          <a:xfrm>
+            <a:off x="8225752" y="2996974"/>
+            <a:ext cx="2080469" cy="310393"/>
+          </a:xfrm>
+          <a:prstGeom prst="rect">
+            <a:avLst/>
+          </a:prstGeom>
+        </p:spPr>
+        <p:style>
+          <a:lnRef idx="2">
+            <a:schemeClr val="accent1">
+              <a:shade val="50000"/>
+            </a:schemeClr>
+          </a:lnRef>
+          <a:fillRef idx="1">
+            <a:schemeClr val="accent1"/>
+          </a:fillRef>
+          <a:effectRef idx="0">
+            <a:schemeClr val="accent1"/>
+          </a:effectRef>
+          <a:fontRef idx="minor">
+            <a:schemeClr val="lt1"/>
+          </a:fontRef>
+        </p:style>
+        <p:txBody>
+          <a:bodyPr rtlCol="0" anchor="ctr"/>
+          <a:lstStyle/>
+          <a:p>
+            <a:pPr algn="ctr"/>
+            <a:r>
+              <a:rPr lang="en-US" sz="1200" dirty="0"/>
+              <a:t>Create Scenarios by </a:t>
+            </a:r>
+            <a:r>
+              <a:rPr lang="en-US" sz="1200" dirty="0" err="1"/>
+              <a:t>Exogenizing</a:t>
+            </a:r>
+            <a:r>
+              <a:rPr lang="en-US" sz="1200" dirty="0"/>
+              <a:t> Different Inputs</a:t>
+            </a:r>
+          </a:p>
+        </p:txBody>
+      </p:sp>
+      <p:cxnSp>
+        <p:nvCxnSpPr>
+          <p:cNvPr id="38" name="Straight Arrow Connector 37">
+            <a:extLst>
+              <a:ext uri="{FF2B5EF4-FFF2-40B4-BE49-F238E27FC236}">
+                <a16:creationId xmlns:a16="http://schemas.microsoft.com/office/drawing/2014/main" id="{07BB84BD-0260-45D3-BDDF-19F3CBE87EF8}"/>
+              </a:ext>
+            </a:extLst>
+          </p:cNvPr>
+          <p:cNvCxnSpPr>
+            <a:cxnSpLocks/>
+            <a:stCxn id="33" idx="3"/>
+            <a:endCxn id="37" idx="2"/>
+          </p:cNvCxnSpPr>
+          <p:nvPr/>
+        </p:nvCxnSpPr>
+        <p:spPr>
+          <a:xfrm flipV="1">
+            <a:off x="9265987" y="3307367"/>
+            <a:ext cx="0" cy="1732317"/>
+          </a:xfrm>
+          <a:prstGeom prst="straightConnector1">
+            <a:avLst/>
+          </a:prstGeom>
+          <a:ln>
+            <a:tailEnd type="triangle"/>
+          </a:ln>
+        </p:spPr>
+        <p:style>
+          <a:lnRef idx="1">
+            <a:schemeClr val="accent1"/>
+          </a:lnRef>
+          <a:fillRef idx="0">
+            <a:schemeClr val="accent1"/>
+          </a:fillRef>
+          <a:effectRef idx="0">
+            <a:schemeClr val="accent1"/>
+          </a:effectRef>
+          <a:fontRef idx="minor">
+            <a:schemeClr val="tx1"/>
+          </a:fontRef>
+        </p:style>
+      </p:cxnSp>
+      <p:cxnSp>
+        <p:nvCxnSpPr>
+          <p:cNvPr id="43" name="Straight Arrow Connector 42">
+            <a:extLst>
+              <a:ext uri="{FF2B5EF4-FFF2-40B4-BE49-F238E27FC236}">
+                <a16:creationId xmlns:a16="http://schemas.microsoft.com/office/drawing/2014/main" id="{900623D9-04CC-4B74-AAE1-D4C0076A3BEC}"/>
+              </a:ext>
+            </a:extLst>
+          </p:cNvPr>
+          <p:cNvCxnSpPr>
+            <a:cxnSpLocks/>
+            <a:stCxn id="7" idx="3"/>
+            <a:endCxn id="9" idx="0"/>
+          </p:cNvCxnSpPr>
+          <p:nvPr/>
+        </p:nvCxnSpPr>
+        <p:spPr>
+          <a:xfrm>
+            <a:off x="4211271" y="2409741"/>
+            <a:ext cx="1510019" cy="593518"/>
+          </a:xfrm>
+          <a:prstGeom prst="straightConnector1">
+            <a:avLst/>
+          </a:prstGeom>
+          <a:ln>
+            <a:tailEnd type="triangle"/>
+          </a:ln>
+        </p:spPr>
+        <p:style>
+          <a:lnRef idx="1">
+            <a:schemeClr val="accent1"/>
+          </a:lnRef>
+          <a:fillRef idx="0">
+            <a:schemeClr val="accent1"/>
+          </a:fillRef>
+          <a:effectRef idx="0">
+            <a:schemeClr val="accent1"/>
+          </a:effectRef>
+          <a:fontRef idx="minor">
+            <a:schemeClr val="tx1"/>
+          </a:fontRef>
+        </p:style>
+      </p:cxnSp>
+      <p:cxnSp>
+        <p:nvCxnSpPr>
+          <p:cNvPr id="58" name="Straight Arrow Connector 57">
+            <a:extLst>
+              <a:ext uri="{FF2B5EF4-FFF2-40B4-BE49-F238E27FC236}">
+                <a16:creationId xmlns:a16="http://schemas.microsoft.com/office/drawing/2014/main" id="{31330958-2EEF-48D2-9827-E506672536FC}"/>
+              </a:ext>
+            </a:extLst>
+          </p:cNvPr>
+          <p:cNvCxnSpPr>
+            <a:cxnSpLocks/>
+            <a:stCxn id="7" idx="3"/>
+            <a:endCxn id="37" idx="0"/>
+          </p:cNvCxnSpPr>
+          <p:nvPr/>
+        </p:nvCxnSpPr>
+        <p:spPr>
+          <a:xfrm>
+            <a:off x="4211271" y="2409741"/>
+            <a:ext cx="5054716" cy="587233"/>
+          </a:xfrm>
+          <a:prstGeom prst="straightConnector1">
+            <a:avLst/>
+          </a:prstGeom>
+          <a:ln>
+            <a:tailEnd type="triangle"/>
+          </a:ln>
+        </p:spPr>
+        <p:style>
+          <a:lnRef idx="1">
+            <a:schemeClr val="accent1"/>
+          </a:lnRef>
+          <a:fillRef idx="0">
+            <a:schemeClr val="accent1"/>
+          </a:fillRef>
+          <a:effectRef idx="0">
+            <a:schemeClr val="accent1"/>
+          </a:effectRef>
+          <a:fontRef idx="minor">
+            <a:schemeClr val="tx1"/>
+          </a:fontRef>
+        </p:style>
+      </p:cxnSp>
     </p:spTree>
     <p:extLst>
       <p:ext uri="{BB962C8B-B14F-4D97-AF65-F5344CB8AC3E}">
@@ -5488,7 +6822,7 @@
 </p:sld>
 </file>
 
-<file path=ppt/slides/slide4.xml><?xml version="1.0" encoding="utf-8"?>
+<file path=ppt/slides/slide5.xml><?xml version="1.0" encoding="utf-8"?>
 <p:sld xmlns:a="http://schemas.openxmlformats.org/drawingml/2006/main" xmlns:r="http://schemas.openxmlformats.org/officeDocument/2006/relationships" xmlns:p="http://schemas.openxmlformats.org/presentationml/2006/main">
   <p:cSld>
     <p:spTree>

</xml_diff>

<commit_message>
Updated model flow and added more variables to WSJ forecast import (v0.14)
</commit_message>
<xml_diff>
--- a/documentation-templates/model-flow.pptx
+++ b/documentation-templates/model-flow.pptx
@@ -263,7 +263,7 @@
           <a:p>
             <a:fld id="{A7C790ED-1353-428C-9EC0-1379BDA992E3}" type="datetimeFigureOut">
               <a:rPr lang="en-US" smtClean="0"/>
-              <a:t>6/25/2021</a:t>
+              <a:t>6/27/2021</a:t>
             </a:fld>
             <a:endParaRPr lang="en-US"/>
           </a:p>
@@ -461,7 +461,7 @@
           <a:p>
             <a:fld id="{A7C790ED-1353-428C-9EC0-1379BDA992E3}" type="datetimeFigureOut">
               <a:rPr lang="en-US" smtClean="0"/>
-              <a:t>6/25/2021</a:t>
+              <a:t>6/27/2021</a:t>
             </a:fld>
             <a:endParaRPr lang="en-US"/>
           </a:p>
@@ -669,7 +669,7 @@
           <a:p>
             <a:fld id="{A7C790ED-1353-428C-9EC0-1379BDA992E3}" type="datetimeFigureOut">
               <a:rPr lang="en-US" smtClean="0"/>
-              <a:t>6/25/2021</a:t>
+              <a:t>6/27/2021</a:t>
             </a:fld>
             <a:endParaRPr lang="en-US"/>
           </a:p>
@@ -867,7 +867,7 @@
           <a:p>
             <a:fld id="{A7C790ED-1353-428C-9EC0-1379BDA992E3}" type="datetimeFigureOut">
               <a:rPr lang="en-US" smtClean="0"/>
-              <a:t>6/25/2021</a:t>
+              <a:t>6/27/2021</a:t>
             </a:fld>
             <a:endParaRPr lang="en-US"/>
           </a:p>
@@ -1142,7 +1142,7 @@
           <a:p>
             <a:fld id="{A7C790ED-1353-428C-9EC0-1379BDA992E3}" type="datetimeFigureOut">
               <a:rPr lang="en-US" smtClean="0"/>
-              <a:t>6/25/2021</a:t>
+              <a:t>6/27/2021</a:t>
             </a:fld>
             <a:endParaRPr lang="en-US"/>
           </a:p>
@@ -1407,7 +1407,7 @@
           <a:p>
             <a:fld id="{A7C790ED-1353-428C-9EC0-1379BDA992E3}" type="datetimeFigureOut">
               <a:rPr lang="en-US" smtClean="0"/>
-              <a:t>6/25/2021</a:t>
+              <a:t>6/27/2021</a:t>
             </a:fld>
             <a:endParaRPr lang="en-US"/>
           </a:p>
@@ -1819,7 +1819,7 @@
           <a:p>
             <a:fld id="{A7C790ED-1353-428C-9EC0-1379BDA992E3}" type="datetimeFigureOut">
               <a:rPr lang="en-US" smtClean="0"/>
-              <a:t>6/25/2021</a:t>
+              <a:t>6/27/2021</a:t>
             </a:fld>
             <a:endParaRPr lang="en-US"/>
           </a:p>
@@ -1960,7 +1960,7 @@
           <a:p>
             <a:fld id="{A7C790ED-1353-428C-9EC0-1379BDA992E3}" type="datetimeFigureOut">
               <a:rPr lang="en-US" smtClean="0"/>
-              <a:t>6/25/2021</a:t>
+              <a:t>6/27/2021</a:t>
             </a:fld>
             <a:endParaRPr lang="en-US"/>
           </a:p>
@@ -2073,7 +2073,7 @@
           <a:p>
             <a:fld id="{A7C790ED-1353-428C-9EC0-1379BDA992E3}" type="datetimeFigureOut">
               <a:rPr lang="en-US" smtClean="0"/>
-              <a:t>6/25/2021</a:t>
+              <a:t>6/27/2021</a:t>
             </a:fld>
             <a:endParaRPr lang="en-US"/>
           </a:p>
@@ -2384,7 +2384,7 @@
           <a:p>
             <a:fld id="{A7C790ED-1353-428C-9EC0-1379BDA992E3}" type="datetimeFigureOut">
               <a:rPr lang="en-US" smtClean="0"/>
-              <a:t>6/25/2021</a:t>
+              <a:t>6/27/2021</a:t>
             </a:fld>
             <a:endParaRPr lang="en-US"/>
           </a:p>
@@ -2672,7 +2672,7 @@
           <a:p>
             <a:fld id="{A7C790ED-1353-428C-9EC0-1379BDA992E3}" type="datetimeFigureOut">
               <a:rPr lang="en-US" smtClean="0"/>
-              <a:t>6/25/2021</a:t>
+              <a:t>6/27/2021</a:t>
             </a:fld>
             <a:endParaRPr lang="en-US"/>
           </a:p>
@@ -2913,7 +2913,7 @@
           <a:p>
             <a:fld id="{A7C790ED-1353-428C-9EC0-1379BDA992E3}" type="datetimeFigureOut">
               <a:rPr lang="en-US" smtClean="0"/>
-              <a:t>6/25/2021</a:t>
+              <a:t>6/27/2021</a:t>
             </a:fld>
             <a:endParaRPr lang="en-US"/>
           </a:p>
@@ -3345,7 +3345,7 @@
         <p:spPr>
           <a:xfrm>
             <a:off x="4287473" y="451284"/>
-            <a:ext cx="3061283" cy="369332"/>
+            <a:ext cx="3061283" cy="246221"/>
           </a:xfrm>
           <a:prstGeom prst="rect">
             <a:avLst/>
@@ -3359,7 +3359,7 @@
           <a:lstStyle/>
           <a:p>
             <a:r>
-              <a:rPr lang="en-US" dirty="0"/>
+              <a:rPr lang="en-US" sz="1000" dirty="0"/>
               <a:t>Updated Model</a:t>
             </a:r>
           </a:p>
@@ -3379,7 +3379,256 @@
         </p:nvSpPr>
         <p:spPr>
           <a:xfrm>
-            <a:off x="906011" y="989901"/>
+            <a:off x="528504" y="510223"/>
+            <a:ext cx="2080469" cy="310393"/>
+          </a:xfrm>
+          <a:prstGeom prst="rect">
+            <a:avLst/>
+          </a:prstGeom>
+        </p:spPr>
+        <p:style>
+          <a:lnRef idx="2">
+            <a:schemeClr val="accent6">
+              <a:shade val="50000"/>
+            </a:schemeClr>
+          </a:lnRef>
+          <a:fillRef idx="1">
+            <a:schemeClr val="accent6"/>
+          </a:fillRef>
+          <a:effectRef idx="0">
+            <a:schemeClr val="accent6"/>
+          </a:effectRef>
+          <a:fontRef idx="minor">
+            <a:schemeClr val="lt1"/>
+          </a:fontRef>
+        </p:style>
+        <p:txBody>
+          <a:bodyPr rtlCol="0" anchor="ctr"/>
+          <a:lstStyle/>
+          <a:p>
+            <a:pPr algn="ctr"/>
+            <a:r>
+              <a:rPr lang="en-US" sz="1000" dirty="0"/>
+              <a:t>Pull Historical Data [</a:t>
+            </a:r>
+            <a:r>
+              <a:rPr lang="en-US" sz="1000" dirty="0" err="1"/>
+              <a:t>ef</a:t>
+            </a:r>
+            <a:r>
+              <a:rPr lang="en-US" sz="1000" dirty="0"/>
+              <a:t>, h]</a:t>
+            </a:r>
+          </a:p>
+        </p:txBody>
+      </p:sp>
+      <p:cxnSp>
+        <p:nvCxnSpPr>
+          <p:cNvPr id="4" name="Straight Arrow Connector 3">
+            <a:extLst>
+              <a:ext uri="{FF2B5EF4-FFF2-40B4-BE49-F238E27FC236}">
+                <a16:creationId xmlns:a16="http://schemas.microsoft.com/office/drawing/2014/main" id="{29606B93-B1FE-45A2-936E-70C18D395DB9}"/>
+              </a:ext>
+            </a:extLst>
+          </p:cNvPr>
+          <p:cNvCxnSpPr>
+            <a:cxnSpLocks/>
+            <a:stCxn id="9" idx="2"/>
+            <a:endCxn id="85" idx="0"/>
+          </p:cNvCxnSpPr>
+          <p:nvPr/>
+        </p:nvCxnSpPr>
+        <p:spPr>
+          <a:xfrm flipH="1">
+            <a:off x="1887872" y="1336503"/>
+            <a:ext cx="1359367" cy="339401"/>
+          </a:xfrm>
+          <a:prstGeom prst="straightConnector1">
+            <a:avLst/>
+          </a:prstGeom>
+          <a:ln>
+            <a:tailEnd type="triangle"/>
+          </a:ln>
+        </p:spPr>
+        <p:style>
+          <a:lnRef idx="3">
+            <a:schemeClr val="dk1"/>
+          </a:lnRef>
+          <a:fillRef idx="0">
+            <a:schemeClr val="dk1"/>
+          </a:fillRef>
+          <a:effectRef idx="2">
+            <a:schemeClr val="dk1"/>
+          </a:effectRef>
+          <a:fontRef idx="minor">
+            <a:schemeClr val="tx1"/>
+          </a:fontRef>
+        </p:style>
+      </p:cxnSp>
+      <p:sp>
+        <p:nvSpPr>
+          <p:cNvPr id="7" name="Rectangle 6">
+            <a:extLst>
+              <a:ext uri="{FF2B5EF4-FFF2-40B4-BE49-F238E27FC236}">
+                <a16:creationId xmlns:a16="http://schemas.microsoft.com/office/drawing/2014/main" id="{85151842-160C-4CF8-BE65-F43EEBABCE58}"/>
+              </a:ext>
+            </a:extLst>
+          </p:cNvPr>
+          <p:cNvSpPr/>
+          <p:nvPr/>
+        </p:nvSpPr>
+        <p:spPr>
+          <a:xfrm>
+            <a:off x="788564" y="4054138"/>
+            <a:ext cx="2080469" cy="310393"/>
+          </a:xfrm>
+          <a:prstGeom prst="rect">
+            <a:avLst/>
+          </a:prstGeom>
+        </p:spPr>
+        <p:style>
+          <a:lnRef idx="2">
+            <a:schemeClr val="accent6">
+              <a:shade val="50000"/>
+            </a:schemeClr>
+          </a:lnRef>
+          <a:fillRef idx="1">
+            <a:schemeClr val="accent6"/>
+          </a:fillRef>
+          <a:effectRef idx="0">
+            <a:schemeClr val="accent6"/>
+          </a:effectRef>
+          <a:fontRef idx="minor">
+            <a:schemeClr val="lt1"/>
+          </a:fontRef>
+        </p:style>
+        <p:txBody>
+          <a:bodyPr rtlCol="0" anchor="ctr"/>
+          <a:lstStyle/>
+          <a:p>
+            <a:pPr algn="ctr"/>
+            <a:r>
+              <a:rPr lang="en-US" sz="1000" dirty="0"/>
+              <a:t>Pull External Forecasts</a:t>
+            </a:r>
+          </a:p>
+        </p:txBody>
+      </p:sp>
+      <p:sp>
+        <p:nvSpPr>
+          <p:cNvPr id="9" name="Rectangle 8">
+            <a:extLst>
+              <a:ext uri="{FF2B5EF4-FFF2-40B4-BE49-F238E27FC236}">
+                <a16:creationId xmlns:a16="http://schemas.microsoft.com/office/drawing/2014/main" id="{D2278DC8-DC51-403E-85F8-A3AD33216527}"/>
+              </a:ext>
+            </a:extLst>
+          </p:cNvPr>
+          <p:cNvSpPr/>
+          <p:nvPr/>
+        </p:nvSpPr>
+        <p:spPr>
+          <a:xfrm>
+            <a:off x="2207004" y="1026110"/>
+            <a:ext cx="2080469" cy="310393"/>
+          </a:xfrm>
+          <a:prstGeom prst="rect">
+            <a:avLst/>
+          </a:prstGeom>
+        </p:spPr>
+        <p:style>
+          <a:lnRef idx="2">
+            <a:schemeClr val="accent2">
+              <a:shade val="50000"/>
+            </a:schemeClr>
+          </a:lnRef>
+          <a:fillRef idx="1">
+            <a:schemeClr val="accent2"/>
+          </a:fillRef>
+          <a:effectRef idx="0">
+            <a:schemeClr val="accent2"/>
+          </a:effectRef>
+          <a:fontRef idx="minor">
+            <a:schemeClr val="lt1"/>
+          </a:fontRef>
+        </p:style>
+        <p:txBody>
+          <a:bodyPr rtlCol="0" anchor="ctr"/>
+          <a:lstStyle/>
+          <a:p>
+            <a:pPr algn="ctr"/>
+            <a:r>
+              <a:rPr lang="en-US" sz="1000" dirty="0"/>
+              <a:t>Create Calculated Variables [</a:t>
+            </a:r>
+            <a:r>
+              <a:rPr lang="en-US" sz="1000" dirty="0" err="1"/>
+              <a:t>m$c</a:t>
+            </a:r>
+            <a:r>
+              <a:rPr lang="en-US" sz="1000" dirty="0"/>
+              <a:t>]</a:t>
+            </a:r>
+          </a:p>
+        </p:txBody>
+      </p:sp>
+      <p:cxnSp>
+        <p:nvCxnSpPr>
+          <p:cNvPr id="17" name="Straight Arrow Connector 16">
+            <a:extLst>
+              <a:ext uri="{FF2B5EF4-FFF2-40B4-BE49-F238E27FC236}">
+                <a16:creationId xmlns:a16="http://schemas.microsoft.com/office/drawing/2014/main" id="{22FDC700-B916-4155-A6EF-740258D094DD}"/>
+              </a:ext>
+            </a:extLst>
+          </p:cNvPr>
+          <p:cNvCxnSpPr>
+            <a:cxnSpLocks/>
+            <a:stCxn id="2" idx="2"/>
+            <a:endCxn id="85" idx="0"/>
+          </p:cNvCxnSpPr>
+          <p:nvPr/>
+        </p:nvCxnSpPr>
+        <p:spPr>
+          <a:xfrm>
+            <a:off x="1568739" y="820616"/>
+            <a:ext cx="319133" cy="855288"/>
+          </a:xfrm>
+          <a:prstGeom prst="straightConnector1">
+            <a:avLst/>
+          </a:prstGeom>
+          <a:ln>
+            <a:tailEnd type="triangle"/>
+          </a:ln>
+        </p:spPr>
+        <p:style>
+          <a:lnRef idx="3">
+            <a:schemeClr val="dk1"/>
+          </a:lnRef>
+          <a:fillRef idx="0">
+            <a:schemeClr val="dk1"/>
+          </a:fillRef>
+          <a:effectRef idx="2">
+            <a:schemeClr val="dk1"/>
+          </a:effectRef>
+          <a:fontRef idx="minor">
+            <a:schemeClr val="tx1"/>
+          </a:fontRef>
+        </p:style>
+      </p:cxnSp>
+      <p:sp>
+        <p:nvSpPr>
+          <p:cNvPr id="20" name="Rectangle 19">
+            <a:extLst>
+              <a:ext uri="{FF2B5EF4-FFF2-40B4-BE49-F238E27FC236}">
+                <a16:creationId xmlns:a16="http://schemas.microsoft.com/office/drawing/2014/main" id="{5F59EA85-26B5-47C8-965D-FA4A09BC5DE9}"/>
+              </a:ext>
+            </a:extLst>
+          </p:cNvPr>
+          <p:cNvSpPr/>
+          <p:nvPr/>
+        </p:nvSpPr>
+        <p:spPr>
+          <a:xfrm>
+            <a:off x="788563" y="2696351"/>
             <a:ext cx="2080469" cy="310393"/>
           </a:xfrm>
           <a:prstGeom prst="rect">
@@ -3408,239 +3657,7 @@
           <a:p>
             <a:pPr algn="ctr"/>
             <a:r>
-              <a:rPr lang="en-US" sz="1200" dirty="0"/>
-              <a:t>Pull Historical Data</a:t>
-            </a:r>
-          </a:p>
-        </p:txBody>
-      </p:sp>
-      <p:cxnSp>
-        <p:nvCxnSpPr>
-          <p:cNvPr id="4" name="Straight Arrow Connector 3">
-            <a:extLst>
-              <a:ext uri="{FF2B5EF4-FFF2-40B4-BE49-F238E27FC236}">
-                <a16:creationId xmlns:a16="http://schemas.microsoft.com/office/drawing/2014/main" id="{29606B93-B1FE-45A2-936E-70C18D395DB9}"/>
-              </a:ext>
-            </a:extLst>
-          </p:cNvPr>
-          <p:cNvCxnSpPr>
-            <a:cxnSpLocks/>
-            <a:stCxn id="2" idx="3"/>
-            <a:endCxn id="9" idx="1"/>
-          </p:cNvCxnSpPr>
-          <p:nvPr/>
-        </p:nvCxnSpPr>
-        <p:spPr>
-          <a:xfrm>
-            <a:off x="2986480" y="1145098"/>
-            <a:ext cx="469784" cy="0"/>
-          </a:xfrm>
-          <a:prstGeom prst="straightConnector1">
-            <a:avLst/>
-          </a:prstGeom>
-          <a:ln>
-            <a:tailEnd type="triangle"/>
-          </a:ln>
-        </p:spPr>
-        <p:style>
-          <a:lnRef idx="1">
-            <a:schemeClr val="accent1"/>
-          </a:lnRef>
-          <a:fillRef idx="0">
-            <a:schemeClr val="accent1"/>
-          </a:fillRef>
-          <a:effectRef idx="0">
-            <a:schemeClr val="accent1"/>
-          </a:effectRef>
-          <a:fontRef idx="minor">
-            <a:schemeClr val="tx1"/>
-          </a:fontRef>
-        </p:style>
-      </p:cxnSp>
-      <p:sp>
-        <p:nvSpPr>
-          <p:cNvPr id="7" name="Rectangle 6">
-            <a:extLst>
-              <a:ext uri="{FF2B5EF4-FFF2-40B4-BE49-F238E27FC236}">
-                <a16:creationId xmlns:a16="http://schemas.microsoft.com/office/drawing/2014/main" id="{85151842-160C-4CF8-BE65-F43EEBABCE58}"/>
-              </a:ext>
-            </a:extLst>
-          </p:cNvPr>
-          <p:cNvSpPr/>
-          <p:nvPr/>
-        </p:nvSpPr>
-        <p:spPr>
-          <a:xfrm>
-            <a:off x="788565" y="4773335"/>
-            <a:ext cx="2080469" cy="310393"/>
-          </a:xfrm>
-          <a:prstGeom prst="rect">
-            <a:avLst/>
-          </a:prstGeom>
-        </p:spPr>
-        <p:style>
-          <a:lnRef idx="2">
-            <a:schemeClr val="accent1">
-              <a:shade val="50000"/>
-            </a:schemeClr>
-          </a:lnRef>
-          <a:fillRef idx="1">
-            <a:schemeClr val="accent1"/>
-          </a:fillRef>
-          <a:effectRef idx="0">
-            <a:schemeClr val="accent1"/>
-          </a:effectRef>
-          <a:fontRef idx="minor">
-            <a:schemeClr val="lt1"/>
-          </a:fontRef>
-        </p:style>
-        <p:txBody>
-          <a:bodyPr rtlCol="0" anchor="ctr"/>
-          <a:lstStyle/>
-          <a:p>
-            <a:pPr algn="ctr"/>
-            <a:r>
-              <a:rPr lang="en-US" sz="1200" dirty="0"/>
-              <a:t>Pull External Forecasts</a:t>
-            </a:r>
-          </a:p>
-        </p:txBody>
-      </p:sp>
-      <p:sp>
-        <p:nvSpPr>
-          <p:cNvPr id="9" name="Rectangle 8">
-            <a:extLst>
-              <a:ext uri="{FF2B5EF4-FFF2-40B4-BE49-F238E27FC236}">
-                <a16:creationId xmlns:a16="http://schemas.microsoft.com/office/drawing/2014/main" id="{D2278DC8-DC51-403E-85F8-A3AD33216527}"/>
-              </a:ext>
-            </a:extLst>
-          </p:cNvPr>
-          <p:cNvSpPr/>
-          <p:nvPr/>
-        </p:nvSpPr>
-        <p:spPr>
-          <a:xfrm>
-            <a:off x="3456264" y="989901"/>
-            <a:ext cx="2080469" cy="310393"/>
-          </a:xfrm>
-          <a:prstGeom prst="rect">
-            <a:avLst/>
-          </a:prstGeom>
-        </p:spPr>
-        <p:style>
-          <a:lnRef idx="2">
-            <a:schemeClr val="accent1">
-              <a:shade val="50000"/>
-            </a:schemeClr>
-          </a:lnRef>
-          <a:fillRef idx="1">
-            <a:schemeClr val="accent1"/>
-          </a:fillRef>
-          <a:effectRef idx="0">
-            <a:schemeClr val="accent1"/>
-          </a:effectRef>
-          <a:fontRef idx="minor">
-            <a:schemeClr val="lt1"/>
-          </a:fontRef>
-        </p:style>
-        <p:txBody>
-          <a:bodyPr rtlCol="0" anchor="ctr"/>
-          <a:lstStyle/>
-          <a:p>
-            <a:pPr algn="ctr"/>
-            <a:r>
-              <a:rPr lang="en-US" sz="1200" dirty="0"/>
-              <a:t>Create Calculated Variables</a:t>
-            </a:r>
-          </a:p>
-        </p:txBody>
-      </p:sp>
-      <p:cxnSp>
-        <p:nvCxnSpPr>
-          <p:cNvPr id="17" name="Straight Arrow Connector 16">
-            <a:extLst>
-              <a:ext uri="{FF2B5EF4-FFF2-40B4-BE49-F238E27FC236}">
-                <a16:creationId xmlns:a16="http://schemas.microsoft.com/office/drawing/2014/main" id="{22FDC700-B916-4155-A6EF-740258D094DD}"/>
-              </a:ext>
-            </a:extLst>
-          </p:cNvPr>
-          <p:cNvCxnSpPr>
-            <a:cxnSpLocks/>
-            <a:stCxn id="2" idx="2"/>
-          </p:cNvCxnSpPr>
-          <p:nvPr/>
-        </p:nvCxnSpPr>
-        <p:spPr>
-          <a:xfrm>
-            <a:off x="1946246" y="1300294"/>
-            <a:ext cx="0" cy="461394"/>
-          </a:xfrm>
-          <a:prstGeom prst="straightConnector1">
-            <a:avLst/>
-          </a:prstGeom>
-          <a:ln>
-            <a:tailEnd type="triangle"/>
-          </a:ln>
-        </p:spPr>
-        <p:style>
-          <a:lnRef idx="1">
-            <a:schemeClr val="accent1"/>
-          </a:lnRef>
-          <a:fillRef idx="0">
-            <a:schemeClr val="accent1"/>
-          </a:fillRef>
-          <a:effectRef idx="0">
-            <a:schemeClr val="accent1"/>
-          </a:effectRef>
-          <a:fontRef idx="minor">
-            <a:schemeClr val="tx1"/>
-          </a:fontRef>
-        </p:style>
-      </p:cxnSp>
-      <p:sp>
-        <p:nvSpPr>
-          <p:cNvPr id="20" name="Rectangle 19">
-            <a:extLst>
-              <a:ext uri="{FF2B5EF4-FFF2-40B4-BE49-F238E27FC236}">
-                <a16:creationId xmlns:a16="http://schemas.microsoft.com/office/drawing/2014/main" id="{5F59EA85-26B5-47C8-965D-FA4A09BC5DE9}"/>
-              </a:ext>
-            </a:extLst>
-          </p:cNvPr>
-          <p:cNvSpPr/>
-          <p:nvPr/>
-        </p:nvSpPr>
-        <p:spPr>
-          <a:xfrm>
-            <a:off x="906011" y="1761688"/>
-            <a:ext cx="2080469" cy="310393"/>
-          </a:xfrm>
-          <a:prstGeom prst="rect">
-            <a:avLst/>
-          </a:prstGeom>
-        </p:spPr>
-        <p:style>
-          <a:lnRef idx="2">
-            <a:schemeClr val="accent1">
-              <a:shade val="50000"/>
-            </a:schemeClr>
-          </a:lnRef>
-          <a:fillRef idx="1">
-            <a:schemeClr val="accent1"/>
-          </a:fillRef>
-          <a:effectRef idx="0">
-            <a:schemeClr val="accent1"/>
-          </a:effectRef>
-          <a:fontRef idx="minor">
-            <a:schemeClr val="lt1"/>
-          </a:fontRef>
-        </p:style>
-        <p:txBody>
-          <a:bodyPr rtlCol="0" anchor="ctr"/>
-          <a:lstStyle/>
-          <a:p>
-            <a:pPr algn="ctr"/>
-            <a:r>
-              <a:rPr lang="en-US" sz="1200" dirty="0"/>
+              <a:rPr lang="en-US" sz="1000" dirty="0"/>
               <a:t>Conduct Nowcasts</a:t>
             </a:r>
           </a:p>
@@ -3664,8 +3681,8 @@
         </p:nvCxnSpPr>
         <p:spPr>
           <a:xfrm>
-            <a:off x="2986480" y="1916885"/>
-            <a:ext cx="260758" cy="310393"/>
+            <a:off x="2869032" y="2851548"/>
+            <a:ext cx="1908847" cy="116808"/>
           </a:xfrm>
           <a:prstGeom prst="straightConnector1">
             <a:avLst/>
@@ -3675,14 +3692,14 @@
           </a:ln>
         </p:spPr>
         <p:style>
-          <a:lnRef idx="1">
-            <a:schemeClr val="accent1"/>
+          <a:lnRef idx="2">
+            <a:schemeClr val="dk1"/>
           </a:lnRef>
           <a:fillRef idx="0">
-            <a:schemeClr val="accent1"/>
+            <a:schemeClr val="dk1"/>
           </a:fillRef>
-          <a:effectRef idx="0">
-            <a:schemeClr val="accent1"/>
+          <a:effectRef idx="1">
+            <a:schemeClr val="dk1"/>
           </a:effectRef>
           <a:fontRef idx="minor">
             <a:schemeClr val="tx1"/>
@@ -3700,15 +3717,15 @@
           </p:cNvPr>
           <p:cNvCxnSpPr>
             <a:cxnSpLocks/>
-            <a:stCxn id="9" idx="2"/>
+            <a:stCxn id="85" idx="3"/>
             <a:endCxn id="28" idx="0"/>
           </p:cNvCxnSpPr>
           <p:nvPr/>
         </p:nvCxnSpPr>
         <p:spPr>
-          <a:xfrm flipH="1">
-            <a:off x="4287473" y="1300294"/>
-            <a:ext cx="209026" cy="771787"/>
+          <a:xfrm>
+            <a:off x="2928106" y="1831101"/>
+            <a:ext cx="2890008" cy="982058"/>
           </a:xfrm>
           <a:prstGeom prst="straightConnector1">
             <a:avLst/>
@@ -3718,14 +3735,14 @@
           </a:ln>
         </p:spPr>
         <p:style>
-          <a:lnRef idx="1">
-            <a:schemeClr val="accent1"/>
+          <a:lnRef idx="2">
+            <a:schemeClr val="dk1"/>
           </a:lnRef>
           <a:fillRef idx="0">
-            <a:schemeClr val="accent1"/>
+            <a:schemeClr val="dk1"/>
           </a:fillRef>
-          <a:effectRef idx="0">
-            <a:schemeClr val="accent1"/>
+          <a:effectRef idx="1">
+            <a:schemeClr val="dk1"/>
           </a:effectRef>
           <a:fontRef idx="minor">
             <a:schemeClr val="tx1"/>
@@ -3746,7 +3763,7 @@
         </p:nvSpPr>
         <p:spPr>
           <a:xfrm>
-            <a:off x="3247238" y="2072081"/>
+            <a:off x="4777879" y="2813159"/>
             <a:ext cx="2080469" cy="310393"/>
           </a:xfrm>
           <a:prstGeom prst="rect">
@@ -3775,8 +3792,8 @@
           <a:p>
             <a:pPr algn="ctr"/>
             <a:r>
-              <a:rPr lang="en-US" sz="1200" dirty="0"/>
-              <a:t>Create Structural Model</a:t>
+              <a:rPr lang="en-US" sz="1000" dirty="0"/>
+              <a:t>Core Structural Model (Q)</a:t>
             </a:r>
           </a:p>
         </p:txBody>
@@ -3795,8 +3812,8 @@
         </p:nvSpPr>
         <p:spPr>
           <a:xfrm>
-            <a:off x="3247238" y="2857954"/>
-            <a:ext cx="2080469" cy="310393"/>
+            <a:off x="4015531" y="4552096"/>
+            <a:ext cx="3560775" cy="310393"/>
           </a:xfrm>
           <a:prstGeom prst="rect">
             <a:avLst/>
@@ -3824,12 +3841,8 @@
           <a:p>
             <a:pPr algn="ctr"/>
             <a:r>
-              <a:rPr lang="en-US" sz="1200" dirty="0" err="1"/>
-              <a:t>Exogenize</a:t>
-            </a:r>
-            <a:r>
-              <a:rPr lang="en-US" sz="1200" dirty="0"/>
-              <a:t> Inputs (Flexibly for Variables &amp; Dates)</a:t>
+              <a:rPr lang="en-US" sz="1000" dirty="0"/>
+              <a:t>Exogenous Inputs (Flexibly for Variables &amp; Dates)</a:t>
             </a:r>
           </a:p>
         </p:txBody>
@@ -3845,15 +3858,15 @@
           </p:cNvPr>
           <p:cNvCxnSpPr>
             <a:cxnSpLocks/>
-            <a:stCxn id="28" idx="2"/>
-            <a:endCxn id="33" idx="0"/>
+            <a:stCxn id="33" idx="0"/>
+            <a:endCxn id="20" idx="2"/>
           </p:cNvCxnSpPr>
           <p:nvPr/>
         </p:nvCxnSpPr>
         <p:spPr>
-          <a:xfrm>
-            <a:off x="4287473" y="2382474"/>
-            <a:ext cx="0" cy="475480"/>
+          <a:xfrm flipH="1" flipV="1">
+            <a:off x="1828798" y="3006744"/>
+            <a:ext cx="3967121" cy="1545352"/>
           </a:xfrm>
           <a:prstGeom prst="straightConnector1">
             <a:avLst/>
@@ -3863,26 +3876,112 @@
           </a:ln>
         </p:spPr>
         <p:style>
-          <a:lnRef idx="1">
-            <a:schemeClr val="accent1"/>
+          <a:lnRef idx="2">
+            <a:schemeClr val="dk1"/>
           </a:lnRef>
           <a:fillRef idx="0">
-            <a:schemeClr val="accent1"/>
+            <a:schemeClr val="dk1"/>
           </a:fillRef>
-          <a:effectRef idx="0">
-            <a:schemeClr val="accent1"/>
+          <a:effectRef idx="1">
+            <a:schemeClr val="dk1"/>
           </a:effectRef>
           <a:fontRef idx="minor">
             <a:schemeClr val="tx1"/>
           </a:fontRef>
         </p:style>
       </p:cxnSp>
-      <p:sp>
-        <p:nvSpPr>
-          <p:cNvPr id="19" name="Rectangle 18">
-            <a:extLst>
-              <a:ext uri="{FF2B5EF4-FFF2-40B4-BE49-F238E27FC236}">
-                <a16:creationId xmlns:a16="http://schemas.microsoft.com/office/drawing/2014/main" id="{57CDE3F9-E00A-4752-AE2E-11EDF3843C0B}"/>
+      <p:cxnSp>
+        <p:nvCxnSpPr>
+          <p:cNvPr id="32" name="Straight Arrow Connector 31">
+            <a:extLst>
+              <a:ext uri="{FF2B5EF4-FFF2-40B4-BE49-F238E27FC236}">
+                <a16:creationId xmlns:a16="http://schemas.microsoft.com/office/drawing/2014/main" id="{29E50BA3-D294-4424-853B-7726E090721A}"/>
+              </a:ext>
+            </a:extLst>
+          </p:cNvPr>
+          <p:cNvCxnSpPr>
+            <a:cxnSpLocks/>
+            <a:stCxn id="33" idx="0"/>
+            <a:endCxn id="28" idx="2"/>
+          </p:cNvCxnSpPr>
+          <p:nvPr/>
+        </p:nvCxnSpPr>
+        <p:spPr>
+          <a:xfrm flipV="1">
+            <a:off x="5795919" y="3123552"/>
+            <a:ext cx="22195" cy="1428544"/>
+          </a:xfrm>
+          <a:prstGeom prst="straightConnector1">
+            <a:avLst/>
+          </a:prstGeom>
+          <a:ln>
+            <a:tailEnd type="triangle"/>
+          </a:ln>
+        </p:spPr>
+        <p:style>
+          <a:lnRef idx="2">
+            <a:schemeClr val="dk1"/>
+          </a:lnRef>
+          <a:fillRef idx="0">
+            <a:schemeClr val="dk1"/>
+          </a:fillRef>
+          <a:effectRef idx="1">
+            <a:schemeClr val="dk1"/>
+          </a:effectRef>
+          <a:fontRef idx="minor">
+            <a:schemeClr val="tx1"/>
+          </a:fontRef>
+        </p:style>
+      </p:cxnSp>
+      <p:cxnSp>
+        <p:nvCxnSpPr>
+          <p:cNvPr id="38" name="Straight Arrow Connector 37">
+            <a:extLst>
+              <a:ext uri="{FF2B5EF4-FFF2-40B4-BE49-F238E27FC236}">
+                <a16:creationId xmlns:a16="http://schemas.microsoft.com/office/drawing/2014/main" id="{0C294E21-0FD6-4FB6-A5A9-6F2E3ED17833}"/>
+              </a:ext>
+            </a:extLst>
+          </p:cNvPr>
+          <p:cNvCxnSpPr>
+            <a:cxnSpLocks/>
+            <a:stCxn id="7" idx="3"/>
+            <a:endCxn id="33" idx="1"/>
+          </p:cNvCxnSpPr>
+          <p:nvPr/>
+        </p:nvCxnSpPr>
+        <p:spPr>
+          <a:xfrm>
+            <a:off x="2869033" y="4209335"/>
+            <a:ext cx="1146498" cy="497958"/>
+          </a:xfrm>
+          <a:prstGeom prst="straightConnector1">
+            <a:avLst/>
+          </a:prstGeom>
+          <a:ln>
+            <a:tailEnd type="triangle"/>
+          </a:ln>
+        </p:spPr>
+        <p:style>
+          <a:lnRef idx="2">
+            <a:schemeClr val="dk1"/>
+          </a:lnRef>
+          <a:fillRef idx="0">
+            <a:schemeClr val="dk1"/>
+          </a:fillRef>
+          <a:effectRef idx="1">
+            <a:schemeClr val="dk1"/>
+          </a:effectRef>
+          <a:fontRef idx="minor">
+            <a:schemeClr val="tx1"/>
+          </a:fontRef>
+        </p:style>
+      </p:cxnSp>
+      <p:sp>
+        <p:nvSpPr>
+          <p:cNvPr id="48" name="Rectangle 47">
+            <a:extLst>
+              <a:ext uri="{FF2B5EF4-FFF2-40B4-BE49-F238E27FC236}">
+                <a16:creationId xmlns:a16="http://schemas.microsoft.com/office/drawing/2014/main" id="{64CC16FE-2F89-436A-B7A5-1E6C439BDA6B}"/>
               </a:ext>
             </a:extLst>
           </p:cNvPr>
@@ -3891,7 +3990,185 @@
         </p:nvSpPr>
         <p:spPr>
           <a:xfrm>
-            <a:off x="4391986" y="2465017"/>
+            <a:off x="1361813" y="5543660"/>
+            <a:ext cx="2080469" cy="310393"/>
+          </a:xfrm>
+          <a:prstGeom prst="rect">
+            <a:avLst/>
+          </a:prstGeom>
+        </p:spPr>
+        <p:style>
+          <a:lnRef idx="2">
+            <a:schemeClr val="accent6">
+              <a:shade val="50000"/>
+            </a:schemeClr>
+          </a:lnRef>
+          <a:fillRef idx="1">
+            <a:schemeClr val="accent6"/>
+          </a:fillRef>
+          <a:effectRef idx="0">
+            <a:schemeClr val="accent6"/>
+          </a:effectRef>
+          <a:fontRef idx="minor">
+            <a:schemeClr val="lt1"/>
+          </a:fontRef>
+        </p:style>
+        <p:txBody>
+          <a:bodyPr rtlCol="0" anchor="ctr"/>
+          <a:lstStyle/>
+          <a:p>
+            <a:pPr algn="ctr"/>
+            <a:r>
+              <a:rPr lang="en-US" sz="1000" dirty="0"/>
+              <a:t>Conduct Initial Forecasts</a:t>
+            </a:r>
+          </a:p>
+        </p:txBody>
+      </p:sp>
+      <p:cxnSp>
+        <p:nvCxnSpPr>
+          <p:cNvPr id="49" name="Straight Arrow Connector 48">
+            <a:extLst>
+              <a:ext uri="{FF2B5EF4-FFF2-40B4-BE49-F238E27FC236}">
+                <a16:creationId xmlns:a16="http://schemas.microsoft.com/office/drawing/2014/main" id="{8D459ECA-44BF-491F-B15D-8705AD735C78}"/>
+              </a:ext>
+            </a:extLst>
+          </p:cNvPr>
+          <p:cNvCxnSpPr>
+            <a:cxnSpLocks/>
+            <a:stCxn id="7" idx="2"/>
+            <a:endCxn id="48" idx="0"/>
+          </p:cNvCxnSpPr>
+          <p:nvPr/>
+        </p:nvCxnSpPr>
+        <p:spPr>
+          <a:xfrm>
+            <a:off x="1828799" y="4364531"/>
+            <a:ext cx="573249" cy="1179129"/>
+          </a:xfrm>
+          <a:prstGeom prst="straightConnector1">
+            <a:avLst/>
+          </a:prstGeom>
+          <a:ln>
+            <a:tailEnd type="triangle"/>
+          </a:ln>
+        </p:spPr>
+        <p:style>
+          <a:lnRef idx="2">
+            <a:schemeClr val="dk1"/>
+          </a:lnRef>
+          <a:fillRef idx="0">
+            <a:schemeClr val="dk1"/>
+          </a:fillRef>
+          <a:effectRef idx="1">
+            <a:schemeClr val="dk1"/>
+          </a:effectRef>
+          <a:fontRef idx="minor">
+            <a:schemeClr val="tx1"/>
+          </a:fontRef>
+        </p:style>
+      </p:cxnSp>
+      <p:cxnSp>
+        <p:nvCxnSpPr>
+          <p:cNvPr id="52" name="Straight Arrow Connector 51">
+            <a:extLst>
+              <a:ext uri="{FF2B5EF4-FFF2-40B4-BE49-F238E27FC236}">
+                <a16:creationId xmlns:a16="http://schemas.microsoft.com/office/drawing/2014/main" id="{98A2E6D1-C109-41EB-B80C-971A378698FE}"/>
+              </a:ext>
+            </a:extLst>
+          </p:cNvPr>
+          <p:cNvCxnSpPr>
+            <a:cxnSpLocks/>
+            <a:stCxn id="48" idx="0"/>
+            <a:endCxn id="20" idx="2"/>
+          </p:cNvCxnSpPr>
+          <p:nvPr/>
+        </p:nvCxnSpPr>
+        <p:spPr>
+          <a:xfrm flipH="1" flipV="1">
+            <a:off x="1828798" y="3006744"/>
+            <a:ext cx="573250" cy="2536916"/>
+          </a:xfrm>
+          <a:prstGeom prst="straightConnector1">
+            <a:avLst/>
+          </a:prstGeom>
+          <a:ln>
+            <a:tailEnd type="triangle"/>
+          </a:ln>
+        </p:spPr>
+        <p:style>
+          <a:lnRef idx="2">
+            <a:schemeClr val="dk1"/>
+          </a:lnRef>
+          <a:fillRef idx="0">
+            <a:schemeClr val="dk1"/>
+          </a:fillRef>
+          <a:effectRef idx="1">
+            <a:schemeClr val="dk1"/>
+          </a:effectRef>
+          <a:fontRef idx="minor">
+            <a:schemeClr val="tx1"/>
+          </a:fontRef>
+        </p:style>
+      </p:cxnSp>
+      <p:cxnSp>
+        <p:nvCxnSpPr>
+          <p:cNvPr id="59" name="Straight Arrow Connector 58">
+            <a:extLst>
+              <a:ext uri="{FF2B5EF4-FFF2-40B4-BE49-F238E27FC236}">
+                <a16:creationId xmlns:a16="http://schemas.microsoft.com/office/drawing/2014/main" id="{B0462B00-54DB-45F1-8E25-59560F81BE48}"/>
+              </a:ext>
+            </a:extLst>
+          </p:cNvPr>
+          <p:cNvCxnSpPr>
+            <a:cxnSpLocks/>
+            <a:stCxn id="28" idx="3"/>
+            <a:endCxn id="62" idx="1"/>
+          </p:cNvCxnSpPr>
+          <p:nvPr/>
+        </p:nvCxnSpPr>
+        <p:spPr>
+          <a:xfrm flipV="1">
+            <a:off x="6858348" y="2139645"/>
+            <a:ext cx="717958" cy="828711"/>
+          </a:xfrm>
+          <a:prstGeom prst="straightConnector1">
+            <a:avLst/>
+          </a:prstGeom>
+          <a:ln>
+            <a:tailEnd type="triangle"/>
+          </a:ln>
+        </p:spPr>
+        <p:style>
+          <a:lnRef idx="2">
+            <a:schemeClr val="dk1"/>
+          </a:lnRef>
+          <a:fillRef idx="0">
+            <a:schemeClr val="dk1"/>
+          </a:fillRef>
+          <a:effectRef idx="1">
+            <a:schemeClr val="dk1"/>
+          </a:effectRef>
+          <a:fontRef idx="minor">
+            <a:schemeClr val="tx1"/>
+          </a:fontRef>
+        </p:style>
+      </p:cxnSp>
+      <p:sp>
+        <p:nvSpPr>
+          <p:cNvPr id="62" name="Rectangle 61">
+            <a:extLst>
+              <a:ext uri="{FF2B5EF4-FFF2-40B4-BE49-F238E27FC236}">
+                <a16:creationId xmlns:a16="http://schemas.microsoft.com/office/drawing/2014/main" id="{07F67166-5280-4BCC-A78F-8AC228E8F8DB}"/>
+              </a:ext>
+            </a:extLst>
+          </p:cNvPr>
+          <p:cNvSpPr/>
+          <p:nvPr/>
+        </p:nvSpPr>
+        <p:spPr>
+          <a:xfrm>
+            <a:off x="7576306" y="1984448"/>
             <a:ext cx="2080469" cy="310393"/>
           </a:xfrm>
           <a:prstGeom prst="rect">
@@ -3920,20 +4197,204 @@
           <a:p>
             <a:pPr algn="ctr"/>
             <a:r>
-              <a:rPr lang="en-US" sz="1200" dirty="0"/>
-              <a:t>Note Recommended </a:t>
-            </a:r>
-            <a:r>
-              <a:rPr lang="en-US" sz="1200" dirty="0" err="1"/>
-              <a:t>Exogenized</a:t>
-            </a:r>
-            <a:r>
-              <a:rPr lang="en-US" sz="1200" dirty="0"/>
-              <a:t> Variables</a:t>
-            </a:r>
-          </a:p>
-        </p:txBody>
-      </p:sp>
+              <a:rPr lang="en-US" sz="1000" dirty="0"/>
+              <a:t>Structural Post Calcs (Q)</a:t>
+            </a:r>
+          </a:p>
+        </p:txBody>
+      </p:sp>
+      <p:cxnSp>
+        <p:nvCxnSpPr>
+          <p:cNvPr id="66" name="Straight Arrow Connector 65">
+            <a:extLst>
+              <a:ext uri="{FF2B5EF4-FFF2-40B4-BE49-F238E27FC236}">
+                <a16:creationId xmlns:a16="http://schemas.microsoft.com/office/drawing/2014/main" id="{CFF27E37-97C2-4CAA-A34D-DEE97D38CC69}"/>
+              </a:ext>
+            </a:extLst>
+          </p:cNvPr>
+          <p:cNvCxnSpPr>
+            <a:cxnSpLocks/>
+            <a:stCxn id="28" idx="3"/>
+            <a:endCxn id="69" idx="1"/>
+          </p:cNvCxnSpPr>
+          <p:nvPr/>
+        </p:nvCxnSpPr>
+        <p:spPr>
+          <a:xfrm flipV="1">
+            <a:off x="6858348" y="2734741"/>
+            <a:ext cx="717959" cy="233615"/>
+          </a:xfrm>
+          <a:prstGeom prst="straightConnector1">
+            <a:avLst/>
+          </a:prstGeom>
+          <a:ln>
+            <a:tailEnd type="triangle"/>
+          </a:ln>
+        </p:spPr>
+        <p:style>
+          <a:lnRef idx="2">
+            <a:schemeClr val="dk1"/>
+          </a:lnRef>
+          <a:fillRef idx="0">
+            <a:schemeClr val="dk1"/>
+          </a:fillRef>
+          <a:effectRef idx="1">
+            <a:schemeClr val="dk1"/>
+          </a:effectRef>
+          <a:fontRef idx="minor">
+            <a:schemeClr val="tx1"/>
+          </a:fontRef>
+        </p:style>
+      </p:cxnSp>
+      <p:sp>
+        <p:nvSpPr>
+          <p:cNvPr id="69" name="Rectangle 68">
+            <a:extLst>
+              <a:ext uri="{FF2B5EF4-FFF2-40B4-BE49-F238E27FC236}">
+                <a16:creationId xmlns:a16="http://schemas.microsoft.com/office/drawing/2014/main" id="{1E47223A-6ED9-424C-A2FF-034DA27B9C65}"/>
+              </a:ext>
+            </a:extLst>
+          </p:cNvPr>
+          <p:cNvSpPr/>
+          <p:nvPr/>
+        </p:nvSpPr>
+        <p:spPr>
+          <a:xfrm>
+            <a:off x="7576307" y="2579544"/>
+            <a:ext cx="2080469" cy="310393"/>
+          </a:xfrm>
+          <a:prstGeom prst="rect">
+            <a:avLst/>
+          </a:prstGeom>
+        </p:spPr>
+        <p:style>
+          <a:lnRef idx="2">
+            <a:schemeClr val="accent1">
+              <a:shade val="50000"/>
+            </a:schemeClr>
+          </a:lnRef>
+          <a:fillRef idx="1">
+            <a:schemeClr val="accent1"/>
+          </a:fillRef>
+          <a:effectRef idx="0">
+            <a:schemeClr val="accent1"/>
+          </a:effectRef>
+          <a:fontRef idx="minor">
+            <a:schemeClr val="lt1"/>
+          </a:fontRef>
+        </p:style>
+        <p:txBody>
+          <a:bodyPr rtlCol="0" anchor="ctr"/>
+          <a:lstStyle/>
+          <a:p>
+            <a:pPr algn="ctr"/>
+            <a:r>
+              <a:rPr lang="en-US" sz="1000" dirty="0"/>
+              <a:t>Structural Post Calcs (M)</a:t>
+            </a:r>
+          </a:p>
+        </p:txBody>
+      </p:sp>
+      <p:sp>
+        <p:nvSpPr>
+          <p:cNvPr id="85" name="Rectangle 84">
+            <a:extLst>
+              <a:ext uri="{FF2B5EF4-FFF2-40B4-BE49-F238E27FC236}">
+                <a16:creationId xmlns:a16="http://schemas.microsoft.com/office/drawing/2014/main" id="{E4406787-F7D2-4F15-8EAC-E94B69FE02CA}"/>
+              </a:ext>
+            </a:extLst>
+          </p:cNvPr>
+          <p:cNvSpPr/>
+          <p:nvPr/>
+        </p:nvSpPr>
+        <p:spPr>
+          <a:xfrm>
+            <a:off x="847637" y="1675904"/>
+            <a:ext cx="2080469" cy="310393"/>
+          </a:xfrm>
+          <a:prstGeom prst="rect">
+            <a:avLst/>
+          </a:prstGeom>
+        </p:spPr>
+        <p:style>
+          <a:lnRef idx="2">
+            <a:schemeClr val="accent2">
+              <a:shade val="50000"/>
+            </a:schemeClr>
+          </a:lnRef>
+          <a:fillRef idx="1">
+            <a:schemeClr val="accent2"/>
+          </a:fillRef>
+          <a:effectRef idx="0">
+            <a:schemeClr val="accent2"/>
+          </a:effectRef>
+          <a:fontRef idx="minor">
+            <a:schemeClr val="lt1"/>
+          </a:fontRef>
+        </p:style>
+        <p:txBody>
+          <a:bodyPr rtlCol="0" anchor="ctr"/>
+          <a:lstStyle/>
+          <a:p>
+            <a:pPr algn="ctr"/>
+            <a:r>
+              <a:rPr lang="en-US" sz="1000" dirty="0"/>
+              <a:t>Transformations [</a:t>
+            </a:r>
+            <a:r>
+              <a:rPr lang="en-US" sz="1000" dirty="0" err="1"/>
+              <a:t>ef</a:t>
+            </a:r>
+            <a:r>
+              <a:rPr lang="en-US" sz="1000" dirty="0"/>
+              <a:t>, h]</a:t>
+            </a:r>
+          </a:p>
+        </p:txBody>
+      </p:sp>
+      <p:cxnSp>
+        <p:nvCxnSpPr>
+          <p:cNvPr id="102" name="Straight Arrow Connector 101">
+            <a:extLst>
+              <a:ext uri="{FF2B5EF4-FFF2-40B4-BE49-F238E27FC236}">
+                <a16:creationId xmlns:a16="http://schemas.microsoft.com/office/drawing/2014/main" id="{3601EFF9-0DBF-43D8-9998-5A41D8FA11E8}"/>
+              </a:ext>
+            </a:extLst>
+          </p:cNvPr>
+          <p:cNvCxnSpPr>
+            <a:cxnSpLocks/>
+            <a:stCxn id="2" idx="3"/>
+            <a:endCxn id="9" idx="0"/>
+          </p:cNvCxnSpPr>
+          <p:nvPr/>
+        </p:nvCxnSpPr>
+        <p:spPr>
+          <a:xfrm>
+            <a:off x="2608973" y="665420"/>
+            <a:ext cx="638266" cy="360690"/>
+          </a:xfrm>
+          <a:prstGeom prst="straightConnector1">
+            <a:avLst/>
+          </a:prstGeom>
+          <a:ln>
+            <a:tailEnd type="triangle"/>
+          </a:ln>
+        </p:spPr>
+        <p:style>
+          <a:lnRef idx="3">
+            <a:schemeClr val="dk1"/>
+          </a:lnRef>
+          <a:fillRef idx="0">
+            <a:schemeClr val="dk1"/>
+          </a:fillRef>
+          <a:effectRef idx="2">
+            <a:schemeClr val="dk1"/>
+          </a:effectRef>
+          <a:fontRef idx="minor">
+            <a:schemeClr val="tx1"/>
+          </a:fontRef>
+        </p:style>
+      </p:cxnSp>
     </p:spTree>
     <p:extLst>
       <p:ext uri="{BB962C8B-B14F-4D97-AF65-F5344CB8AC3E}">

</xml_diff>

<commit_message>
Added SEM coefficient extraction (v0.14)
</commit_message>
<xml_diff>
--- a/documentation-templates/model-flow.pptx
+++ b/documentation-templates/model-flow.pptx
@@ -263,7 +263,7 @@
           <a:p>
             <a:fld id="{A7C790ED-1353-428C-9EC0-1379BDA992E3}" type="datetimeFigureOut">
               <a:rPr lang="en-US" smtClean="0"/>
-              <a:t>6/27/2021</a:t>
+              <a:t>7/5/2021</a:t>
             </a:fld>
             <a:endParaRPr lang="en-US"/>
           </a:p>
@@ -461,7 +461,7 @@
           <a:p>
             <a:fld id="{A7C790ED-1353-428C-9EC0-1379BDA992E3}" type="datetimeFigureOut">
               <a:rPr lang="en-US" smtClean="0"/>
-              <a:t>6/27/2021</a:t>
+              <a:t>7/5/2021</a:t>
             </a:fld>
             <a:endParaRPr lang="en-US"/>
           </a:p>
@@ -669,7 +669,7 @@
           <a:p>
             <a:fld id="{A7C790ED-1353-428C-9EC0-1379BDA992E3}" type="datetimeFigureOut">
               <a:rPr lang="en-US" smtClean="0"/>
-              <a:t>6/27/2021</a:t>
+              <a:t>7/5/2021</a:t>
             </a:fld>
             <a:endParaRPr lang="en-US"/>
           </a:p>
@@ -867,7 +867,7 @@
           <a:p>
             <a:fld id="{A7C790ED-1353-428C-9EC0-1379BDA992E3}" type="datetimeFigureOut">
               <a:rPr lang="en-US" smtClean="0"/>
-              <a:t>6/27/2021</a:t>
+              <a:t>7/5/2021</a:t>
             </a:fld>
             <a:endParaRPr lang="en-US"/>
           </a:p>
@@ -1142,7 +1142,7 @@
           <a:p>
             <a:fld id="{A7C790ED-1353-428C-9EC0-1379BDA992E3}" type="datetimeFigureOut">
               <a:rPr lang="en-US" smtClean="0"/>
-              <a:t>6/27/2021</a:t>
+              <a:t>7/5/2021</a:t>
             </a:fld>
             <a:endParaRPr lang="en-US"/>
           </a:p>
@@ -1407,7 +1407,7 @@
           <a:p>
             <a:fld id="{A7C790ED-1353-428C-9EC0-1379BDA992E3}" type="datetimeFigureOut">
               <a:rPr lang="en-US" smtClean="0"/>
-              <a:t>6/27/2021</a:t>
+              <a:t>7/5/2021</a:t>
             </a:fld>
             <a:endParaRPr lang="en-US"/>
           </a:p>
@@ -1819,7 +1819,7 @@
           <a:p>
             <a:fld id="{A7C790ED-1353-428C-9EC0-1379BDA992E3}" type="datetimeFigureOut">
               <a:rPr lang="en-US" smtClean="0"/>
-              <a:t>6/27/2021</a:t>
+              <a:t>7/5/2021</a:t>
             </a:fld>
             <a:endParaRPr lang="en-US"/>
           </a:p>
@@ -1960,7 +1960,7 @@
           <a:p>
             <a:fld id="{A7C790ED-1353-428C-9EC0-1379BDA992E3}" type="datetimeFigureOut">
               <a:rPr lang="en-US" smtClean="0"/>
-              <a:t>6/27/2021</a:t>
+              <a:t>7/5/2021</a:t>
             </a:fld>
             <a:endParaRPr lang="en-US"/>
           </a:p>
@@ -2073,7 +2073,7 @@
           <a:p>
             <a:fld id="{A7C790ED-1353-428C-9EC0-1379BDA992E3}" type="datetimeFigureOut">
               <a:rPr lang="en-US" smtClean="0"/>
-              <a:t>6/27/2021</a:t>
+              <a:t>7/5/2021</a:t>
             </a:fld>
             <a:endParaRPr lang="en-US"/>
           </a:p>
@@ -2384,7 +2384,7 @@
           <a:p>
             <a:fld id="{A7C790ED-1353-428C-9EC0-1379BDA992E3}" type="datetimeFigureOut">
               <a:rPr lang="en-US" smtClean="0"/>
-              <a:t>6/27/2021</a:t>
+              <a:t>7/5/2021</a:t>
             </a:fld>
             <a:endParaRPr lang="en-US"/>
           </a:p>
@@ -2672,7 +2672,7 @@
           <a:p>
             <a:fld id="{A7C790ED-1353-428C-9EC0-1379BDA992E3}" type="datetimeFigureOut">
               <a:rPr lang="en-US" smtClean="0"/>
-              <a:t>6/27/2021</a:t>
+              <a:t>7/5/2021</a:t>
             </a:fld>
             <a:endParaRPr lang="en-US"/>
           </a:p>
@@ -2913,7 +2913,7 @@
           <a:p>
             <a:fld id="{A7C790ED-1353-428C-9EC0-1379BDA992E3}" type="datetimeFigureOut">
               <a:rPr lang="en-US" smtClean="0"/>
-              <a:t>6/27/2021</a:t>
+              <a:t>7/5/2021</a:t>
             </a:fld>
             <a:endParaRPr lang="en-US"/>
           </a:p>
@@ -3628,7 +3628,7 @@
         </p:nvSpPr>
         <p:spPr>
           <a:xfrm>
-            <a:off x="788563" y="2696351"/>
+            <a:off x="528504" y="2998984"/>
             <a:ext cx="2080469" cy="310393"/>
           </a:xfrm>
           <a:prstGeom prst="rect">
@@ -3680,9 +3680,9 @@
           <p:nvPr/>
         </p:nvCxnSpPr>
         <p:spPr>
-          <a:xfrm>
-            <a:off x="2869032" y="2851548"/>
-            <a:ext cx="1908847" cy="116808"/>
+          <a:xfrm flipV="1">
+            <a:off x="2608973" y="3117200"/>
+            <a:ext cx="1763178" cy="36981"/>
           </a:xfrm>
           <a:prstGeom prst="straightConnector1">
             <a:avLst/>
@@ -3725,7 +3725,7 @@
         <p:spPr>
           <a:xfrm>
             <a:off x="2928106" y="1831101"/>
-            <a:ext cx="2890008" cy="982058"/>
+            <a:ext cx="2484280" cy="1130902"/>
           </a:xfrm>
           <a:prstGeom prst="straightConnector1">
             <a:avLst/>
@@ -3763,7 +3763,7 @@
         </p:nvSpPr>
         <p:spPr>
           <a:xfrm>
-            <a:off x="4777879" y="2813159"/>
+            <a:off x="4372151" y="2962003"/>
             <a:ext cx="2080469" cy="310393"/>
           </a:xfrm>
           <a:prstGeom prst="rect">
@@ -3865,8 +3865,8 @@
         </p:nvCxnSpPr>
         <p:spPr>
           <a:xfrm flipH="1" flipV="1">
-            <a:off x="1828798" y="3006744"/>
-            <a:ext cx="3967121" cy="1545352"/>
+            <a:off x="1568739" y="3309377"/>
+            <a:ext cx="4227180" cy="1242719"/>
           </a:xfrm>
           <a:prstGeom prst="straightConnector1">
             <a:avLst/>
@@ -3907,9 +3907,9 @@
           <p:nvPr/>
         </p:nvCxnSpPr>
         <p:spPr>
-          <a:xfrm flipV="1">
-            <a:off x="5795919" y="3123552"/>
-            <a:ext cx="22195" cy="1428544"/>
+          <a:xfrm flipH="1" flipV="1">
+            <a:off x="5412386" y="3272396"/>
+            <a:ext cx="383533" cy="1279700"/>
           </a:xfrm>
           <a:prstGeom prst="straightConnector1">
             <a:avLst/>
@@ -3990,7 +3990,7 @@
         </p:nvSpPr>
         <p:spPr>
           <a:xfrm>
-            <a:off x="1361813" y="5543660"/>
+            <a:off x="1610597" y="5494671"/>
             <a:ext cx="2080469" cy="310393"/>
           </a:xfrm>
           <a:prstGeom prst="rect">
@@ -3999,15 +3999,15 @@
         </p:spPr>
         <p:style>
           <a:lnRef idx="2">
-            <a:schemeClr val="accent6">
+            <a:schemeClr val="accent2">
               <a:shade val="50000"/>
             </a:schemeClr>
           </a:lnRef>
           <a:fillRef idx="1">
-            <a:schemeClr val="accent6"/>
+            <a:schemeClr val="accent2"/>
           </a:fillRef>
           <a:effectRef idx="0">
-            <a:schemeClr val="accent6"/>
+            <a:schemeClr val="accent2"/>
           </a:effectRef>
           <a:fontRef idx="minor">
             <a:schemeClr val="lt1"/>
@@ -4044,7 +4044,7 @@
         <p:spPr>
           <a:xfrm>
             <a:off x="1828799" y="4364531"/>
-            <a:ext cx="573249" cy="1179129"/>
+            <a:ext cx="822033" cy="1130140"/>
           </a:xfrm>
           <a:prstGeom prst="straightConnector1">
             <a:avLst/>
@@ -4086,8 +4086,8 @@
         </p:nvCxnSpPr>
         <p:spPr>
           <a:xfrm flipH="1" flipV="1">
-            <a:off x="1828798" y="3006744"/>
-            <a:ext cx="573250" cy="2536916"/>
+            <a:off x="1568739" y="3309377"/>
+            <a:ext cx="1082093" cy="2185294"/>
           </a:xfrm>
           <a:prstGeom prst="straightConnector1">
             <a:avLst/>
@@ -4129,8 +4129,8 @@
         </p:nvCxnSpPr>
         <p:spPr>
           <a:xfrm flipV="1">
-            <a:off x="6858348" y="2139645"/>
-            <a:ext cx="717958" cy="828711"/>
+            <a:off x="6452620" y="2139645"/>
+            <a:ext cx="1123686" cy="977555"/>
           </a:xfrm>
           <a:prstGeom prst="straightConnector1">
             <a:avLst/>
@@ -4221,8 +4221,8 @@
         </p:nvCxnSpPr>
         <p:spPr>
           <a:xfrm flipV="1">
-            <a:off x="6858348" y="2734741"/>
-            <a:ext cx="717959" cy="233615"/>
+            <a:off x="6452620" y="2734741"/>
+            <a:ext cx="1123687" cy="382459"/>
           </a:xfrm>
           <a:prstGeom prst="straightConnector1">
             <a:avLst/>

</xml_diff>

<commit_message>
Added updated docs (v0.14)
</commit_message>
<xml_diff>
--- a/documentation-templates/model-flow.pptx
+++ b/documentation-templates/model-flow.pptx
@@ -3344,7 +3344,7 @@
         </p:nvSpPr>
         <p:spPr>
           <a:xfrm>
-            <a:off x="4287473" y="451284"/>
+            <a:off x="4866334" y="273111"/>
             <a:ext cx="3061283" cy="246221"/>
           </a:xfrm>
           <a:prstGeom prst="rect">
@@ -3358,6 +3358,7 @@
           </a:bodyPr>
           <a:lstStyle/>
           <a:p>
+            <a:pPr algn="ctr"/>
             <a:r>
               <a:rPr lang="en-US" sz="1000" dirty="0"/>
               <a:t>Updated Model</a:t>
@@ -3440,8 +3441,8 @@
         </p:nvCxnSpPr>
         <p:spPr>
           <a:xfrm flipH="1">
-            <a:off x="1887872" y="1336503"/>
-            <a:ext cx="1359367" cy="339401"/>
+            <a:off x="1518316" y="1091193"/>
+            <a:ext cx="2307784" cy="229264"/>
           </a:xfrm>
           <a:prstGeom prst="straightConnector1">
             <a:avLst/>
@@ -3479,7 +3480,7 @@
         </p:nvSpPr>
         <p:spPr>
           <a:xfrm>
-            <a:off x="788564" y="4054138"/>
+            <a:off x="528505" y="5130778"/>
             <a:ext cx="2080469" cy="310393"/>
           </a:xfrm>
           <a:prstGeom prst="rect">
@@ -3528,7 +3529,7 @@
         </p:nvSpPr>
         <p:spPr>
           <a:xfrm>
-            <a:off x="2207004" y="1026110"/>
+            <a:off x="2785865" y="780800"/>
             <a:ext cx="2080469" cy="310393"/>
           </a:xfrm>
           <a:prstGeom prst="rect">
@@ -3588,9 +3589,9 @@
           <p:nvPr/>
         </p:nvCxnSpPr>
         <p:spPr>
-          <a:xfrm>
-            <a:off x="1568739" y="820616"/>
-            <a:ext cx="319133" cy="855288"/>
+          <a:xfrm flipH="1">
+            <a:off x="1518316" y="820616"/>
+            <a:ext cx="50423" cy="499841"/>
           </a:xfrm>
           <a:prstGeom prst="straightConnector1">
             <a:avLst/>
@@ -3628,7 +3629,7 @@
         </p:nvSpPr>
         <p:spPr>
           <a:xfrm>
-            <a:off x="528504" y="2998984"/>
+            <a:off x="2177301" y="2834424"/>
             <a:ext cx="2080469" cy="310393"/>
           </a:xfrm>
           <a:prstGeom prst="rect">
@@ -3680,9 +3681,9 @@
           <p:nvPr/>
         </p:nvCxnSpPr>
         <p:spPr>
-          <a:xfrm flipV="1">
-            <a:off x="2608973" y="3117200"/>
-            <a:ext cx="1763178" cy="36981"/>
+          <a:xfrm>
+            <a:off x="4257770" y="2989621"/>
+            <a:ext cx="1010517" cy="1"/>
           </a:xfrm>
           <a:prstGeom prst="straightConnector1">
             <a:avLst/>
@@ -3718,14 +3719,14 @@
           <p:cNvCxnSpPr>
             <a:cxnSpLocks/>
             <a:stCxn id="85" idx="3"/>
-            <a:endCxn id="28" idx="0"/>
+            <a:endCxn id="20" idx="0"/>
           </p:cNvCxnSpPr>
           <p:nvPr/>
         </p:nvCxnSpPr>
         <p:spPr>
           <a:xfrm>
-            <a:off x="2928106" y="1831101"/>
-            <a:ext cx="2484280" cy="1130902"/>
+            <a:off x="2558550" y="1475654"/>
+            <a:ext cx="658986" cy="1358770"/>
           </a:xfrm>
           <a:prstGeom prst="straightConnector1">
             <a:avLst/>
@@ -3763,7 +3764,7 @@
         </p:nvSpPr>
         <p:spPr>
           <a:xfrm>
-            <a:off x="4372151" y="2962003"/>
+            <a:off x="5268287" y="2834425"/>
             <a:ext cx="2080469" cy="310393"/>
           </a:xfrm>
           <a:prstGeom prst="rect">
@@ -3812,7 +3813,7 @@
         </p:nvSpPr>
         <p:spPr>
           <a:xfrm>
-            <a:off x="4015531" y="4552096"/>
+            <a:off x="3220386" y="5882187"/>
             <a:ext cx="3560775" cy="310393"/>
           </a:xfrm>
           <a:prstGeom prst="rect">
@@ -3849,49 +3850,6 @@
       </p:sp>
       <p:cxnSp>
         <p:nvCxnSpPr>
-          <p:cNvPr id="15" name="Straight Arrow Connector 14">
-            <a:extLst>
-              <a:ext uri="{FF2B5EF4-FFF2-40B4-BE49-F238E27FC236}">
-                <a16:creationId xmlns:a16="http://schemas.microsoft.com/office/drawing/2014/main" id="{86AA03D7-41C8-4057-817B-50B62DBEAD80}"/>
-              </a:ext>
-            </a:extLst>
-          </p:cNvPr>
-          <p:cNvCxnSpPr>
-            <a:cxnSpLocks/>
-            <a:stCxn id="33" idx="0"/>
-            <a:endCxn id="20" idx="2"/>
-          </p:cNvCxnSpPr>
-          <p:nvPr/>
-        </p:nvCxnSpPr>
-        <p:spPr>
-          <a:xfrm flipH="1" flipV="1">
-            <a:off x="1568739" y="3309377"/>
-            <a:ext cx="4227180" cy="1242719"/>
-          </a:xfrm>
-          <a:prstGeom prst="straightConnector1">
-            <a:avLst/>
-          </a:prstGeom>
-          <a:ln>
-            <a:tailEnd type="triangle"/>
-          </a:ln>
-        </p:spPr>
-        <p:style>
-          <a:lnRef idx="2">
-            <a:schemeClr val="dk1"/>
-          </a:lnRef>
-          <a:fillRef idx="0">
-            <a:schemeClr val="dk1"/>
-          </a:fillRef>
-          <a:effectRef idx="1">
-            <a:schemeClr val="dk1"/>
-          </a:effectRef>
-          <a:fontRef idx="minor">
-            <a:schemeClr val="tx1"/>
-          </a:fontRef>
-        </p:style>
-      </p:cxnSp>
-      <p:cxnSp>
-        <p:nvCxnSpPr>
           <p:cNvPr id="32" name="Straight Arrow Connector 31">
             <a:extLst>
               <a:ext uri="{FF2B5EF4-FFF2-40B4-BE49-F238E27FC236}">
@@ -3907,9 +3865,9 @@
           <p:nvPr/>
         </p:nvCxnSpPr>
         <p:spPr>
-          <a:xfrm flipH="1" flipV="1">
-            <a:off x="5412386" y="3272396"/>
-            <a:ext cx="383533" cy="1279700"/>
+          <a:xfrm flipV="1">
+            <a:off x="5000774" y="3144818"/>
+            <a:ext cx="1307748" cy="2737369"/>
           </a:xfrm>
           <a:prstGeom prst="straightConnector1">
             <a:avLst/>
@@ -3951,8 +3909,8 @@
         </p:nvCxnSpPr>
         <p:spPr>
           <a:xfrm>
-            <a:off x="2869033" y="4209335"/>
-            <a:ext cx="1146498" cy="497958"/>
+            <a:off x="2608974" y="5285975"/>
+            <a:ext cx="611412" cy="751409"/>
           </a:xfrm>
           <a:prstGeom prst="straightConnector1">
             <a:avLst/>
@@ -3990,7 +3948,7 @@
         </p:nvSpPr>
         <p:spPr>
           <a:xfrm>
-            <a:off x="1610597" y="5494671"/>
+            <a:off x="528504" y="4246717"/>
             <a:ext cx="2080469" cy="310393"/>
           </a:xfrm>
           <a:prstGeom prst="rect">
@@ -4020,7 +3978,7 @@
             <a:pPr algn="ctr"/>
             <a:r>
               <a:rPr lang="en-US" sz="1000" dirty="0"/>
-              <a:t>Conduct Initial Forecasts (“Baseline” Only – Monthly/Quarterly mix)</a:t>
+              <a:t>Conduct Initial Forecasts</a:t>
             </a:r>
           </a:p>
         </p:txBody>
@@ -4036,15 +3994,15 @@
           </p:cNvPr>
           <p:cNvCxnSpPr>
             <a:cxnSpLocks/>
-            <a:stCxn id="7" idx="2"/>
-            <a:endCxn id="48" idx="0"/>
+            <a:stCxn id="7" idx="0"/>
+            <a:endCxn id="48" idx="2"/>
           </p:cNvCxnSpPr>
           <p:nvPr/>
         </p:nvCxnSpPr>
         <p:spPr>
-          <a:xfrm>
-            <a:off x="1828799" y="4364531"/>
-            <a:ext cx="822033" cy="1130140"/>
+          <a:xfrm flipH="1" flipV="1">
+            <a:off x="1568739" y="4557110"/>
+            <a:ext cx="1" cy="573668"/>
           </a:xfrm>
           <a:prstGeom prst="straightConnector1">
             <a:avLst/>
@@ -4085,9 +4043,9 @@
           <p:nvPr/>
         </p:nvCxnSpPr>
         <p:spPr>
-          <a:xfrm flipH="1" flipV="1">
-            <a:off x="1568739" y="3309377"/>
-            <a:ext cx="1082093" cy="2185294"/>
+          <a:xfrm flipV="1">
+            <a:off x="1568739" y="3144817"/>
+            <a:ext cx="1648797" cy="1101900"/>
           </a:xfrm>
           <a:prstGeom prst="straightConnector1">
             <a:avLst/>
@@ -4129,8 +4087,8 @@
         </p:nvCxnSpPr>
         <p:spPr>
           <a:xfrm flipV="1">
-            <a:off x="6452620" y="2139645"/>
-            <a:ext cx="1123686" cy="977555"/>
+            <a:off x="7348756" y="2139645"/>
+            <a:ext cx="227550" cy="849977"/>
           </a:xfrm>
           <a:prstGeom prst="straightConnector1">
             <a:avLst/>
@@ -4221,8 +4179,8 @@
         </p:nvCxnSpPr>
         <p:spPr>
           <a:xfrm flipV="1">
-            <a:off x="6452620" y="2734741"/>
-            <a:ext cx="1123687" cy="382459"/>
+            <a:off x="7348756" y="2734741"/>
+            <a:ext cx="227551" cy="254881"/>
           </a:xfrm>
           <a:prstGeom prst="straightConnector1">
             <a:avLst/>
@@ -4309,7 +4267,7 @@
         </p:nvSpPr>
         <p:spPr>
           <a:xfrm>
-            <a:off x="847637" y="1675904"/>
+            <a:off x="478081" y="1320457"/>
             <a:ext cx="2080469" cy="310393"/>
           </a:xfrm>
           <a:prstGeom prst="rect">
@@ -4371,7 +4329,7 @@
         <p:spPr>
           <a:xfrm>
             <a:off x="2608973" y="665420"/>
-            <a:ext cx="638266" cy="360690"/>
+            <a:ext cx="1217127" cy="115380"/>
           </a:xfrm>
           <a:prstGeom prst="straightConnector1">
             <a:avLst/>

</xml_diff>

<commit_message>
Reworked model flow (v0.15)
</commit_message>
<xml_diff>
--- a/documentation-templates/model-flow.pptx
+++ b/documentation-templates/model-flow.pptx
@@ -263,7 +263,7 @@
           <a:p>
             <a:fld id="{A7C790ED-1353-428C-9EC0-1379BDA992E3}" type="datetimeFigureOut">
               <a:rPr lang="en-US" smtClean="0"/>
-              <a:t>7/5/2021</a:t>
+              <a:t>7/6/2021</a:t>
             </a:fld>
             <a:endParaRPr lang="en-US"/>
           </a:p>
@@ -461,7 +461,7 @@
           <a:p>
             <a:fld id="{A7C790ED-1353-428C-9EC0-1379BDA992E3}" type="datetimeFigureOut">
               <a:rPr lang="en-US" smtClean="0"/>
-              <a:t>7/5/2021</a:t>
+              <a:t>7/6/2021</a:t>
             </a:fld>
             <a:endParaRPr lang="en-US"/>
           </a:p>
@@ -669,7 +669,7 @@
           <a:p>
             <a:fld id="{A7C790ED-1353-428C-9EC0-1379BDA992E3}" type="datetimeFigureOut">
               <a:rPr lang="en-US" smtClean="0"/>
-              <a:t>7/5/2021</a:t>
+              <a:t>7/6/2021</a:t>
             </a:fld>
             <a:endParaRPr lang="en-US"/>
           </a:p>
@@ -867,7 +867,7 @@
           <a:p>
             <a:fld id="{A7C790ED-1353-428C-9EC0-1379BDA992E3}" type="datetimeFigureOut">
               <a:rPr lang="en-US" smtClean="0"/>
-              <a:t>7/5/2021</a:t>
+              <a:t>7/6/2021</a:t>
             </a:fld>
             <a:endParaRPr lang="en-US"/>
           </a:p>
@@ -1142,7 +1142,7 @@
           <a:p>
             <a:fld id="{A7C790ED-1353-428C-9EC0-1379BDA992E3}" type="datetimeFigureOut">
               <a:rPr lang="en-US" smtClean="0"/>
-              <a:t>7/5/2021</a:t>
+              <a:t>7/6/2021</a:t>
             </a:fld>
             <a:endParaRPr lang="en-US"/>
           </a:p>
@@ -1407,7 +1407,7 @@
           <a:p>
             <a:fld id="{A7C790ED-1353-428C-9EC0-1379BDA992E3}" type="datetimeFigureOut">
               <a:rPr lang="en-US" smtClean="0"/>
-              <a:t>7/5/2021</a:t>
+              <a:t>7/6/2021</a:t>
             </a:fld>
             <a:endParaRPr lang="en-US"/>
           </a:p>
@@ -1819,7 +1819,7 @@
           <a:p>
             <a:fld id="{A7C790ED-1353-428C-9EC0-1379BDA992E3}" type="datetimeFigureOut">
               <a:rPr lang="en-US" smtClean="0"/>
-              <a:t>7/5/2021</a:t>
+              <a:t>7/6/2021</a:t>
             </a:fld>
             <a:endParaRPr lang="en-US"/>
           </a:p>
@@ -1960,7 +1960,7 @@
           <a:p>
             <a:fld id="{A7C790ED-1353-428C-9EC0-1379BDA992E3}" type="datetimeFigureOut">
               <a:rPr lang="en-US" smtClean="0"/>
-              <a:t>7/5/2021</a:t>
+              <a:t>7/6/2021</a:t>
             </a:fld>
             <a:endParaRPr lang="en-US"/>
           </a:p>
@@ -2073,7 +2073,7 @@
           <a:p>
             <a:fld id="{A7C790ED-1353-428C-9EC0-1379BDA992E3}" type="datetimeFigureOut">
               <a:rPr lang="en-US" smtClean="0"/>
-              <a:t>7/5/2021</a:t>
+              <a:t>7/6/2021</a:t>
             </a:fld>
             <a:endParaRPr lang="en-US"/>
           </a:p>
@@ -2384,7 +2384,7 @@
           <a:p>
             <a:fld id="{A7C790ED-1353-428C-9EC0-1379BDA992E3}" type="datetimeFigureOut">
               <a:rPr lang="en-US" smtClean="0"/>
-              <a:t>7/5/2021</a:t>
+              <a:t>7/6/2021</a:t>
             </a:fld>
             <a:endParaRPr lang="en-US"/>
           </a:p>
@@ -2672,7 +2672,7 @@
           <a:p>
             <a:fld id="{A7C790ED-1353-428C-9EC0-1379BDA992E3}" type="datetimeFigureOut">
               <a:rPr lang="en-US" smtClean="0"/>
-              <a:t>7/5/2021</a:t>
+              <a:t>7/6/2021</a:t>
             </a:fld>
             <a:endParaRPr lang="en-US"/>
           </a:p>
@@ -2913,7 +2913,7 @@
           <a:p>
             <a:fld id="{A7C790ED-1353-428C-9EC0-1379BDA992E3}" type="datetimeFigureOut">
               <a:rPr lang="en-US" smtClean="0"/>
-              <a:t>7/5/2021</a:t>
+              <a:t>7/6/2021</a:t>
             </a:fld>
             <a:endParaRPr lang="en-US"/>
           </a:p>
@@ -3480,7 +3480,54 @@
         </p:nvSpPr>
         <p:spPr>
           <a:xfrm>
-            <a:off x="528505" y="5130778"/>
+            <a:off x="370972" y="4678848"/>
+            <a:ext cx="2080469" cy="310393"/>
+          </a:xfrm>
+          <a:prstGeom prst="rect">
+            <a:avLst/>
+          </a:prstGeom>
+        </p:spPr>
+        <p:style>
+          <a:lnRef idx="3">
+            <a:schemeClr val="lt1"/>
+          </a:lnRef>
+          <a:fillRef idx="1">
+            <a:schemeClr val="accent5"/>
+          </a:fillRef>
+          <a:effectRef idx="1">
+            <a:schemeClr val="accent5"/>
+          </a:effectRef>
+          <a:fontRef idx="minor">
+            <a:schemeClr val="lt1"/>
+          </a:fontRef>
+        </p:style>
+        <p:txBody>
+          <a:bodyPr rtlCol="0" anchor="ctr"/>
+          <a:lstStyle/>
+          <a:p>
+            <a:pPr algn="ctr"/>
+            <a:r>
+              <a:rPr lang="en-US" sz="1000" dirty="0"/>
+              <a:t>Pull External Forecasts</a:t>
+            </a:r>
+          </a:p>
+        </p:txBody>
+      </p:sp>
+      <p:sp>
+        <p:nvSpPr>
+          <p:cNvPr id="9" name="Rectangle 8">
+            <a:extLst>
+              <a:ext uri="{FF2B5EF4-FFF2-40B4-BE49-F238E27FC236}">
+                <a16:creationId xmlns:a16="http://schemas.microsoft.com/office/drawing/2014/main" id="{D2278DC8-DC51-403E-85F8-A3AD33216527}"/>
+              </a:ext>
+            </a:extLst>
+          </p:cNvPr>
+          <p:cNvSpPr/>
+          <p:nvPr/>
+        </p:nvSpPr>
+        <p:spPr>
+          <a:xfrm>
+            <a:off x="2785865" y="780800"/>
             <a:ext cx="2080469" cy="310393"/>
           </a:xfrm>
           <a:prstGeom prst="rect">
@@ -3510,17 +3557,68 @@
             <a:pPr algn="ctr"/>
             <a:r>
               <a:rPr lang="en-US" sz="1000" dirty="0"/>
-              <a:t>Pull External Forecasts</a:t>
-            </a:r>
-          </a:p>
-        </p:txBody>
-      </p:sp>
-      <p:sp>
-        <p:nvSpPr>
-          <p:cNvPr id="9" name="Rectangle 8">
-            <a:extLst>
-              <a:ext uri="{FF2B5EF4-FFF2-40B4-BE49-F238E27FC236}">
-                <a16:creationId xmlns:a16="http://schemas.microsoft.com/office/drawing/2014/main" id="{D2278DC8-DC51-403E-85F8-A3AD33216527}"/>
+              <a:t>Create Calculated Variables [</a:t>
+            </a:r>
+            <a:r>
+              <a:rPr lang="en-US" sz="1000" dirty="0" err="1"/>
+              <a:t>m$c</a:t>
+            </a:r>
+            <a:r>
+              <a:rPr lang="en-US" sz="1000" dirty="0"/>
+              <a:t>]</a:t>
+            </a:r>
+          </a:p>
+        </p:txBody>
+      </p:sp>
+      <p:cxnSp>
+        <p:nvCxnSpPr>
+          <p:cNvPr id="17" name="Straight Arrow Connector 16">
+            <a:extLst>
+              <a:ext uri="{FF2B5EF4-FFF2-40B4-BE49-F238E27FC236}">
+                <a16:creationId xmlns:a16="http://schemas.microsoft.com/office/drawing/2014/main" id="{22FDC700-B916-4155-A6EF-740258D094DD}"/>
+              </a:ext>
+            </a:extLst>
+          </p:cNvPr>
+          <p:cNvCxnSpPr>
+            <a:cxnSpLocks/>
+            <a:stCxn id="2" idx="2"/>
+            <a:endCxn id="85" idx="0"/>
+          </p:cNvCxnSpPr>
+          <p:nvPr/>
+        </p:nvCxnSpPr>
+        <p:spPr>
+          <a:xfrm flipH="1">
+            <a:off x="1518316" y="820616"/>
+            <a:ext cx="50423" cy="499841"/>
+          </a:xfrm>
+          <a:prstGeom prst="straightConnector1">
+            <a:avLst/>
+          </a:prstGeom>
+          <a:ln>
+            <a:tailEnd type="triangle"/>
+          </a:ln>
+        </p:spPr>
+        <p:style>
+          <a:lnRef idx="3">
+            <a:schemeClr val="dk1"/>
+          </a:lnRef>
+          <a:fillRef idx="0">
+            <a:schemeClr val="dk1"/>
+          </a:fillRef>
+          <a:effectRef idx="2">
+            <a:schemeClr val="dk1"/>
+          </a:effectRef>
+          <a:fontRef idx="minor">
+            <a:schemeClr val="tx1"/>
+          </a:fontRef>
+        </p:style>
+      </p:cxnSp>
+      <p:sp>
+        <p:nvSpPr>
+          <p:cNvPr id="20" name="Rectangle 19">
+            <a:extLst>
+              <a:ext uri="{FF2B5EF4-FFF2-40B4-BE49-F238E27FC236}">
+                <a16:creationId xmlns:a16="http://schemas.microsoft.com/office/drawing/2014/main" id="{5F59EA85-26B5-47C8-965D-FA4A09BC5DE9}"/>
               </a:ext>
             </a:extLst>
           </p:cNvPr>
@@ -3529,7 +3627,7 @@
         </p:nvSpPr>
         <p:spPr>
           <a:xfrm>
-            <a:off x="2785865" y="780800"/>
+            <a:off x="1795055" y="2763795"/>
             <a:ext cx="2080469" cy="310393"/>
           </a:xfrm>
           <a:prstGeom prst="rect">
@@ -3559,131 +3657,31 @@
             <a:pPr algn="ctr"/>
             <a:r>
               <a:rPr lang="en-US" sz="1000" dirty="0"/>
-              <a:t>Create Calculated Variables [</a:t>
-            </a:r>
-            <a:r>
-              <a:rPr lang="en-US" sz="1000" dirty="0" err="1"/>
-              <a:t>m$c</a:t>
-            </a:r>
-            <a:r>
-              <a:rPr lang="en-US" sz="1000" dirty="0"/>
-              <a:t>]</a:t>
+              <a:t>Conduct Nowcasts (Baseline)</a:t>
             </a:r>
           </a:p>
         </p:txBody>
       </p:sp>
       <p:cxnSp>
         <p:nvCxnSpPr>
-          <p:cNvPr id="17" name="Straight Arrow Connector 16">
-            <a:extLst>
-              <a:ext uri="{FF2B5EF4-FFF2-40B4-BE49-F238E27FC236}">
-                <a16:creationId xmlns:a16="http://schemas.microsoft.com/office/drawing/2014/main" id="{22FDC700-B916-4155-A6EF-740258D094DD}"/>
+          <p:cNvPr id="24" name="Straight Arrow Connector 23">
+            <a:extLst>
+              <a:ext uri="{FF2B5EF4-FFF2-40B4-BE49-F238E27FC236}">
+                <a16:creationId xmlns:a16="http://schemas.microsoft.com/office/drawing/2014/main" id="{C925C57D-6449-4680-A421-FF4AC0C9C039}"/>
               </a:ext>
             </a:extLst>
           </p:cNvPr>
           <p:cNvCxnSpPr>
             <a:cxnSpLocks/>
-            <a:stCxn id="2" idx="2"/>
-            <a:endCxn id="85" idx="0"/>
+            <a:stCxn id="85" idx="3"/>
+            <a:endCxn id="20" idx="0"/>
           </p:cNvCxnSpPr>
           <p:nvPr/>
         </p:nvCxnSpPr>
         <p:spPr>
-          <a:xfrm flipH="1">
-            <a:off x="1518316" y="820616"/>
-            <a:ext cx="50423" cy="499841"/>
-          </a:xfrm>
-          <a:prstGeom prst="straightConnector1">
-            <a:avLst/>
-          </a:prstGeom>
-          <a:ln>
-            <a:tailEnd type="triangle"/>
-          </a:ln>
-        </p:spPr>
-        <p:style>
-          <a:lnRef idx="3">
-            <a:schemeClr val="dk1"/>
-          </a:lnRef>
-          <a:fillRef idx="0">
-            <a:schemeClr val="dk1"/>
-          </a:fillRef>
-          <a:effectRef idx="2">
-            <a:schemeClr val="dk1"/>
-          </a:effectRef>
-          <a:fontRef idx="minor">
-            <a:schemeClr val="tx1"/>
-          </a:fontRef>
-        </p:style>
-      </p:cxnSp>
-      <p:sp>
-        <p:nvSpPr>
-          <p:cNvPr id="20" name="Rectangle 19">
-            <a:extLst>
-              <a:ext uri="{FF2B5EF4-FFF2-40B4-BE49-F238E27FC236}">
-                <a16:creationId xmlns:a16="http://schemas.microsoft.com/office/drawing/2014/main" id="{5F59EA85-26B5-47C8-965D-FA4A09BC5DE9}"/>
-              </a:ext>
-            </a:extLst>
-          </p:cNvPr>
-          <p:cNvSpPr/>
-          <p:nvPr/>
-        </p:nvSpPr>
-        <p:spPr>
-          <a:xfrm>
-            <a:off x="2177301" y="2834424"/>
-            <a:ext cx="2080469" cy="310393"/>
-          </a:xfrm>
-          <a:prstGeom prst="rect">
-            <a:avLst/>
-          </a:prstGeom>
-        </p:spPr>
-        <p:style>
-          <a:lnRef idx="2">
-            <a:schemeClr val="accent1">
-              <a:shade val="50000"/>
-            </a:schemeClr>
-          </a:lnRef>
-          <a:fillRef idx="1">
-            <a:schemeClr val="accent1"/>
-          </a:fillRef>
-          <a:effectRef idx="0">
-            <a:schemeClr val="accent1"/>
-          </a:effectRef>
-          <a:fontRef idx="minor">
-            <a:schemeClr val="lt1"/>
-          </a:fontRef>
-        </p:style>
-        <p:txBody>
-          <a:bodyPr rtlCol="0" anchor="ctr"/>
-          <a:lstStyle/>
-          <a:p>
-            <a:pPr algn="ctr"/>
-            <a:r>
-              <a:rPr lang="en-US" sz="1000" dirty="0"/>
-              <a:t>Conduct Nowcasts</a:t>
-            </a:r>
-          </a:p>
-        </p:txBody>
-      </p:sp>
-      <p:cxnSp>
-        <p:nvCxnSpPr>
-          <p:cNvPr id="21" name="Straight Arrow Connector 20">
-            <a:extLst>
-              <a:ext uri="{FF2B5EF4-FFF2-40B4-BE49-F238E27FC236}">
-                <a16:creationId xmlns:a16="http://schemas.microsoft.com/office/drawing/2014/main" id="{A84EACFB-7388-4E9F-A426-2FDCDCE78EEC}"/>
-              </a:ext>
-            </a:extLst>
-          </p:cNvPr>
-          <p:cNvCxnSpPr>
-            <a:cxnSpLocks/>
-            <a:stCxn id="20" idx="3"/>
-            <a:endCxn id="28" idx="1"/>
-          </p:cNvCxnSpPr>
-          <p:nvPr/>
-        </p:nvCxnSpPr>
-        <p:spPr>
-          <a:xfrm>
-            <a:off x="4257770" y="2989621"/>
-            <a:ext cx="1010517" cy="1"/>
+          <a:xfrm>
+            <a:off x="2558550" y="1475654"/>
+            <a:ext cx="276740" cy="1288141"/>
           </a:xfrm>
           <a:prstGeom prst="straightConnector1">
             <a:avLst/>
@@ -3707,81 +3705,38 @@
           </a:fontRef>
         </p:style>
       </p:cxnSp>
-      <p:cxnSp>
-        <p:nvCxnSpPr>
-          <p:cNvPr id="24" name="Straight Arrow Connector 23">
-            <a:extLst>
-              <a:ext uri="{FF2B5EF4-FFF2-40B4-BE49-F238E27FC236}">
-                <a16:creationId xmlns:a16="http://schemas.microsoft.com/office/drawing/2014/main" id="{C925C57D-6449-4680-A421-FF4AC0C9C039}"/>
-              </a:ext>
-            </a:extLst>
-          </p:cNvPr>
-          <p:cNvCxnSpPr>
-            <a:cxnSpLocks/>
-            <a:stCxn id="85" idx="3"/>
-            <a:endCxn id="20" idx="0"/>
-          </p:cNvCxnSpPr>
-          <p:nvPr/>
-        </p:nvCxnSpPr>
-        <p:spPr>
-          <a:xfrm>
-            <a:off x="2558550" y="1475654"/>
-            <a:ext cx="658986" cy="1358770"/>
-          </a:xfrm>
-          <a:prstGeom prst="straightConnector1">
-            <a:avLst/>
-          </a:prstGeom>
-          <a:ln>
-            <a:tailEnd type="triangle"/>
-          </a:ln>
+      <p:sp>
+        <p:nvSpPr>
+          <p:cNvPr id="28" name="Rectangle 27">
+            <a:extLst>
+              <a:ext uri="{FF2B5EF4-FFF2-40B4-BE49-F238E27FC236}">
+                <a16:creationId xmlns:a16="http://schemas.microsoft.com/office/drawing/2014/main" id="{2ACEA74B-7663-4262-8373-B6DA6B6D7457}"/>
+              </a:ext>
+            </a:extLst>
+          </p:cNvPr>
+          <p:cNvSpPr/>
+          <p:nvPr/>
+        </p:nvSpPr>
+        <p:spPr>
+          <a:xfrm>
+            <a:off x="5847148" y="5319967"/>
+            <a:ext cx="2080469" cy="310393"/>
+          </a:xfrm>
+          <a:prstGeom prst="rect">
+            <a:avLst/>
+          </a:prstGeom>
         </p:spPr>
         <p:style>
           <a:lnRef idx="2">
-            <a:schemeClr val="dk1"/>
-          </a:lnRef>
-          <a:fillRef idx="0">
-            <a:schemeClr val="dk1"/>
-          </a:fillRef>
-          <a:effectRef idx="1">
-            <a:schemeClr val="dk1"/>
-          </a:effectRef>
-          <a:fontRef idx="minor">
-            <a:schemeClr val="tx1"/>
-          </a:fontRef>
-        </p:style>
-      </p:cxnSp>
-      <p:sp>
-        <p:nvSpPr>
-          <p:cNvPr id="28" name="Rectangle 27">
-            <a:extLst>
-              <a:ext uri="{FF2B5EF4-FFF2-40B4-BE49-F238E27FC236}">
-                <a16:creationId xmlns:a16="http://schemas.microsoft.com/office/drawing/2014/main" id="{2ACEA74B-7663-4262-8373-B6DA6B6D7457}"/>
-              </a:ext>
-            </a:extLst>
-          </p:cNvPr>
-          <p:cNvSpPr/>
-          <p:nvPr/>
-        </p:nvSpPr>
-        <p:spPr>
-          <a:xfrm>
-            <a:off x="5268287" y="2834425"/>
-            <a:ext cx="2080469" cy="310393"/>
-          </a:xfrm>
-          <a:prstGeom prst="rect">
-            <a:avLst/>
-          </a:prstGeom>
-        </p:spPr>
-        <p:style>
-          <a:lnRef idx="2">
-            <a:schemeClr val="accent1">
+            <a:schemeClr val="accent4">
               <a:shade val="50000"/>
             </a:schemeClr>
           </a:lnRef>
           <a:fillRef idx="1">
-            <a:schemeClr val="accent1"/>
+            <a:schemeClr val="accent4"/>
           </a:fillRef>
           <a:effectRef idx="0">
-            <a:schemeClr val="accent1"/>
+            <a:schemeClr val="accent4"/>
           </a:effectRef>
           <a:fontRef idx="minor">
             <a:schemeClr val="lt1"/>
@@ -3813,8 +3768,8 @@
         </p:nvSpPr>
         <p:spPr>
           <a:xfrm>
-            <a:off x="3220386" y="5882187"/>
-            <a:ext cx="3560775" cy="310393"/>
+            <a:off x="4266893" y="3462960"/>
+            <a:ext cx="2285180" cy="310393"/>
           </a:xfrm>
           <a:prstGeom prst="rect">
             <a:avLst/>
@@ -3822,15 +3777,15 @@
         </p:spPr>
         <p:style>
           <a:lnRef idx="2">
-            <a:schemeClr val="accent1">
+            <a:schemeClr val="accent4">
               <a:shade val="50000"/>
             </a:schemeClr>
           </a:lnRef>
           <a:fillRef idx="1">
-            <a:schemeClr val="accent1"/>
+            <a:schemeClr val="accent4"/>
           </a:fillRef>
           <a:effectRef idx="0">
-            <a:schemeClr val="accent1"/>
+            <a:schemeClr val="accent4"/>
           </a:effectRef>
           <a:fontRef idx="minor">
             <a:schemeClr val="lt1"/>
@@ -3842,8 +3797,12 @@
           <a:p>
             <a:pPr algn="ctr"/>
             <a:r>
+              <a:rPr lang="en-US" sz="1000" dirty="0" err="1"/>
+              <a:t>Exogenize</a:t>
+            </a:r>
+            <a:r>
               <a:rPr lang="en-US" sz="1000" dirty="0"/>
-              <a:t>Exogenous Inputs (Flexibly for Variables &amp; Dates)</a:t>
+              <a:t> Scenarios</a:t>
             </a:r>
           </a:p>
         </p:txBody>
@@ -3859,15 +3818,15 @@
           </p:cNvPr>
           <p:cNvCxnSpPr>
             <a:cxnSpLocks/>
-            <a:stCxn id="33" idx="0"/>
-            <a:endCxn id="28" idx="2"/>
+            <a:stCxn id="33" idx="2"/>
+            <a:endCxn id="28" idx="0"/>
           </p:cNvCxnSpPr>
           <p:nvPr/>
         </p:nvCxnSpPr>
         <p:spPr>
-          <a:xfrm flipV="1">
-            <a:off x="5000774" y="3144818"/>
-            <a:ext cx="1307748" cy="2737369"/>
+          <a:xfrm>
+            <a:off x="5409483" y="3773353"/>
+            <a:ext cx="1477900" cy="1546614"/>
           </a:xfrm>
           <a:prstGeom prst="straightConnector1">
             <a:avLst/>
@@ -3902,15 +3861,15 @@
           </p:cNvPr>
           <p:cNvCxnSpPr>
             <a:cxnSpLocks/>
-            <a:stCxn id="7" idx="3"/>
-            <a:endCxn id="33" idx="1"/>
+            <a:stCxn id="20" idx="3"/>
+            <a:endCxn id="121" idx="1"/>
           </p:cNvCxnSpPr>
           <p:nvPr/>
         </p:nvCxnSpPr>
         <p:spPr>
-          <a:xfrm>
-            <a:off x="2608974" y="5285975"/>
-            <a:ext cx="611412" cy="751409"/>
+          <a:xfrm flipV="1">
+            <a:off x="3875524" y="2660983"/>
+            <a:ext cx="391369" cy="258009"/>
           </a:xfrm>
           <a:prstGeom prst="straightConnector1">
             <a:avLst/>
@@ -3948,7 +3907,7 @@
         </p:nvSpPr>
         <p:spPr>
           <a:xfrm>
-            <a:off x="528504" y="4246717"/>
+            <a:off x="1795055" y="3390707"/>
             <a:ext cx="2080469" cy="310393"/>
           </a:xfrm>
           <a:prstGeom prst="rect">
@@ -3957,15 +3916,15 @@
         </p:spPr>
         <p:style>
           <a:lnRef idx="2">
-            <a:schemeClr val="accent2">
+            <a:schemeClr val="accent5">
               <a:shade val="50000"/>
             </a:schemeClr>
           </a:lnRef>
           <a:fillRef idx="1">
-            <a:schemeClr val="accent2"/>
+            <a:schemeClr val="accent5"/>
           </a:fillRef>
           <a:effectRef idx="0">
-            <a:schemeClr val="accent2"/>
+            <a:schemeClr val="accent5"/>
           </a:effectRef>
           <a:fontRef idx="minor">
             <a:schemeClr val="lt1"/>
@@ -3978,7 +3937,7 @@
             <a:pPr algn="ctr"/>
             <a:r>
               <a:rPr lang="en-US" sz="1000" dirty="0"/>
-              <a:t>Conduct Initial Forecasts</a:t>
+              <a:t>Qual Forecasts (Baseline)</a:t>
             </a:r>
           </a:p>
         </p:txBody>
@@ -4000,52 +3959,9 @@
           <p:nvPr/>
         </p:nvCxnSpPr>
         <p:spPr>
-          <a:xfrm flipH="1" flipV="1">
-            <a:off x="1568739" y="4557110"/>
-            <a:ext cx="1" cy="573668"/>
-          </a:xfrm>
-          <a:prstGeom prst="straightConnector1">
-            <a:avLst/>
-          </a:prstGeom>
-          <a:ln>
-            <a:tailEnd type="triangle"/>
-          </a:ln>
-        </p:spPr>
-        <p:style>
-          <a:lnRef idx="2">
-            <a:schemeClr val="dk1"/>
-          </a:lnRef>
-          <a:fillRef idx="0">
-            <a:schemeClr val="dk1"/>
-          </a:fillRef>
-          <a:effectRef idx="1">
-            <a:schemeClr val="dk1"/>
-          </a:effectRef>
-          <a:fontRef idx="minor">
-            <a:schemeClr val="tx1"/>
-          </a:fontRef>
-        </p:style>
-      </p:cxnSp>
-      <p:cxnSp>
-        <p:nvCxnSpPr>
-          <p:cNvPr id="52" name="Straight Arrow Connector 51">
-            <a:extLst>
-              <a:ext uri="{FF2B5EF4-FFF2-40B4-BE49-F238E27FC236}">
-                <a16:creationId xmlns:a16="http://schemas.microsoft.com/office/drawing/2014/main" id="{98A2E6D1-C109-41EB-B80C-971A378698FE}"/>
-              </a:ext>
-            </a:extLst>
-          </p:cNvPr>
-          <p:cNvCxnSpPr>
-            <a:cxnSpLocks/>
-            <a:stCxn id="48" idx="0"/>
-            <a:endCxn id="20" idx="2"/>
-          </p:cNvCxnSpPr>
-          <p:nvPr/>
-        </p:nvCxnSpPr>
-        <p:spPr>
           <a:xfrm flipV="1">
-            <a:off x="1568739" y="3144817"/>
-            <a:ext cx="1648797" cy="1101900"/>
+            <a:off x="1411207" y="3701100"/>
+            <a:ext cx="1424083" cy="977748"/>
           </a:xfrm>
           <a:prstGeom prst="straightConnector1">
             <a:avLst/>
@@ -4087,8 +4003,8 @@
         </p:nvCxnSpPr>
         <p:spPr>
           <a:xfrm flipV="1">
-            <a:off x="7348756" y="2139645"/>
-            <a:ext cx="227550" cy="849977"/>
+            <a:off x="7927617" y="3462960"/>
+            <a:ext cx="1429093" cy="2012204"/>
           </a:xfrm>
           <a:prstGeom prst="straightConnector1">
             <a:avLst/>
@@ -4126,7 +4042,7 @@
         </p:nvSpPr>
         <p:spPr>
           <a:xfrm>
-            <a:off x="7576306" y="1984448"/>
+            <a:off x="9356710" y="3307763"/>
             <a:ext cx="2080469" cy="310393"/>
           </a:xfrm>
           <a:prstGeom prst="rect">
@@ -4135,15 +4051,15 @@
         </p:spPr>
         <p:style>
           <a:lnRef idx="2">
-            <a:schemeClr val="accent1">
+            <a:schemeClr val="accent4">
               <a:shade val="50000"/>
             </a:schemeClr>
           </a:lnRef>
           <a:fillRef idx="1">
-            <a:schemeClr val="accent1"/>
+            <a:schemeClr val="accent4"/>
           </a:fillRef>
           <a:effectRef idx="0">
-            <a:schemeClr val="accent1"/>
+            <a:schemeClr val="accent4"/>
           </a:effectRef>
           <a:fontRef idx="minor">
             <a:schemeClr val="lt1"/>
@@ -4179,8 +4095,8 @@
         </p:nvCxnSpPr>
         <p:spPr>
           <a:xfrm flipV="1">
-            <a:off x="7348756" y="2734741"/>
-            <a:ext cx="227551" cy="254881"/>
+            <a:off x="7927617" y="2763795"/>
+            <a:ext cx="1283588" cy="2711369"/>
           </a:xfrm>
           <a:prstGeom prst="straightConnector1">
             <a:avLst/>
@@ -4218,7 +4134,7 @@
         </p:nvSpPr>
         <p:spPr>
           <a:xfrm>
-            <a:off x="7576307" y="2579544"/>
+            <a:off x="9211205" y="2608598"/>
             <a:ext cx="2080469" cy="310393"/>
           </a:xfrm>
           <a:prstGeom prst="rect">
@@ -4227,15 +4143,15 @@
         </p:spPr>
         <p:style>
           <a:lnRef idx="2">
-            <a:schemeClr val="accent1">
+            <a:schemeClr val="accent4">
               <a:shade val="50000"/>
             </a:schemeClr>
           </a:lnRef>
           <a:fillRef idx="1">
-            <a:schemeClr val="accent1"/>
+            <a:schemeClr val="accent4"/>
           </a:fillRef>
           <a:effectRef idx="0">
-            <a:schemeClr val="accent1"/>
+            <a:schemeClr val="accent4"/>
           </a:effectRef>
           <a:fontRef idx="minor">
             <a:schemeClr val="lt1"/>
@@ -4276,15 +4192,15 @@
         </p:spPr>
         <p:style>
           <a:lnRef idx="2">
-            <a:schemeClr val="accent2">
+            <a:schemeClr val="accent6">
               <a:shade val="50000"/>
             </a:schemeClr>
           </a:lnRef>
           <a:fillRef idx="1">
-            <a:schemeClr val="accent2"/>
+            <a:schemeClr val="accent6"/>
           </a:fillRef>
           <a:effectRef idx="0">
-            <a:schemeClr val="accent2"/>
+            <a:schemeClr val="accent6"/>
           </a:effectRef>
           <a:fontRef idx="minor">
             <a:schemeClr val="lt1"/>
@@ -4353,6 +4269,348 @@
           </a:fontRef>
         </p:style>
       </p:cxnSp>
+      <p:cxnSp>
+        <p:nvCxnSpPr>
+          <p:cNvPr id="116" name="Straight Arrow Connector 115">
+            <a:extLst>
+              <a:ext uri="{FF2B5EF4-FFF2-40B4-BE49-F238E27FC236}">
+                <a16:creationId xmlns:a16="http://schemas.microsoft.com/office/drawing/2014/main" id="{33B873DB-A697-4809-B079-1899F1E7B03D}"/>
+              </a:ext>
+            </a:extLst>
+          </p:cNvPr>
+          <p:cNvCxnSpPr>
+            <a:cxnSpLocks/>
+            <a:stCxn id="48" idx="3"/>
+            <a:endCxn id="121" idx="1"/>
+          </p:cNvCxnSpPr>
+          <p:nvPr/>
+        </p:nvCxnSpPr>
+        <p:spPr>
+          <a:xfrm flipV="1">
+            <a:off x="3875524" y="2660983"/>
+            <a:ext cx="391369" cy="884921"/>
+          </a:xfrm>
+          <a:prstGeom prst="straightConnector1">
+            <a:avLst/>
+          </a:prstGeom>
+          <a:ln>
+            <a:tailEnd type="triangle"/>
+          </a:ln>
+        </p:spPr>
+        <p:style>
+          <a:lnRef idx="2">
+            <a:schemeClr val="dk1"/>
+          </a:lnRef>
+          <a:fillRef idx="0">
+            <a:schemeClr val="dk1"/>
+          </a:fillRef>
+          <a:effectRef idx="1">
+            <a:schemeClr val="dk1"/>
+          </a:effectRef>
+          <a:fontRef idx="minor">
+            <a:schemeClr val="tx1"/>
+          </a:fontRef>
+        </p:style>
+      </p:cxnSp>
+      <p:sp>
+        <p:nvSpPr>
+          <p:cNvPr id="121" name="Rectangle 120">
+            <a:extLst>
+              <a:ext uri="{FF2B5EF4-FFF2-40B4-BE49-F238E27FC236}">
+                <a16:creationId xmlns:a16="http://schemas.microsoft.com/office/drawing/2014/main" id="{8ED3BCF9-1DAF-493F-A1D7-D326C009B64C}"/>
+              </a:ext>
+            </a:extLst>
+          </p:cNvPr>
+          <p:cNvSpPr/>
+          <p:nvPr/>
+        </p:nvSpPr>
+        <p:spPr>
+          <a:xfrm>
+            <a:off x="4266893" y="2505786"/>
+            <a:ext cx="2080469" cy="310393"/>
+          </a:xfrm>
+          <a:prstGeom prst="rect">
+            <a:avLst/>
+          </a:prstGeom>
+        </p:spPr>
+        <p:style>
+          <a:lnRef idx="2">
+            <a:schemeClr val="accent4">
+              <a:shade val="50000"/>
+            </a:schemeClr>
+          </a:lnRef>
+          <a:fillRef idx="1">
+            <a:schemeClr val="accent4"/>
+          </a:fillRef>
+          <a:effectRef idx="0">
+            <a:schemeClr val="accent4"/>
+          </a:effectRef>
+          <a:fontRef idx="minor">
+            <a:schemeClr val="lt1"/>
+          </a:fontRef>
+        </p:style>
+        <p:txBody>
+          <a:bodyPr rtlCol="0" anchor="ctr"/>
+          <a:lstStyle/>
+          <a:p>
+            <a:pPr algn="ctr"/>
+            <a:r>
+              <a:rPr lang="en-US" sz="1000" dirty="0"/>
+              <a:t>Combine into Single Baseline </a:t>
+            </a:r>
+            <a:r>
+              <a:rPr lang="en-US" sz="1000" dirty="0" err="1"/>
+              <a:t>Exog</a:t>
+            </a:r>
+            <a:r>
+              <a:rPr lang="en-US" sz="1000" dirty="0"/>
+              <a:t> Model</a:t>
+            </a:r>
+          </a:p>
+        </p:txBody>
+      </p:sp>
+      <p:cxnSp>
+        <p:nvCxnSpPr>
+          <p:cNvPr id="126" name="Straight Arrow Connector 125">
+            <a:extLst>
+              <a:ext uri="{FF2B5EF4-FFF2-40B4-BE49-F238E27FC236}">
+                <a16:creationId xmlns:a16="http://schemas.microsoft.com/office/drawing/2014/main" id="{B4612E71-4A48-45C5-A05B-7905081A5B37}"/>
+              </a:ext>
+            </a:extLst>
+          </p:cNvPr>
+          <p:cNvCxnSpPr>
+            <a:cxnSpLocks/>
+            <a:stCxn id="121" idx="2"/>
+            <a:endCxn id="33" idx="0"/>
+          </p:cNvCxnSpPr>
+          <p:nvPr/>
+        </p:nvCxnSpPr>
+        <p:spPr>
+          <a:xfrm>
+            <a:off x="5307128" y="2816179"/>
+            <a:ext cx="102355" cy="646781"/>
+          </a:xfrm>
+          <a:prstGeom prst="straightConnector1">
+            <a:avLst/>
+          </a:prstGeom>
+          <a:ln>
+            <a:tailEnd type="triangle"/>
+          </a:ln>
+        </p:spPr>
+        <p:style>
+          <a:lnRef idx="2">
+            <a:schemeClr val="dk1"/>
+          </a:lnRef>
+          <a:fillRef idx="0">
+            <a:schemeClr val="dk1"/>
+          </a:fillRef>
+          <a:effectRef idx="1">
+            <a:schemeClr val="dk1"/>
+          </a:effectRef>
+          <a:fontRef idx="minor">
+            <a:schemeClr val="tx1"/>
+          </a:fontRef>
+        </p:style>
+      </p:cxnSp>
+      <p:cxnSp>
+        <p:nvCxnSpPr>
+          <p:cNvPr id="137" name="Straight Arrow Connector 136">
+            <a:extLst>
+              <a:ext uri="{FF2B5EF4-FFF2-40B4-BE49-F238E27FC236}">
+                <a16:creationId xmlns:a16="http://schemas.microsoft.com/office/drawing/2014/main" id="{04976B70-8603-4110-8A4B-7895BA1C1644}"/>
+              </a:ext>
+            </a:extLst>
+          </p:cNvPr>
+          <p:cNvCxnSpPr>
+            <a:cxnSpLocks/>
+            <a:stCxn id="85" idx="2"/>
+            <a:endCxn id="48" idx="1"/>
+          </p:cNvCxnSpPr>
+          <p:nvPr/>
+        </p:nvCxnSpPr>
+        <p:spPr>
+          <a:xfrm>
+            <a:off x="1518316" y="1630850"/>
+            <a:ext cx="276739" cy="1915054"/>
+          </a:xfrm>
+          <a:prstGeom prst="straightConnector1">
+            <a:avLst/>
+          </a:prstGeom>
+          <a:ln>
+            <a:tailEnd type="triangle"/>
+          </a:ln>
+        </p:spPr>
+        <p:style>
+          <a:lnRef idx="2">
+            <a:schemeClr val="dk1"/>
+          </a:lnRef>
+          <a:fillRef idx="0">
+            <a:schemeClr val="dk1"/>
+          </a:fillRef>
+          <a:effectRef idx="1">
+            <a:schemeClr val="dk1"/>
+          </a:effectRef>
+          <a:fontRef idx="minor">
+            <a:schemeClr val="tx1"/>
+          </a:fontRef>
+        </p:style>
+      </p:cxnSp>
+      <p:sp>
+        <p:nvSpPr>
+          <p:cNvPr id="141" name="TextBox 140">
+            <a:extLst>
+              <a:ext uri="{FF2B5EF4-FFF2-40B4-BE49-F238E27FC236}">
+                <a16:creationId xmlns:a16="http://schemas.microsoft.com/office/drawing/2014/main" id="{067C8C35-F4AA-45F7-B3A9-C733F0F99757}"/>
+              </a:ext>
+            </a:extLst>
+          </p:cNvPr>
+          <p:cNvSpPr txBox="1"/>
+          <p:nvPr/>
+        </p:nvSpPr>
+        <p:spPr>
+          <a:xfrm>
+            <a:off x="3226659" y="350862"/>
+            <a:ext cx="498855" cy="369332"/>
+          </a:xfrm>
+          <a:prstGeom prst="rect">
+            <a:avLst/>
+          </a:prstGeom>
+          <a:noFill/>
+        </p:spPr>
+        <p:txBody>
+          <a:bodyPr wrap="none" rtlCol="0">
+            <a:spAutoFit/>
+          </a:bodyPr>
+          <a:lstStyle/>
+          <a:p>
+            <a:r>
+              <a:rPr lang="en-US" b="1" dirty="0">
+                <a:solidFill>
+                  <a:schemeClr val="accent6"/>
+                </a:solidFill>
+              </a:rPr>
+              <a:t>M1</a:t>
+            </a:r>
+          </a:p>
+        </p:txBody>
+      </p:sp>
+      <p:sp>
+        <p:nvSpPr>
+          <p:cNvPr id="142" name="TextBox 141">
+            <a:extLst>
+              <a:ext uri="{FF2B5EF4-FFF2-40B4-BE49-F238E27FC236}">
+                <a16:creationId xmlns:a16="http://schemas.microsoft.com/office/drawing/2014/main" id="{C9899906-9CFF-45A4-800D-FF2885389DBC}"/>
+              </a:ext>
+            </a:extLst>
+          </p:cNvPr>
+          <p:cNvSpPr txBox="1"/>
+          <p:nvPr/>
+        </p:nvSpPr>
+        <p:spPr>
+          <a:xfrm>
+            <a:off x="2437868" y="4634261"/>
+            <a:ext cx="498855" cy="369332"/>
+          </a:xfrm>
+          <a:prstGeom prst="rect">
+            <a:avLst/>
+          </a:prstGeom>
+          <a:noFill/>
+        </p:spPr>
+        <p:txBody>
+          <a:bodyPr wrap="none" rtlCol="0">
+            <a:spAutoFit/>
+          </a:bodyPr>
+          <a:lstStyle/>
+          <a:p>
+            <a:r>
+              <a:rPr lang="en-US" b="1" dirty="0">
+                <a:solidFill>
+                  <a:schemeClr val="accent5"/>
+                </a:solidFill>
+              </a:rPr>
+              <a:t>M2</a:t>
+            </a:r>
+          </a:p>
+        </p:txBody>
+      </p:sp>
+      <p:sp>
+        <p:nvSpPr>
+          <p:cNvPr id="143" name="TextBox 142">
+            <a:extLst>
+              <a:ext uri="{FF2B5EF4-FFF2-40B4-BE49-F238E27FC236}">
+                <a16:creationId xmlns:a16="http://schemas.microsoft.com/office/drawing/2014/main" id="{6E83F486-2700-4D3D-999C-731EA6653AF1}"/>
+              </a:ext>
+            </a:extLst>
+          </p:cNvPr>
+          <p:cNvSpPr txBox="1"/>
+          <p:nvPr/>
+        </p:nvSpPr>
+        <p:spPr>
+          <a:xfrm>
+            <a:off x="2045841" y="2194679"/>
+            <a:ext cx="498855" cy="369332"/>
+          </a:xfrm>
+          <a:prstGeom prst="rect">
+            <a:avLst/>
+          </a:prstGeom>
+          <a:noFill/>
+        </p:spPr>
+        <p:txBody>
+          <a:bodyPr wrap="none" rtlCol="0">
+            <a:spAutoFit/>
+          </a:bodyPr>
+          <a:lstStyle/>
+          <a:p>
+            <a:r>
+              <a:rPr lang="en-US" b="1" dirty="0">
+                <a:solidFill>
+                  <a:schemeClr val="accent2"/>
+                </a:solidFill>
+              </a:rPr>
+              <a:t>M3</a:t>
+            </a:r>
+          </a:p>
+        </p:txBody>
+      </p:sp>
+      <p:sp>
+        <p:nvSpPr>
+          <p:cNvPr id="144" name="TextBox 143">
+            <a:extLst>
+              <a:ext uri="{FF2B5EF4-FFF2-40B4-BE49-F238E27FC236}">
+                <a16:creationId xmlns:a16="http://schemas.microsoft.com/office/drawing/2014/main" id="{C376AE46-C45E-4660-8F03-D20897340B4E}"/>
+              </a:ext>
+            </a:extLst>
+          </p:cNvPr>
+          <p:cNvSpPr txBox="1"/>
+          <p:nvPr/>
+        </p:nvSpPr>
+        <p:spPr>
+          <a:xfrm>
+            <a:off x="6786968" y="2889522"/>
+            <a:ext cx="498855" cy="369332"/>
+          </a:xfrm>
+          <a:prstGeom prst="rect">
+            <a:avLst/>
+          </a:prstGeom>
+          <a:noFill/>
+        </p:spPr>
+        <p:txBody>
+          <a:bodyPr wrap="none" rtlCol="0">
+            <a:spAutoFit/>
+          </a:bodyPr>
+          <a:lstStyle/>
+          <a:p>
+            <a:r>
+              <a:rPr lang="en-US" b="1" dirty="0">
+                <a:solidFill>
+                  <a:schemeClr val="accent4"/>
+                </a:solidFill>
+              </a:rPr>
+              <a:t>M4</a:t>
+            </a:r>
+          </a:p>
+        </p:txBody>
+      </p:sp>
     </p:spTree>
     <p:extLst>
       <p:ext uri="{BB962C8B-B14F-4D97-AF65-F5344CB8AC3E}">

</xml_diff>

<commit_message>
Added release column and table (v0.15)
</commit_message>
<xml_diff>
--- a/documentation-templates/model-flow.pptx
+++ b/documentation-templates/model-flow.pptx
@@ -263,7 +263,7 @@
           <a:p>
             <a:fld id="{A7C790ED-1353-428C-9EC0-1379BDA992E3}" type="datetimeFigureOut">
               <a:rPr lang="en-US" smtClean="0"/>
-              <a:t>7/6/2021</a:t>
+              <a:t>7/7/2021</a:t>
             </a:fld>
             <a:endParaRPr lang="en-US"/>
           </a:p>
@@ -461,7 +461,7 @@
           <a:p>
             <a:fld id="{A7C790ED-1353-428C-9EC0-1379BDA992E3}" type="datetimeFigureOut">
               <a:rPr lang="en-US" smtClean="0"/>
-              <a:t>7/6/2021</a:t>
+              <a:t>7/7/2021</a:t>
             </a:fld>
             <a:endParaRPr lang="en-US"/>
           </a:p>
@@ -669,7 +669,7 @@
           <a:p>
             <a:fld id="{A7C790ED-1353-428C-9EC0-1379BDA992E3}" type="datetimeFigureOut">
               <a:rPr lang="en-US" smtClean="0"/>
-              <a:t>7/6/2021</a:t>
+              <a:t>7/7/2021</a:t>
             </a:fld>
             <a:endParaRPr lang="en-US"/>
           </a:p>
@@ -867,7 +867,7 @@
           <a:p>
             <a:fld id="{A7C790ED-1353-428C-9EC0-1379BDA992E3}" type="datetimeFigureOut">
               <a:rPr lang="en-US" smtClean="0"/>
-              <a:t>7/6/2021</a:t>
+              <a:t>7/7/2021</a:t>
             </a:fld>
             <a:endParaRPr lang="en-US"/>
           </a:p>
@@ -1142,7 +1142,7 @@
           <a:p>
             <a:fld id="{A7C790ED-1353-428C-9EC0-1379BDA992E3}" type="datetimeFigureOut">
               <a:rPr lang="en-US" smtClean="0"/>
-              <a:t>7/6/2021</a:t>
+              <a:t>7/7/2021</a:t>
             </a:fld>
             <a:endParaRPr lang="en-US"/>
           </a:p>
@@ -1407,7 +1407,7 @@
           <a:p>
             <a:fld id="{A7C790ED-1353-428C-9EC0-1379BDA992E3}" type="datetimeFigureOut">
               <a:rPr lang="en-US" smtClean="0"/>
-              <a:t>7/6/2021</a:t>
+              <a:t>7/7/2021</a:t>
             </a:fld>
             <a:endParaRPr lang="en-US"/>
           </a:p>
@@ -1819,7 +1819,7 @@
           <a:p>
             <a:fld id="{A7C790ED-1353-428C-9EC0-1379BDA992E3}" type="datetimeFigureOut">
               <a:rPr lang="en-US" smtClean="0"/>
-              <a:t>7/6/2021</a:t>
+              <a:t>7/7/2021</a:t>
             </a:fld>
             <a:endParaRPr lang="en-US"/>
           </a:p>
@@ -1960,7 +1960,7 @@
           <a:p>
             <a:fld id="{A7C790ED-1353-428C-9EC0-1379BDA992E3}" type="datetimeFigureOut">
               <a:rPr lang="en-US" smtClean="0"/>
-              <a:t>7/6/2021</a:t>
+              <a:t>7/7/2021</a:t>
             </a:fld>
             <a:endParaRPr lang="en-US"/>
           </a:p>
@@ -2073,7 +2073,7 @@
           <a:p>
             <a:fld id="{A7C790ED-1353-428C-9EC0-1379BDA992E3}" type="datetimeFigureOut">
               <a:rPr lang="en-US" smtClean="0"/>
-              <a:t>7/6/2021</a:t>
+              <a:t>7/7/2021</a:t>
             </a:fld>
             <a:endParaRPr lang="en-US"/>
           </a:p>
@@ -2384,7 +2384,7 @@
           <a:p>
             <a:fld id="{A7C790ED-1353-428C-9EC0-1379BDA992E3}" type="datetimeFigureOut">
               <a:rPr lang="en-US" smtClean="0"/>
-              <a:t>7/6/2021</a:t>
+              <a:t>7/7/2021</a:t>
             </a:fld>
             <a:endParaRPr lang="en-US"/>
           </a:p>
@@ -2672,7 +2672,7 @@
           <a:p>
             <a:fld id="{A7C790ED-1353-428C-9EC0-1379BDA992E3}" type="datetimeFigureOut">
               <a:rPr lang="en-US" smtClean="0"/>
-              <a:t>7/6/2021</a:t>
+              <a:t>7/7/2021</a:t>
             </a:fld>
             <a:endParaRPr lang="en-US"/>
           </a:p>
@@ -2913,7 +2913,7 @@
           <a:p>
             <a:fld id="{A7C790ED-1353-428C-9EC0-1379BDA992E3}" type="datetimeFigureOut">
               <a:rPr lang="en-US" smtClean="0"/>
-              <a:t>7/6/2021</a:t>
+              <a:t>7/7/2021</a:t>
             </a:fld>
             <a:endParaRPr lang="en-US"/>
           </a:p>
@@ -3468,53 +3468,6 @@
       </p:cxnSp>
       <p:sp>
         <p:nvSpPr>
-          <p:cNvPr id="7" name="Rectangle 6">
-            <a:extLst>
-              <a:ext uri="{FF2B5EF4-FFF2-40B4-BE49-F238E27FC236}">
-                <a16:creationId xmlns:a16="http://schemas.microsoft.com/office/drawing/2014/main" id="{85151842-160C-4CF8-BE65-F43EEBABCE58}"/>
-              </a:ext>
-            </a:extLst>
-          </p:cNvPr>
-          <p:cNvSpPr/>
-          <p:nvPr/>
-        </p:nvSpPr>
-        <p:spPr>
-          <a:xfrm>
-            <a:off x="370972" y="4678848"/>
-            <a:ext cx="2080469" cy="310393"/>
-          </a:xfrm>
-          <a:prstGeom prst="rect">
-            <a:avLst/>
-          </a:prstGeom>
-        </p:spPr>
-        <p:style>
-          <a:lnRef idx="3">
-            <a:schemeClr val="lt1"/>
-          </a:lnRef>
-          <a:fillRef idx="1">
-            <a:schemeClr val="accent5"/>
-          </a:fillRef>
-          <a:effectRef idx="1">
-            <a:schemeClr val="accent5"/>
-          </a:effectRef>
-          <a:fontRef idx="minor">
-            <a:schemeClr val="lt1"/>
-          </a:fontRef>
-        </p:style>
-        <p:txBody>
-          <a:bodyPr rtlCol="0" anchor="ctr"/>
-          <a:lstStyle/>
-          <a:p>
-            <a:pPr algn="ctr"/>
-            <a:r>
-              <a:rPr lang="en-US" sz="1000" dirty="0"/>
-              <a:t>Pull External Forecasts</a:t>
-            </a:r>
-          </a:p>
-        </p:txBody>
-      </p:sp>
-      <p:sp>
-        <p:nvSpPr>
           <p:cNvPr id="9" name="Rectangle 8">
             <a:extLst>
               <a:ext uri="{FF2B5EF4-FFF2-40B4-BE49-F238E27FC236}">
@@ -3907,7 +3860,7 @@
         </p:nvSpPr>
         <p:spPr>
           <a:xfrm>
-            <a:off x="1795055" y="3390707"/>
+            <a:off x="1745630" y="3441315"/>
             <a:ext cx="2080469" cy="310393"/>
           </a:xfrm>
           <a:prstGeom prst="rect">
@@ -3953,15 +3906,15 @@
           </p:cNvPr>
           <p:cNvCxnSpPr>
             <a:cxnSpLocks/>
-            <a:stCxn id="7" idx="0"/>
+            <a:stCxn id="36" idx="0"/>
             <a:endCxn id="48" idx="2"/>
           </p:cNvCxnSpPr>
           <p:nvPr/>
         </p:nvCxnSpPr>
         <p:spPr>
           <a:xfrm flipV="1">
-            <a:off x="1411207" y="3701100"/>
-            <a:ext cx="1424083" cy="977748"/>
+            <a:off x="1362532" y="3751708"/>
+            <a:ext cx="1423333" cy="822552"/>
           </a:xfrm>
           <a:prstGeom prst="straightConnector1">
             <a:avLst/>
@@ -4287,8 +4240,8 @@
         </p:nvCxnSpPr>
         <p:spPr>
           <a:xfrm flipV="1">
-            <a:off x="3875524" y="2660983"/>
-            <a:ext cx="391369" cy="884921"/>
+            <a:off x="3826099" y="2660983"/>
+            <a:ext cx="440794" cy="935529"/>
           </a:xfrm>
           <a:prstGeom prst="straightConnector1">
             <a:avLst/>
@@ -4431,7 +4384,7 @@
         <p:spPr>
           <a:xfrm>
             <a:off x="1518316" y="1630850"/>
-            <a:ext cx="276739" cy="1915054"/>
+            <a:ext cx="227314" cy="1965662"/>
           </a:xfrm>
           <a:prstGeom prst="straightConnector1">
             <a:avLst/>
@@ -4508,7 +4461,7 @@
         </p:nvSpPr>
         <p:spPr>
           <a:xfrm>
-            <a:off x="2437868" y="4634261"/>
+            <a:off x="3027523" y="3802416"/>
             <a:ext cx="498855" cy="369332"/>
           </a:xfrm>
           <a:prstGeom prst="rect">
@@ -4607,6 +4560,55 @@
                 </a:solidFill>
               </a:rPr>
               <a:t>M4</a:t>
+            </a:r>
+          </a:p>
+        </p:txBody>
+      </p:sp>
+      <p:sp>
+        <p:nvSpPr>
+          <p:cNvPr id="36" name="Rectangle 35">
+            <a:extLst>
+              <a:ext uri="{FF2B5EF4-FFF2-40B4-BE49-F238E27FC236}">
+                <a16:creationId xmlns:a16="http://schemas.microsoft.com/office/drawing/2014/main" id="{7D77298A-B6F4-4D74-9B80-5030E4A293A5}"/>
+              </a:ext>
+            </a:extLst>
+          </p:cNvPr>
+          <p:cNvSpPr/>
+          <p:nvPr/>
+        </p:nvSpPr>
+        <p:spPr>
+          <a:xfrm>
+            <a:off x="322297" y="4574260"/>
+            <a:ext cx="2080469" cy="310393"/>
+          </a:xfrm>
+          <a:prstGeom prst="rect">
+            <a:avLst/>
+          </a:prstGeom>
+        </p:spPr>
+        <p:style>
+          <a:lnRef idx="2">
+            <a:schemeClr val="accent6">
+              <a:shade val="50000"/>
+            </a:schemeClr>
+          </a:lnRef>
+          <a:fillRef idx="1">
+            <a:schemeClr val="accent6"/>
+          </a:fillRef>
+          <a:effectRef idx="0">
+            <a:schemeClr val="accent6"/>
+          </a:effectRef>
+          <a:fontRef idx="minor">
+            <a:schemeClr val="lt1"/>
+          </a:fontRef>
+        </p:style>
+        <p:txBody>
+          <a:bodyPr rtlCol="0" anchor="ctr"/>
+          <a:lstStyle/>
+          <a:p>
+            <a:pPr algn="ctr"/>
+            <a:r>
+              <a:rPr lang="en-US" sz="1000" dirty="0"/>
+              <a:t>Pull External Forecasts (O type) – Include Partially Modeled Forecasts</a:t>
             </a:r>
           </a:p>
         </p:txBody>

</xml_diff>

<commit_message>
Modified unpchg and pchg to strip historical base value, similar to existing undlog and undiff (v0.15)
</commit_message>
<xml_diff>
--- a/documentation-templates/model-flow.pptx
+++ b/documentation-templates/model-flow.pptx
@@ -263,7 +263,7 @@
           <a:p>
             <a:fld id="{A7C790ED-1353-428C-9EC0-1379BDA992E3}" type="datetimeFigureOut">
               <a:rPr lang="en-US" smtClean="0"/>
-              <a:t>7/7/2021</a:t>
+              <a:t>7/14/2021</a:t>
             </a:fld>
             <a:endParaRPr lang="en-US"/>
           </a:p>
@@ -461,7 +461,7 @@
           <a:p>
             <a:fld id="{A7C790ED-1353-428C-9EC0-1379BDA992E3}" type="datetimeFigureOut">
               <a:rPr lang="en-US" smtClean="0"/>
-              <a:t>7/7/2021</a:t>
+              <a:t>7/14/2021</a:t>
             </a:fld>
             <a:endParaRPr lang="en-US"/>
           </a:p>
@@ -669,7 +669,7 @@
           <a:p>
             <a:fld id="{A7C790ED-1353-428C-9EC0-1379BDA992E3}" type="datetimeFigureOut">
               <a:rPr lang="en-US" smtClean="0"/>
-              <a:t>7/7/2021</a:t>
+              <a:t>7/14/2021</a:t>
             </a:fld>
             <a:endParaRPr lang="en-US"/>
           </a:p>
@@ -867,7 +867,7 @@
           <a:p>
             <a:fld id="{A7C790ED-1353-428C-9EC0-1379BDA992E3}" type="datetimeFigureOut">
               <a:rPr lang="en-US" smtClean="0"/>
-              <a:t>7/7/2021</a:t>
+              <a:t>7/14/2021</a:t>
             </a:fld>
             <a:endParaRPr lang="en-US"/>
           </a:p>
@@ -1142,7 +1142,7 @@
           <a:p>
             <a:fld id="{A7C790ED-1353-428C-9EC0-1379BDA992E3}" type="datetimeFigureOut">
               <a:rPr lang="en-US" smtClean="0"/>
-              <a:t>7/7/2021</a:t>
+              <a:t>7/14/2021</a:t>
             </a:fld>
             <a:endParaRPr lang="en-US"/>
           </a:p>
@@ -1407,7 +1407,7 @@
           <a:p>
             <a:fld id="{A7C790ED-1353-428C-9EC0-1379BDA992E3}" type="datetimeFigureOut">
               <a:rPr lang="en-US" smtClean="0"/>
-              <a:t>7/7/2021</a:t>
+              <a:t>7/14/2021</a:t>
             </a:fld>
             <a:endParaRPr lang="en-US"/>
           </a:p>
@@ -1819,7 +1819,7 @@
           <a:p>
             <a:fld id="{A7C790ED-1353-428C-9EC0-1379BDA992E3}" type="datetimeFigureOut">
               <a:rPr lang="en-US" smtClean="0"/>
-              <a:t>7/7/2021</a:t>
+              <a:t>7/14/2021</a:t>
             </a:fld>
             <a:endParaRPr lang="en-US"/>
           </a:p>
@@ -1960,7 +1960,7 @@
           <a:p>
             <a:fld id="{A7C790ED-1353-428C-9EC0-1379BDA992E3}" type="datetimeFigureOut">
               <a:rPr lang="en-US" smtClean="0"/>
-              <a:t>7/7/2021</a:t>
+              <a:t>7/14/2021</a:t>
             </a:fld>
             <a:endParaRPr lang="en-US"/>
           </a:p>
@@ -2073,7 +2073,7 @@
           <a:p>
             <a:fld id="{A7C790ED-1353-428C-9EC0-1379BDA992E3}" type="datetimeFigureOut">
               <a:rPr lang="en-US" smtClean="0"/>
-              <a:t>7/7/2021</a:t>
+              <a:t>7/14/2021</a:t>
             </a:fld>
             <a:endParaRPr lang="en-US"/>
           </a:p>
@@ -2384,7 +2384,7 @@
           <a:p>
             <a:fld id="{A7C790ED-1353-428C-9EC0-1379BDA992E3}" type="datetimeFigureOut">
               <a:rPr lang="en-US" smtClean="0"/>
-              <a:t>7/7/2021</a:t>
+              <a:t>7/14/2021</a:t>
             </a:fld>
             <a:endParaRPr lang="en-US"/>
           </a:p>
@@ -2672,7 +2672,7 @@
           <a:p>
             <a:fld id="{A7C790ED-1353-428C-9EC0-1379BDA992E3}" type="datetimeFigureOut">
               <a:rPr lang="en-US" smtClean="0"/>
-              <a:t>7/7/2021</a:t>
+              <a:t>7/14/2021</a:t>
             </a:fld>
             <a:endParaRPr lang="en-US"/>
           </a:p>
@@ -2913,7 +2913,7 @@
           <a:p>
             <a:fld id="{A7C790ED-1353-428C-9EC0-1379BDA992E3}" type="datetimeFigureOut">
               <a:rPr lang="en-US" smtClean="0"/>
-              <a:t>7/7/2021</a:t>
+              <a:t>7/14/2021</a:t>
             </a:fld>
             <a:endParaRPr lang="en-US"/>
           </a:p>
@@ -4462,7 +4462,7 @@
         <p:spPr>
           <a:xfrm>
             <a:off x="3027523" y="3802416"/>
-            <a:ext cx="498855" cy="369332"/>
+            <a:ext cx="503664" cy="369332"/>
           </a:xfrm>
           <a:prstGeom prst="rect">
             <a:avLst/>
@@ -4481,7 +4481,7 @@
                   <a:schemeClr val="accent5"/>
                 </a:solidFill>
               </a:rPr>
-              <a:t>M2</a:t>
+              <a:t>M3</a:t>
             </a:r>
           </a:p>
         </p:txBody>
@@ -4501,7 +4501,7 @@
         <p:spPr>
           <a:xfrm>
             <a:off x="2045841" y="2194679"/>
-            <a:ext cx="498855" cy="369332"/>
+            <a:ext cx="503664" cy="369332"/>
           </a:xfrm>
           <a:prstGeom prst="rect">
             <a:avLst/>
@@ -4520,7 +4520,7 @@
                   <a:schemeClr val="accent2"/>
                 </a:solidFill>
               </a:rPr>
-              <a:t>M3</a:t>
+              <a:t>M2</a:t>
             </a:r>
           </a:p>
         </p:txBody>

</xml_diff>